<commit_message>
oppgave 3, startet oppgave 4
</commit_message>
<xml_diff>
--- a/Ionic 2 workshop/Ionic 2 workshop.pptx
+++ b/Ionic 2 workshop/Ionic 2 workshop.pptx
@@ -5,21 +5,25 @@
     <p:sldMasterId id="2147483660" r:id="rId1"/>
   </p:sldMasterIdLst>
   <p:notesMasterIdLst>
-    <p:notesMasterId r:id="rId14"/>
+    <p:notesMasterId r:id="rId18"/>
   </p:notesMasterIdLst>
   <p:sldIdLst>
     <p:sldId id="256" r:id="rId2"/>
     <p:sldId id="265" r:id="rId3"/>
-    <p:sldId id="261" r:id="rId4"/>
-    <p:sldId id="257" r:id="rId5"/>
-    <p:sldId id="263" r:id="rId6"/>
-    <p:sldId id="264" r:id="rId7"/>
-    <p:sldId id="262" r:id="rId8"/>
-    <p:sldId id="258" r:id="rId9"/>
-    <p:sldId id="266" r:id="rId10"/>
-    <p:sldId id="260" r:id="rId11"/>
-    <p:sldId id="267" r:id="rId12"/>
-    <p:sldId id="259" r:id="rId13"/>
+    <p:sldId id="270" r:id="rId4"/>
+    <p:sldId id="261" r:id="rId5"/>
+    <p:sldId id="257" r:id="rId6"/>
+    <p:sldId id="263" r:id="rId7"/>
+    <p:sldId id="264" r:id="rId8"/>
+    <p:sldId id="262" r:id="rId9"/>
+    <p:sldId id="258" r:id="rId10"/>
+    <p:sldId id="269" r:id="rId11"/>
+    <p:sldId id="266" r:id="rId12"/>
+    <p:sldId id="260" r:id="rId13"/>
+    <p:sldId id="267" r:id="rId14"/>
+    <p:sldId id="259" r:id="rId15"/>
+    <p:sldId id="268" r:id="rId16"/>
+    <p:sldId id="271" r:id="rId17"/>
   </p:sldIdLst>
   <p:sldSz cx="12192000" cy="6858000"/>
   <p:notesSz cx="6858000" cy="9144000"/>
@@ -118,6 +122,11 @@
       </a:defRPr>
     </a:lvl9pPr>
   </p:defaultTextStyle>
+  <p:extLst>
+    <p:ext uri="{EFAFB233-063F-42B5-8137-9DF3F51BA10A}">
+      <p15:sldGuideLst xmlns:p15="http://schemas.microsoft.com/office/powerpoint/2012/main"/>
+    </p:ext>
+  </p:extLst>
 </p:presentation>
 </file>
 
@@ -203,7 +212,7 @@
           <a:p>
             <a:fld id="{A5543B18-9950-4402-830C-70DFF55A9D6A}" type="datetimeFigureOut">
               <a:rPr lang="nb-NO" smtClean="0"/>
-              <a:t>16.02.2017</a:t>
+              <a:t>02.03.2017</a:t>
             </a:fld>
             <a:endParaRPr lang="nb-NO"/>
           </a:p>
@@ -531,7 +540,71 @@
               <a:rPr lang="nb-NO" baseline="0" dirty="0" smtClean="0"/>
               <a:t> hvis man ikke vil kjøre det på mobilen.</a:t>
             </a:r>
-            <a:endParaRPr lang="nb-NO" dirty="0"/>
+          </a:p>
+          <a:p>
+            <a:endParaRPr lang="nb-NO" baseline="0" dirty="0" smtClean="0"/>
+          </a:p>
+          <a:p>
+            <a:r>
+              <a:rPr lang="nb-NO" baseline="0" dirty="0" smtClean="0"/>
+              <a:t>Vis fram prosjektstruktur</a:t>
+            </a:r>
+          </a:p>
+          <a:p>
+            <a:pPr marL="171450" indent="-171450">
+              <a:buFontTx/>
+              <a:buChar char="-"/>
+            </a:pPr>
+            <a:r>
+              <a:rPr lang="nb-NO" baseline="0" dirty="0" smtClean="0"/>
+              <a:t>Pages</a:t>
+            </a:r>
+          </a:p>
+          <a:p>
+            <a:pPr marL="171450" indent="-171450">
+              <a:buFontTx/>
+              <a:buChar char="-"/>
+            </a:pPr>
+            <a:r>
+              <a:rPr lang="nb-NO" baseline="0" dirty="0" err="1" smtClean="0"/>
+              <a:t>Root</a:t>
+            </a:r>
+            <a:r>
+              <a:rPr lang="nb-NO" baseline="0" dirty="0" smtClean="0"/>
+              <a:t> </a:t>
+            </a:r>
+            <a:r>
+              <a:rPr lang="nb-NO" baseline="0" dirty="0" err="1" smtClean="0"/>
+              <a:t>component</a:t>
+            </a:r>
+            <a:r>
+              <a:rPr lang="nb-NO" baseline="0" dirty="0" smtClean="0"/>
+              <a:t> under app.html</a:t>
+            </a:r>
+            <a:r>
+              <a:rPr lang="nb-NO" baseline="0" dirty="0"/>
+              <a:t> </a:t>
+            </a:r>
+            <a:r>
+              <a:rPr lang="nb-NO" baseline="0" dirty="0" smtClean="0"/>
+              <a:t>og </a:t>
+            </a:r>
+            <a:r>
+              <a:rPr lang="nb-NO" baseline="0" dirty="0" err="1" smtClean="0"/>
+              <a:t>app.module</a:t>
+            </a:r>
+            <a:r>
+              <a:rPr lang="nb-NO" baseline="0" dirty="0" smtClean="0"/>
+              <a:t> </a:t>
+            </a:r>
+            <a:r>
+              <a:rPr lang="nb-NO" baseline="0" dirty="0" err="1" smtClean="0"/>
+              <a:t>route</a:t>
+            </a:r>
+            <a:r>
+              <a:rPr lang="nb-NO" baseline="0" dirty="0" smtClean="0"/>
+              <a:t>.</a:t>
+            </a:r>
           </a:p>
         </p:txBody>
       </p:sp>
@@ -552,7 +625,7 @@
           <a:p>
             <a:fld id="{6BEA58FB-0425-4043-8123-60513F4596AE}" type="slidenum">
               <a:rPr lang="nb-NO" smtClean="0"/>
-              <a:t>11</a:t>
+              <a:t>13</a:t>
             </a:fld>
             <a:endParaRPr lang="nb-NO"/>
           </a:p>
@@ -562,6 +635,462 @@
     <p:extLst>
       <p:ext uri="{BB962C8B-B14F-4D97-AF65-F5344CB8AC3E}">
         <p14:creationId xmlns:p14="http://schemas.microsoft.com/office/powerpoint/2010/main" val="3617479764"/>
+      </p:ext>
+    </p:extLst>
+  </p:cSld>
+  <p:clrMapOvr>
+    <a:masterClrMapping/>
+  </p:clrMapOvr>
+</p:notes>
+</file>
+
+<file path=ppt/notesSlides/notesSlide2.xml><?xml version="1.0" encoding="utf-8"?>
+<p:notes xmlns:a="http://schemas.openxmlformats.org/drawingml/2006/main" xmlns:r="http://schemas.openxmlformats.org/officeDocument/2006/relationships" xmlns:p="http://schemas.openxmlformats.org/presentationml/2006/main">
+  <p:cSld>
+    <p:spTree>
+      <p:nvGrpSpPr>
+        <p:cNvPr id="1" name=""/>
+        <p:cNvGrpSpPr/>
+        <p:nvPr/>
+      </p:nvGrpSpPr>
+      <p:grpSpPr>
+        <a:xfrm>
+          <a:off x="0" y="0"/>
+          <a:ext cx="0" cy="0"/>
+          <a:chOff x="0" y="0"/>
+          <a:chExt cx="0" cy="0"/>
+        </a:xfrm>
+      </p:grpSpPr>
+      <p:sp>
+        <p:nvSpPr>
+          <p:cNvPr id="2" name="Plassholder for lysbilde 1"/>
+          <p:cNvSpPr>
+            <a:spLocks noGrp="1" noRot="1" noChangeAspect="1"/>
+          </p:cNvSpPr>
+          <p:nvPr>
+            <p:ph type="sldImg"/>
+          </p:nvPr>
+        </p:nvSpPr>
+        <p:spPr/>
+      </p:sp>
+      <p:sp>
+        <p:nvSpPr>
+          <p:cNvPr id="3" name="Plassholder for notater 2"/>
+          <p:cNvSpPr>
+            <a:spLocks noGrp="1"/>
+          </p:cNvSpPr>
+          <p:nvPr>
+            <p:ph type="body" idx="1"/>
+          </p:nvPr>
+        </p:nvSpPr>
+        <p:spPr/>
+        <p:txBody>
+          <a:bodyPr/>
+          <a:lstStyle/>
+          <a:p>
+            <a:r>
+              <a:rPr lang="nb-NO" dirty="0" smtClean="0"/>
+              <a:t>Fasit</a:t>
+            </a:r>
+          </a:p>
+          <a:p>
+            <a:r>
+              <a:rPr lang="nb-NO" dirty="0" err="1" smtClean="0"/>
+              <a:t>Ionic</a:t>
+            </a:r>
+            <a:r>
+              <a:rPr lang="nb-NO" baseline="0" dirty="0" smtClean="0"/>
+              <a:t> g </a:t>
+            </a:r>
+            <a:r>
+              <a:rPr lang="nb-NO" baseline="0" dirty="0" err="1" smtClean="0"/>
+              <a:t>component</a:t>
+            </a:r>
+            <a:r>
+              <a:rPr lang="nb-NO" baseline="0" dirty="0" smtClean="0"/>
+              <a:t> </a:t>
+            </a:r>
+            <a:r>
+              <a:rPr lang="nb-NO" baseline="0" dirty="0" err="1" smtClean="0"/>
+              <a:t>chatInput</a:t>
+            </a:r>
+            <a:endParaRPr lang="nb-NO" baseline="0" dirty="0" smtClean="0"/>
+          </a:p>
+          <a:p>
+            <a:r>
+              <a:rPr lang="nb-NO" baseline="0" dirty="0" err="1" smtClean="0"/>
+              <a:t>Ionic</a:t>
+            </a:r>
+            <a:r>
+              <a:rPr lang="nb-NO" baseline="0" dirty="0" smtClean="0"/>
+              <a:t> g </a:t>
+            </a:r>
+            <a:r>
+              <a:rPr lang="nb-NO" baseline="0" dirty="0" err="1" smtClean="0"/>
+              <a:t>component</a:t>
+            </a:r>
+            <a:r>
+              <a:rPr lang="nb-NO" baseline="0" dirty="0" smtClean="0"/>
+              <a:t> </a:t>
+            </a:r>
+            <a:r>
+              <a:rPr lang="nb-NO" baseline="0" dirty="0" err="1" smtClean="0"/>
+              <a:t>chatContent</a:t>
+            </a:r>
+            <a:endParaRPr lang="nb-NO" baseline="0" dirty="0" smtClean="0"/>
+          </a:p>
+          <a:p>
+            <a:endParaRPr lang="nb-NO" baseline="0" dirty="0" smtClean="0"/>
+          </a:p>
+          <a:p>
+            <a:r>
+              <a:rPr lang="nb-NO" baseline="0" dirty="0" smtClean="0"/>
+              <a:t>Content:</a:t>
+            </a:r>
+            <a:endParaRPr lang="nb-NO" baseline="0" dirty="0" smtClean="0"/>
+          </a:p>
+          <a:p>
+            <a:r>
+              <a:rPr lang="nb-NO" baseline="0" dirty="0" smtClean="0"/>
+              <a:t>&lt;ion-</a:t>
+            </a:r>
+            <a:r>
+              <a:rPr lang="nb-NO" baseline="0" dirty="0" err="1" smtClean="0"/>
+              <a:t>card</a:t>
+            </a:r>
+            <a:r>
+              <a:rPr lang="nb-NO" baseline="0" dirty="0" smtClean="0"/>
+              <a:t>&gt;</a:t>
+            </a:r>
+          </a:p>
+          <a:p>
+            <a:r>
+              <a:rPr lang="nb-NO" baseline="0" dirty="0" smtClean="0"/>
+              <a:t>&lt;ion-</a:t>
+            </a:r>
+            <a:r>
+              <a:rPr lang="nb-NO" baseline="0" dirty="0" err="1" smtClean="0"/>
+              <a:t>card</a:t>
+            </a:r>
+            <a:r>
+              <a:rPr lang="nb-NO" baseline="0" dirty="0" smtClean="0"/>
+              <a:t>-header&gt;</a:t>
+            </a:r>
+          </a:p>
+          <a:p>
+            <a:r>
+              <a:rPr lang="nb-NO" baseline="0" dirty="0" smtClean="0"/>
+              <a:t>&lt;ion-</a:t>
+            </a:r>
+            <a:r>
+              <a:rPr lang="nb-NO" baseline="0" dirty="0" err="1" smtClean="0"/>
+              <a:t>card</a:t>
+            </a:r>
+            <a:r>
+              <a:rPr lang="nb-NO" baseline="0" dirty="0" smtClean="0"/>
+              <a:t>-</a:t>
+            </a:r>
+            <a:r>
+              <a:rPr lang="nb-NO" baseline="0" dirty="0" err="1" smtClean="0"/>
+              <a:t>content</a:t>
+            </a:r>
+            <a:r>
+              <a:rPr lang="nb-NO" baseline="0" dirty="0" smtClean="0"/>
+              <a:t>&gt;</a:t>
+            </a:r>
+          </a:p>
+          <a:p>
+            <a:endParaRPr lang="nb-NO" baseline="0" dirty="0" smtClean="0"/>
+          </a:p>
+          <a:p>
+            <a:r>
+              <a:rPr lang="nb-NO" baseline="0" dirty="0" smtClean="0"/>
+              <a:t>Input </a:t>
+            </a:r>
+          </a:p>
+          <a:p>
+            <a:r>
+              <a:rPr lang="en-US" sz="1200" b="0" kern="1200" dirty="0" smtClean="0">
+                <a:solidFill>
+                  <a:schemeClr val="tx1"/>
+                </a:solidFill>
+                <a:effectLst/>
+                <a:latin typeface="+mn-lt"/>
+                <a:ea typeface="+mn-ea"/>
+                <a:cs typeface="+mn-cs"/>
+              </a:rPr>
+              <a:t>&lt;ion-item&gt;</a:t>
+            </a:r>
+          </a:p>
+          <a:p>
+            <a:r>
+              <a:rPr lang="en-US" sz="1200" b="0" kern="1200" dirty="0" smtClean="0">
+                <a:solidFill>
+                  <a:schemeClr val="tx1"/>
+                </a:solidFill>
+                <a:effectLst/>
+                <a:latin typeface="+mn-lt"/>
+                <a:ea typeface="+mn-ea"/>
+                <a:cs typeface="+mn-cs"/>
+              </a:rPr>
+              <a:t>  &lt;ion-label&gt;Chat: &lt;/ion-label&gt;</a:t>
+            </a:r>
+          </a:p>
+          <a:p>
+            <a:r>
+              <a:rPr lang="en-US" sz="1200" b="0" kern="1200" dirty="0" smtClean="0">
+                <a:solidFill>
+                  <a:schemeClr val="tx1"/>
+                </a:solidFill>
+                <a:effectLst/>
+                <a:latin typeface="+mn-lt"/>
+                <a:ea typeface="+mn-ea"/>
+                <a:cs typeface="+mn-cs"/>
+              </a:rPr>
+              <a:t>  &lt;ion-input type="text"&gt;&lt;/ion-input&gt;</a:t>
+            </a:r>
+          </a:p>
+          <a:p>
+            <a:r>
+              <a:rPr lang="en-US" sz="1200" b="0" kern="1200" dirty="0" smtClean="0">
+                <a:solidFill>
+                  <a:schemeClr val="tx1"/>
+                </a:solidFill>
+                <a:effectLst/>
+                <a:latin typeface="+mn-lt"/>
+                <a:ea typeface="+mn-ea"/>
+                <a:cs typeface="+mn-cs"/>
+              </a:rPr>
+              <a:t>&lt;/ion-item&gt;</a:t>
+            </a:r>
+          </a:p>
+          <a:p>
+            <a:endParaRPr lang="en-US" sz="1200" b="0" kern="1200" dirty="0" smtClean="0">
+              <a:solidFill>
+                <a:schemeClr val="tx1"/>
+              </a:solidFill>
+              <a:effectLst/>
+              <a:latin typeface="+mn-lt"/>
+              <a:ea typeface="+mn-ea"/>
+              <a:cs typeface="+mn-cs"/>
+            </a:endParaRPr>
+          </a:p>
+          <a:p>
+            <a:r>
+              <a:rPr lang="en-US" sz="1200" b="0" kern="1200" dirty="0" smtClean="0">
+                <a:solidFill>
+                  <a:schemeClr val="tx1"/>
+                </a:solidFill>
+                <a:effectLst/>
+                <a:latin typeface="+mn-lt"/>
+                <a:ea typeface="+mn-ea"/>
+                <a:cs typeface="+mn-cs"/>
+              </a:rPr>
+              <a:t>Home.html</a:t>
+            </a:r>
+          </a:p>
+          <a:p>
+            <a:r>
+              <a:rPr lang="en-US" sz="1200" b="0" kern="1200" dirty="0" smtClean="0">
+                <a:solidFill>
+                  <a:schemeClr val="tx1"/>
+                </a:solidFill>
+                <a:effectLst/>
+                <a:latin typeface="+mn-lt"/>
+                <a:ea typeface="+mn-ea"/>
+                <a:cs typeface="+mn-cs"/>
+              </a:rPr>
+              <a:t>&lt;ion-content class="cards-</a:t>
+            </a:r>
+            <a:r>
+              <a:rPr lang="en-US" sz="1200" b="0" kern="1200" dirty="0" err="1" smtClean="0">
+                <a:solidFill>
+                  <a:schemeClr val="tx1"/>
+                </a:solidFill>
+                <a:effectLst/>
+                <a:latin typeface="+mn-lt"/>
+                <a:ea typeface="+mn-ea"/>
+                <a:cs typeface="+mn-cs"/>
+              </a:rPr>
+              <a:t>bg</a:t>
+            </a:r>
+            <a:r>
+              <a:rPr lang="en-US" sz="1200" b="0" kern="1200" dirty="0" smtClean="0">
+                <a:solidFill>
+                  <a:schemeClr val="tx1"/>
+                </a:solidFill>
+                <a:effectLst/>
+                <a:latin typeface="+mn-lt"/>
+                <a:ea typeface="+mn-ea"/>
+                <a:cs typeface="+mn-cs"/>
+              </a:rPr>
+              <a:t>" padding&gt;</a:t>
+            </a:r>
+          </a:p>
+          <a:p>
+            <a:r>
+              <a:rPr lang="en-US" sz="1200" b="0" kern="1200" dirty="0" smtClean="0">
+                <a:solidFill>
+                  <a:schemeClr val="tx1"/>
+                </a:solidFill>
+                <a:effectLst/>
+                <a:latin typeface="+mn-lt"/>
+                <a:ea typeface="+mn-ea"/>
+                <a:cs typeface="+mn-cs"/>
+              </a:rPr>
+              <a:t>  &lt;chat-content&gt;&lt;/chat-content&gt;</a:t>
+            </a:r>
+          </a:p>
+          <a:p>
+            <a:r>
+              <a:rPr lang="en-US" sz="1200" b="0" kern="1200" dirty="0" smtClean="0">
+                <a:solidFill>
+                  <a:schemeClr val="tx1"/>
+                </a:solidFill>
+                <a:effectLst/>
+                <a:latin typeface="+mn-lt"/>
+                <a:ea typeface="+mn-ea"/>
+                <a:cs typeface="+mn-cs"/>
+              </a:rPr>
+              <a:t>&lt;/ion-content&gt;</a:t>
+            </a:r>
+          </a:p>
+          <a:p>
+            <a:r>
+              <a:rPr lang="en-US" sz="1200" b="0" kern="1200" dirty="0" smtClean="0">
+                <a:solidFill>
+                  <a:schemeClr val="tx1"/>
+                </a:solidFill>
+                <a:effectLst/>
+                <a:latin typeface="+mn-lt"/>
+                <a:ea typeface="+mn-ea"/>
+                <a:cs typeface="+mn-cs"/>
+              </a:rPr>
+              <a:t/>
+            </a:r>
+            <a:br>
+              <a:rPr lang="en-US" sz="1200" b="0" kern="1200" dirty="0" smtClean="0">
+                <a:solidFill>
+                  <a:schemeClr val="tx1"/>
+                </a:solidFill>
+                <a:effectLst/>
+                <a:latin typeface="+mn-lt"/>
+                <a:ea typeface="+mn-ea"/>
+                <a:cs typeface="+mn-cs"/>
+              </a:rPr>
+            </a:br>
+            <a:r>
+              <a:rPr lang="en-US" sz="1200" b="0" kern="1200" dirty="0" smtClean="0">
+                <a:solidFill>
+                  <a:schemeClr val="tx1"/>
+                </a:solidFill>
+                <a:effectLst/>
+                <a:latin typeface="+mn-lt"/>
+                <a:ea typeface="+mn-ea"/>
+                <a:cs typeface="+mn-cs"/>
+              </a:rPr>
+              <a:t>&lt;ion-footer&gt;</a:t>
+            </a:r>
+          </a:p>
+          <a:p>
+            <a:r>
+              <a:rPr lang="en-US" sz="1200" b="0" kern="1200" dirty="0" smtClean="0">
+                <a:solidFill>
+                  <a:schemeClr val="tx1"/>
+                </a:solidFill>
+                <a:effectLst/>
+                <a:latin typeface="+mn-lt"/>
+                <a:ea typeface="+mn-ea"/>
+                <a:cs typeface="+mn-cs"/>
+              </a:rPr>
+              <a:t>  &lt;ion-toolbar&gt;</a:t>
+            </a:r>
+          </a:p>
+          <a:p>
+            <a:r>
+              <a:rPr lang="en-US" sz="1200" b="0" kern="1200" dirty="0" smtClean="0">
+                <a:solidFill>
+                  <a:schemeClr val="tx1"/>
+                </a:solidFill>
+                <a:effectLst/>
+                <a:latin typeface="+mn-lt"/>
+                <a:ea typeface="+mn-ea"/>
+                <a:cs typeface="+mn-cs"/>
+              </a:rPr>
+              <a:t>    &lt;chat-input&gt;&lt;/chat-input&gt;</a:t>
+            </a:r>
+          </a:p>
+          <a:p>
+            <a:r>
+              <a:rPr lang="en-US" sz="1200" b="0" kern="1200" dirty="0" smtClean="0">
+                <a:solidFill>
+                  <a:schemeClr val="tx1"/>
+                </a:solidFill>
+                <a:effectLst/>
+                <a:latin typeface="+mn-lt"/>
+                <a:ea typeface="+mn-ea"/>
+                <a:cs typeface="+mn-cs"/>
+              </a:rPr>
+              <a:t>  &lt;/ion-toolbar&gt;</a:t>
+            </a:r>
+          </a:p>
+          <a:p>
+            <a:r>
+              <a:rPr lang="en-US" sz="1200" b="0" kern="1200" dirty="0" smtClean="0">
+                <a:solidFill>
+                  <a:schemeClr val="tx1"/>
+                </a:solidFill>
+                <a:effectLst/>
+                <a:latin typeface="+mn-lt"/>
+                <a:ea typeface="+mn-ea"/>
+                <a:cs typeface="+mn-cs"/>
+              </a:rPr>
+              <a:t>&lt;/ion-footer&gt;</a:t>
+            </a:r>
+          </a:p>
+          <a:p>
+            <a:endParaRPr lang="en-US" sz="1200" b="0" kern="1200" dirty="0" smtClean="0">
+              <a:solidFill>
+                <a:schemeClr val="tx1"/>
+              </a:solidFill>
+              <a:effectLst/>
+              <a:latin typeface="+mn-lt"/>
+              <a:ea typeface="+mn-ea"/>
+              <a:cs typeface="+mn-cs"/>
+            </a:endParaRPr>
+          </a:p>
+          <a:p>
+            <a:endParaRPr lang="nb-NO" baseline="0" dirty="0" smtClean="0"/>
+          </a:p>
+        </p:txBody>
+      </p:sp>
+      <p:sp>
+        <p:nvSpPr>
+          <p:cNvPr id="4" name="Plassholder for lysbildenummer 3"/>
+          <p:cNvSpPr>
+            <a:spLocks noGrp="1"/>
+          </p:cNvSpPr>
+          <p:nvPr>
+            <p:ph type="sldNum" sz="quarter" idx="10"/>
+          </p:nvPr>
+        </p:nvSpPr>
+        <p:spPr/>
+        <p:txBody>
+          <a:bodyPr/>
+          <a:lstStyle/>
+          <a:p>
+            <a:fld id="{6BEA58FB-0425-4043-8123-60513F4596AE}" type="slidenum">
+              <a:rPr lang="nb-NO" smtClean="0"/>
+              <a:t>15</a:t>
+            </a:fld>
+            <a:endParaRPr lang="nb-NO"/>
+          </a:p>
+        </p:txBody>
+      </p:sp>
+    </p:spTree>
+    <p:extLst>
+      <p:ext uri="{BB962C8B-B14F-4D97-AF65-F5344CB8AC3E}">
+        <p14:creationId xmlns:p14="http://schemas.microsoft.com/office/powerpoint/2010/main" val="1970504746"/>
       </p:ext>
     </p:extLst>
   </p:cSld>
@@ -635,7 +1164,7 @@
           <a:p>
             <a:fld id="{952976F7-1A1B-47BF-994D-21B9772F57A5}" type="datetimeFigureOut">
               <a:rPr lang="nb-NO" smtClean="0"/>
-              <a:t>02.02.2017</a:t>
+              <a:t>02.03.2017</a:t>
             </a:fld>
             <a:endParaRPr lang="nb-NO"/>
           </a:p>
@@ -1018,7 +1547,7 @@
           <a:p>
             <a:fld id="{952976F7-1A1B-47BF-994D-21B9772F57A5}" type="datetimeFigureOut">
               <a:rPr lang="nb-NO" smtClean="0"/>
-              <a:t>02.02.2017</a:t>
+              <a:t>02.03.2017</a:t>
             </a:fld>
             <a:endParaRPr lang="nb-NO"/>
           </a:p>
@@ -1290,7 +1819,7 @@
           <a:p>
             <a:fld id="{952976F7-1A1B-47BF-994D-21B9772F57A5}" type="datetimeFigureOut">
               <a:rPr lang="nb-NO" smtClean="0"/>
-              <a:t>02.02.2017</a:t>
+              <a:t>02.03.2017</a:t>
             </a:fld>
             <a:endParaRPr lang="nb-NO"/>
           </a:p>
@@ -1548,7 +2077,7 @@
           <a:p>
             <a:fld id="{952976F7-1A1B-47BF-994D-21B9772F57A5}" type="datetimeFigureOut">
               <a:rPr lang="nb-NO" smtClean="0"/>
-              <a:t>02.02.2017</a:t>
+              <a:t>02.03.2017</a:t>
             </a:fld>
             <a:endParaRPr lang="nb-NO"/>
           </a:p>
@@ -1953,7 +2482,7 @@
           <a:p>
             <a:fld id="{952976F7-1A1B-47BF-994D-21B9772F57A5}" type="datetimeFigureOut">
               <a:rPr lang="nb-NO" smtClean="0"/>
-              <a:t>02.02.2017</a:t>
+              <a:t>02.03.2017</a:t>
             </a:fld>
             <a:endParaRPr lang="nb-NO"/>
           </a:p>
@@ -2097,7 +2626,7 @@
           <a:p>
             <a:fld id="{952976F7-1A1B-47BF-994D-21B9772F57A5}" type="datetimeFigureOut">
               <a:rPr lang="nb-NO" smtClean="0"/>
-              <a:t>02.02.2017</a:t>
+              <a:t>02.03.2017</a:t>
             </a:fld>
             <a:endParaRPr lang="nb-NO"/>
           </a:p>
@@ -2218,7 +2747,7 @@
           <a:p>
             <a:fld id="{952976F7-1A1B-47BF-994D-21B9772F57A5}" type="datetimeFigureOut">
               <a:rPr lang="nb-NO" smtClean="0"/>
-              <a:t>02.02.2017</a:t>
+              <a:t>02.03.2017</a:t>
             </a:fld>
             <a:endParaRPr lang="nb-NO"/>
           </a:p>
@@ -2521,7 +3050,7 @@
           <a:p>
             <a:fld id="{952976F7-1A1B-47BF-994D-21B9772F57A5}" type="datetimeFigureOut">
               <a:rPr lang="nb-NO" smtClean="0"/>
-              <a:t>02.02.2017</a:t>
+              <a:t>02.03.2017</a:t>
             </a:fld>
             <a:endParaRPr lang="nb-NO"/>
           </a:p>
@@ -2804,7 +3333,7 @@
           <a:p>
             <a:fld id="{952976F7-1A1B-47BF-994D-21B9772F57A5}" type="datetimeFigureOut">
               <a:rPr lang="nb-NO" smtClean="0"/>
-              <a:t>02.02.2017</a:t>
+              <a:t>02.03.2017</a:t>
             </a:fld>
             <a:endParaRPr lang="nb-NO"/>
           </a:p>
@@ -3146,7 +3675,7 @@
           <a:p>
             <a:fld id="{952976F7-1A1B-47BF-994D-21B9772F57A5}" type="datetimeFigureOut">
               <a:rPr lang="nb-NO" smtClean="0"/>
-              <a:t>02.02.2017</a:t>
+              <a:t>02.03.2017</a:t>
             </a:fld>
             <a:endParaRPr lang="nb-NO"/>
           </a:p>
@@ -3548,20 +4077,12 @@
           <a:lstStyle/>
           <a:p>
             <a:r>
-              <a:rPr lang="nb-NO" dirty="0"/>
-              <a:t>Workshop</a:t>
-            </a:r>
-            <a:r>
-              <a:rPr lang="nb-NO"/>
-              <a:t> </a:t>
-            </a:r>
-            <a:r>
-              <a:rPr lang="nb-NO" dirty="0"/>
-              <a:t>med Stian </a:t>
-            </a:r>
-            <a:r>
-              <a:rPr lang="nb-NO"/>
-              <a:t>Standahl</a:t>
+              <a:rPr lang="nb-NO" dirty="0" smtClean="0"/>
+              <a:t>Fra kode til </a:t>
+            </a:r>
+            <a:r>
+              <a:rPr lang="nb-NO" dirty="0" err="1" smtClean="0"/>
+              <a:t>app</a:t>
             </a:r>
             <a:endParaRPr lang="nb-NO" dirty="0"/>
           </a:p>
@@ -3584,15 +4105,7 @@
           <a:p>
             <a:r>
               <a:rPr lang="nb-NO" dirty="0"/>
-              <a:t>Introduksjon</a:t>
-            </a:r>
-            <a:r>
-              <a:rPr lang="nb-NO"/>
-              <a:t> </a:t>
-            </a:r>
-            <a:r>
-              <a:rPr lang="nb-NO" dirty="0"/>
-              <a:t>til </a:t>
+              <a:t>Introduksjon til </a:t>
             </a:r>
             <a:r>
               <a:rPr lang="nb-NO" dirty="0" err="1"/>
@@ -3600,13 +4113,8 @@
             </a:r>
             <a:r>
               <a:rPr lang="nb-NO" dirty="0"/>
-              <a:t> </a:t>
-            </a:r>
-            <a:r>
-              <a:rPr lang="nb-NO"/>
-              <a:t>2</a:t>
-            </a:r>
-            <a:endParaRPr lang="nb-NO" dirty="0"/>
+              <a:t> 2</a:t>
+            </a:r>
           </a:p>
         </p:txBody>
       </p:sp>
@@ -3657,15 +4165,7 @@
           <a:p>
             <a:r>
               <a:rPr lang="nb-NO" dirty="0" smtClean="0"/>
-              <a:t>Testing av </a:t>
-            </a:r>
-            <a:r>
-              <a:rPr lang="nb-NO" dirty="0" err="1" smtClean="0"/>
-              <a:t>ionic</a:t>
-            </a:r>
-            <a:r>
-              <a:rPr lang="nb-NO" dirty="0" smtClean="0"/>
-              <a:t> på mobil</a:t>
+              <a:t>Oppgave</a:t>
             </a:r>
             <a:endParaRPr lang="nb-NO" dirty="0"/>
           </a:p>
@@ -3687,106 +4187,40 @@
           <a:lstStyle/>
           <a:p>
             <a:r>
+              <a:rPr lang="nb-NO" dirty="0" smtClean="0"/>
+              <a:t>Lage en </a:t>
+            </a:r>
+            <a:r>
               <a:rPr lang="nb-NO" dirty="0" err="1" smtClean="0"/>
-              <a:t>Chrome</a:t>
-            </a:r>
-            <a:endParaRPr lang="nb-NO" dirty="0" smtClean="0"/>
-          </a:p>
-          <a:p>
-            <a:pPr lvl="1"/>
-            <a:r>
-              <a:rPr lang="nb-NO" dirty="0" smtClean="0"/>
-              <a:t>F12 -&gt; </a:t>
+              <a:t>chat</a:t>
+            </a:r>
+            <a:r>
+              <a:rPr lang="nb-NO" dirty="0" smtClean="0"/>
+              <a:t> som integrerer med </a:t>
             </a:r>
             <a:r>
               <a:rPr lang="nb-NO" dirty="0" err="1" smtClean="0"/>
-              <a:t>emulate</a:t>
-            </a:r>
-            <a:r>
-              <a:rPr lang="nb-NO" dirty="0" smtClean="0"/>
-              <a:t> </a:t>
+              <a:t>Sticos</a:t>
+            </a:r>
+            <a:r>
+              <a:rPr lang="nb-NO" dirty="0" smtClean="0"/>
+              <a:t> sin </a:t>
             </a:r>
             <a:r>
               <a:rPr lang="nb-NO" dirty="0" err="1" smtClean="0"/>
-              <a:t>devices</a:t>
-            </a:r>
-            <a:endParaRPr lang="nb-NO" dirty="0" smtClean="0"/>
-          </a:p>
-          <a:p>
+              <a:t>chatbot</a:t>
+            </a:r>
+            <a:r>
+              <a:rPr lang="nb-NO" dirty="0" smtClean="0"/>
+              <a:t>, @</a:t>
+            </a:r>
             <a:r>
               <a:rPr lang="nb-NO" dirty="0" err="1" smtClean="0"/>
-              <a:t>Ionic</a:t>
-            </a:r>
-            <a:r>
-              <a:rPr lang="nb-NO" dirty="0" smtClean="0"/>
-              <a:t> </a:t>
-            </a:r>
-            <a:r>
-              <a:rPr lang="nb-NO" dirty="0" err="1" smtClean="0"/>
-              <a:t>view</a:t>
-            </a:r>
-            <a:endParaRPr lang="nb-NO" dirty="0" smtClean="0"/>
-          </a:p>
-          <a:p>
-            <a:pPr lvl="1"/>
-            <a:r>
-              <a:rPr lang="nb-NO" dirty="0" smtClean="0"/>
-              <a:t>Last ned </a:t>
-            </a:r>
-            <a:r>
-              <a:rPr lang="nb-NO" dirty="0" err="1" smtClean="0"/>
-              <a:t>appen</a:t>
-            </a:r>
-            <a:endParaRPr lang="nb-NO" dirty="0" smtClean="0"/>
-          </a:p>
-          <a:p>
-            <a:pPr lvl="1"/>
-            <a:r>
-              <a:rPr lang="nb-NO" dirty="0" smtClean="0"/>
-              <a:t>Lag bruker</a:t>
-            </a:r>
-            <a:endParaRPr lang="nb-NO" dirty="0"/>
-          </a:p>
-          <a:p>
-            <a:pPr lvl="1"/>
-            <a:r>
-              <a:rPr lang="nb-NO" dirty="0" smtClean="0"/>
-              <a:t>Kjør kommandoen</a:t>
-            </a:r>
-          </a:p>
-          <a:p>
-            <a:pPr lvl="2"/>
-            <a:r>
-              <a:rPr lang="nb-NO" dirty="0" err="1" smtClean="0"/>
-              <a:t>ionic</a:t>
-            </a:r>
-            <a:r>
-              <a:rPr lang="nb-NO" dirty="0" smtClean="0"/>
-              <a:t> </a:t>
-            </a:r>
-            <a:r>
-              <a:rPr lang="nb-NO" dirty="0" err="1" smtClean="0"/>
-              <a:t>upload</a:t>
-            </a:r>
-            <a:endParaRPr lang="nb-NO" dirty="0" smtClean="0"/>
-          </a:p>
-          <a:p>
-            <a:r>
-              <a:rPr lang="nb-NO" dirty="0" smtClean="0"/>
-              <a:t>Emulering på mobil</a:t>
-            </a:r>
-          </a:p>
-          <a:p>
-            <a:pPr lvl="1"/>
-            <a:r>
-              <a:rPr lang="nb-NO" dirty="0" smtClean="0">
-                <a:hlinkClick r:id="rId2"/>
-              </a:rPr>
-              <a:t>http://ionicframework.com/docs/v2/intro/deploying/</a:t>
-            </a:r>
-            <a:r>
-              <a:rPr lang="nb-NO" dirty="0" smtClean="0"/>
-              <a:t> </a:t>
+              <a:t>else</a:t>
+            </a:r>
+            <a:r>
+              <a:rPr lang="nb-NO" dirty="0" smtClean="0"/>
+              <a:t>.</a:t>
             </a:r>
             <a:endParaRPr lang="nb-NO" dirty="0"/>
           </a:p>
@@ -3795,20 +4229,13 @@
     </p:spTree>
     <p:extLst>
       <p:ext uri="{BB962C8B-B14F-4D97-AF65-F5344CB8AC3E}">
-        <p14:creationId xmlns:p14="http://schemas.microsoft.com/office/powerpoint/2010/main" val="3291330480"/>
+        <p14:creationId xmlns:p14="http://schemas.microsoft.com/office/powerpoint/2010/main" val="937591413"/>
       </p:ext>
     </p:extLst>
   </p:cSld>
   <p:clrMapOvr>
     <a:masterClrMapping/>
   </p:clrMapOvr>
-  <p:timing>
-    <p:tnLst>
-      <p:par>
-        <p:cTn id="1" dur="indefinite" restart="never" nodeType="tmRoot"/>
-      </p:par>
-    </p:tnLst>
-  </p:timing>
 </p:sld>
 </file>
 
@@ -3846,7 +4273,7 @@
           <a:p>
             <a:r>
               <a:rPr lang="nb-NO" dirty="0" smtClean="0"/>
-              <a:t>Oppgave 2</a:t>
+              <a:t>Oppgave 1		</a:t>
             </a:r>
             <a:endParaRPr lang="nb-NO" dirty="0"/>
           </a:p>
@@ -3869,57 +4296,84 @@
           <a:p>
             <a:r>
               <a:rPr lang="nb-NO" dirty="0" smtClean="0"/>
-              <a:t>Kjør </a:t>
+              <a:t>Installer </a:t>
             </a:r>
             <a:r>
               <a:rPr lang="nb-NO" dirty="0" err="1" smtClean="0"/>
-              <a:t>appen</a:t>
-            </a:r>
-            <a:r>
-              <a:rPr lang="nb-NO" dirty="0" smtClean="0"/>
-              <a:t> på mobilen</a:t>
+              <a:t>ionic</a:t>
+            </a:r>
+            <a:r>
+              <a:rPr lang="nb-NO" dirty="0" smtClean="0"/>
+              <a:t> 2</a:t>
+            </a:r>
+          </a:p>
+          <a:p>
+            <a:r>
+              <a:rPr lang="nb-NO" dirty="0" smtClean="0"/>
+              <a:t>Opprett et nytt prosjekt</a:t>
             </a:r>
           </a:p>
           <a:p>
             <a:pPr lvl="1"/>
             <a:r>
               <a:rPr lang="nb-NO" dirty="0" smtClean="0"/>
-              <a:t>Enten ved å bruke </a:t>
-            </a:r>
-          </a:p>
-          <a:p>
-            <a:pPr lvl="2"/>
+              <a:t>Bruk «Blank» </a:t>
+            </a:r>
             <a:r>
               <a:rPr lang="nb-NO" dirty="0" err="1" smtClean="0"/>
-              <a:t>Ionic</a:t>
-            </a:r>
-            <a:r>
-              <a:rPr lang="nb-NO" dirty="0" smtClean="0"/>
-              <a:t> </a:t>
+              <a:t>template</a:t>
+            </a:r>
+            <a:endParaRPr lang="nb-NO" dirty="0" smtClean="0"/>
+          </a:p>
+          <a:p>
+            <a:pPr lvl="1"/>
+            <a:r>
+              <a:rPr lang="nb-NO" dirty="0" smtClean="0"/>
+              <a:t>Navngi som [NAVN ?]</a:t>
+            </a:r>
+          </a:p>
+          <a:p>
+            <a:pPr lvl="1"/>
+            <a:r>
+              <a:rPr lang="nb-NO" dirty="0" smtClean="0"/>
+              <a:t>Opprett en </a:t>
             </a:r>
             <a:r>
               <a:rPr lang="nb-NO" dirty="0" err="1" smtClean="0"/>
-              <a:t>view</a:t>
-            </a:r>
-            <a:r>
-              <a:rPr lang="nb-NO" dirty="0" smtClean="0"/>
-              <a:t> (raskest feedback loop)</a:t>
-            </a:r>
-          </a:p>
-          <a:p>
-            <a:pPr lvl="2"/>
-            <a:r>
-              <a:rPr lang="nb-NO" dirty="0" err="1" smtClean="0"/>
-              <a:t>Emulate</a:t>
-            </a:r>
-            <a:endParaRPr lang="nb-NO" dirty="0"/>
+              <a:t>ionicbruker</a:t>
+            </a:r>
+            <a:endParaRPr lang="nb-NO" dirty="0" smtClean="0"/>
+          </a:p>
+          <a:p>
+            <a:r>
+              <a:rPr lang="nb-NO" dirty="0" smtClean="0"/>
+              <a:t>Kjør prosjektet</a:t>
+            </a:r>
+          </a:p>
+          <a:p>
+            <a:endParaRPr lang="nb-NO" dirty="0" smtClean="0"/>
+          </a:p>
+          <a:p>
+            <a:r>
+              <a:rPr lang="nb-NO" sz="1800" dirty="0"/>
+              <a:t>Bonus </a:t>
+            </a:r>
+            <a:r>
+              <a:rPr lang="nb-NO" sz="1800" dirty="0" err="1" smtClean="0"/>
+              <a:t>oppg</a:t>
+            </a:r>
+            <a:r>
+              <a:rPr lang="nb-NO" sz="1800" dirty="0" smtClean="0"/>
+              <a:t>: Prøv --lab bak kjørekommandoen</a:t>
+            </a:r>
+            <a:endParaRPr lang="nb-NO" sz="1800" dirty="0"/>
           </a:p>
         </p:txBody>
       </p:sp>
     </p:spTree>
     <p:extLst>
       <p:ext uri="{BB962C8B-B14F-4D97-AF65-F5344CB8AC3E}">
-        <p14:creationId xmlns:p14="http://schemas.microsoft.com/office/powerpoint/2010/main" val="3963294372"/>
+        <p14:creationId xmlns:p14="http://schemas.microsoft.com/office/powerpoint/2010/main" val="808542648"/>
       </p:ext>
     </p:extLst>
   </p:cSld>
@@ -3970,7 +4424,399 @@
           <a:p>
             <a:r>
               <a:rPr lang="nb-NO" dirty="0" smtClean="0"/>
-              <a:t>Lage </a:t>
+              <a:t>Testing av </a:t>
+            </a:r>
+            <a:r>
+              <a:rPr lang="nb-NO" dirty="0" err="1" smtClean="0"/>
+              <a:t>ionic</a:t>
+            </a:r>
+            <a:r>
+              <a:rPr lang="nb-NO" dirty="0" smtClean="0"/>
+              <a:t> på mobil</a:t>
+            </a:r>
+            <a:endParaRPr lang="nb-NO" dirty="0"/>
+          </a:p>
+        </p:txBody>
+      </p:sp>
+      <p:sp>
+        <p:nvSpPr>
+          <p:cNvPr id="3" name="Plassholder for innhold 2"/>
+          <p:cNvSpPr>
+            <a:spLocks noGrp="1"/>
+          </p:cNvSpPr>
+          <p:nvPr>
+            <p:ph idx="1"/>
+          </p:nvPr>
+        </p:nvSpPr>
+        <p:spPr/>
+        <p:txBody>
+          <a:bodyPr/>
+          <a:lstStyle/>
+          <a:p>
+            <a:r>
+              <a:rPr lang="nb-NO" dirty="0" err="1" smtClean="0"/>
+              <a:t>Chrome</a:t>
+            </a:r>
+            <a:endParaRPr lang="nb-NO" dirty="0" smtClean="0"/>
+          </a:p>
+          <a:p>
+            <a:pPr lvl="1"/>
+            <a:r>
+              <a:rPr lang="nb-NO" dirty="0" smtClean="0"/>
+              <a:t>F12 -&gt; </a:t>
+            </a:r>
+            <a:r>
+              <a:rPr lang="nb-NO" dirty="0" err="1" smtClean="0"/>
+              <a:t>emulate</a:t>
+            </a:r>
+            <a:r>
+              <a:rPr lang="nb-NO" dirty="0" smtClean="0"/>
+              <a:t> </a:t>
+            </a:r>
+            <a:r>
+              <a:rPr lang="nb-NO" dirty="0" err="1" smtClean="0"/>
+              <a:t>devices</a:t>
+            </a:r>
+            <a:endParaRPr lang="nb-NO" dirty="0" smtClean="0"/>
+          </a:p>
+          <a:p>
+            <a:r>
+              <a:rPr lang="nb-NO" dirty="0" err="1" smtClean="0"/>
+              <a:t>Ionic</a:t>
+            </a:r>
+            <a:r>
+              <a:rPr lang="nb-NO" dirty="0" smtClean="0"/>
+              <a:t> </a:t>
+            </a:r>
+            <a:r>
+              <a:rPr lang="nb-NO" dirty="0" err="1" smtClean="0"/>
+              <a:t>view</a:t>
+            </a:r>
+            <a:endParaRPr lang="nb-NO" dirty="0" smtClean="0"/>
+          </a:p>
+          <a:p>
+            <a:pPr lvl="1"/>
+            <a:r>
+              <a:rPr lang="nb-NO" dirty="0" smtClean="0"/>
+              <a:t>Last ned </a:t>
+            </a:r>
+            <a:r>
+              <a:rPr lang="nb-NO" dirty="0" err="1" smtClean="0"/>
+              <a:t>appen</a:t>
+            </a:r>
+            <a:endParaRPr lang="nb-NO" dirty="0" smtClean="0"/>
+          </a:p>
+          <a:p>
+            <a:pPr lvl="1"/>
+            <a:r>
+              <a:rPr lang="nb-NO" dirty="0" smtClean="0"/>
+              <a:t>Lag bruker</a:t>
+            </a:r>
+            <a:endParaRPr lang="nb-NO" dirty="0"/>
+          </a:p>
+          <a:p>
+            <a:pPr lvl="1"/>
+            <a:r>
+              <a:rPr lang="nb-NO" dirty="0" smtClean="0"/>
+              <a:t>Kjør kommandoen</a:t>
+            </a:r>
+          </a:p>
+          <a:p>
+            <a:pPr lvl="2"/>
+            <a:r>
+              <a:rPr lang="nb-NO" dirty="0" err="1" smtClean="0"/>
+              <a:t>ionic</a:t>
+            </a:r>
+            <a:r>
+              <a:rPr lang="nb-NO" dirty="0" smtClean="0"/>
+              <a:t> </a:t>
+            </a:r>
+            <a:r>
+              <a:rPr lang="nb-NO" dirty="0" err="1" smtClean="0"/>
+              <a:t>upload</a:t>
+            </a:r>
+            <a:endParaRPr lang="nb-NO" dirty="0" smtClean="0"/>
+          </a:p>
+          <a:p>
+            <a:r>
+              <a:rPr lang="nb-NO" dirty="0" smtClean="0"/>
+              <a:t>Emulering på mobil</a:t>
+            </a:r>
+          </a:p>
+          <a:p>
+            <a:pPr lvl="1"/>
+            <a:r>
+              <a:rPr lang="nb-NO" dirty="0" smtClean="0">
+                <a:hlinkClick r:id="rId2"/>
+              </a:rPr>
+              <a:t>http://ionicframework.com/docs/v2/intro/deploying/</a:t>
+            </a:r>
+            <a:r>
+              <a:rPr lang="nb-NO" dirty="0" smtClean="0"/>
+              <a:t> </a:t>
+            </a:r>
+            <a:endParaRPr lang="nb-NO" dirty="0"/>
+          </a:p>
+        </p:txBody>
+      </p:sp>
+    </p:spTree>
+    <p:extLst>
+      <p:ext uri="{BB962C8B-B14F-4D97-AF65-F5344CB8AC3E}">
+        <p14:creationId xmlns:p14="http://schemas.microsoft.com/office/powerpoint/2010/main" val="3291330480"/>
+      </p:ext>
+    </p:extLst>
+  </p:cSld>
+  <p:clrMapOvr>
+    <a:masterClrMapping/>
+  </p:clrMapOvr>
+  <p:timing>
+    <p:tnLst>
+      <p:par>
+        <p:cTn id="1" dur="indefinite" restart="never" nodeType="tmRoot"/>
+      </p:par>
+    </p:tnLst>
+  </p:timing>
+</p:sld>
+</file>
+
+<file path=ppt/slides/slide13.xml><?xml version="1.0" encoding="utf-8"?>
+<p:sld xmlns:a="http://schemas.openxmlformats.org/drawingml/2006/main" xmlns:r="http://schemas.openxmlformats.org/officeDocument/2006/relationships" xmlns:p="http://schemas.openxmlformats.org/presentationml/2006/main">
+  <p:cSld>
+    <p:spTree>
+      <p:nvGrpSpPr>
+        <p:cNvPr id="1" name=""/>
+        <p:cNvGrpSpPr/>
+        <p:nvPr/>
+      </p:nvGrpSpPr>
+      <p:grpSpPr>
+        <a:xfrm>
+          <a:off x="0" y="0"/>
+          <a:ext cx="0" cy="0"/>
+          <a:chOff x="0" y="0"/>
+          <a:chExt cx="0" cy="0"/>
+        </a:xfrm>
+      </p:grpSpPr>
+      <p:sp>
+        <p:nvSpPr>
+          <p:cNvPr id="2" name="Tittel 1"/>
+          <p:cNvSpPr>
+            <a:spLocks noGrp="1"/>
+          </p:cNvSpPr>
+          <p:nvPr>
+            <p:ph type="title"/>
+          </p:nvPr>
+        </p:nvSpPr>
+        <p:spPr/>
+        <p:txBody>
+          <a:bodyPr/>
+          <a:lstStyle/>
+          <a:p>
+            <a:r>
+              <a:rPr lang="nb-NO" dirty="0" smtClean="0"/>
+              <a:t>Oppgave 2</a:t>
+            </a:r>
+            <a:endParaRPr lang="nb-NO" dirty="0"/>
+          </a:p>
+        </p:txBody>
+      </p:sp>
+      <p:sp>
+        <p:nvSpPr>
+          <p:cNvPr id="3" name="Plassholder for innhold 2"/>
+          <p:cNvSpPr>
+            <a:spLocks noGrp="1"/>
+          </p:cNvSpPr>
+          <p:nvPr>
+            <p:ph idx="1"/>
+          </p:nvPr>
+        </p:nvSpPr>
+        <p:spPr>
+          <a:xfrm>
+            <a:off x="838200" y="1833646"/>
+            <a:ext cx="10515600" cy="4351338"/>
+          </a:xfrm>
+        </p:spPr>
+        <p:txBody>
+          <a:bodyPr/>
+          <a:lstStyle/>
+          <a:p>
+            <a:r>
+              <a:rPr lang="nb-NO" dirty="0" smtClean="0"/>
+              <a:t>Kjør </a:t>
+            </a:r>
+            <a:r>
+              <a:rPr lang="nb-NO" dirty="0" err="1" smtClean="0"/>
+              <a:t>appen</a:t>
+            </a:r>
+            <a:r>
+              <a:rPr lang="nb-NO" dirty="0" smtClean="0"/>
+              <a:t> på mobilen</a:t>
+            </a:r>
+          </a:p>
+          <a:p>
+            <a:pPr lvl="1"/>
+            <a:r>
+              <a:rPr lang="nb-NO" dirty="0" smtClean="0"/>
+              <a:t>Enten ved å bruke </a:t>
+            </a:r>
+          </a:p>
+          <a:p>
+            <a:pPr lvl="2"/>
+            <a:r>
+              <a:rPr lang="nb-NO" dirty="0" err="1" smtClean="0"/>
+              <a:t>Ionic</a:t>
+            </a:r>
+            <a:r>
+              <a:rPr lang="nb-NO" dirty="0" smtClean="0"/>
+              <a:t> </a:t>
+            </a:r>
+            <a:r>
+              <a:rPr lang="nb-NO" dirty="0" err="1" smtClean="0"/>
+              <a:t>view</a:t>
+            </a:r>
+            <a:r>
+              <a:rPr lang="nb-NO" dirty="0" smtClean="0"/>
+              <a:t> (raskest feedback loop)</a:t>
+            </a:r>
+          </a:p>
+          <a:p>
+            <a:pPr lvl="2"/>
+            <a:r>
+              <a:rPr lang="nb-NO" dirty="0" err="1" smtClean="0"/>
+              <a:t>Emulate</a:t>
+            </a:r>
+            <a:endParaRPr lang="nb-NO" dirty="0" smtClean="0"/>
+          </a:p>
+          <a:p>
+            <a:endParaRPr lang="nb-NO" dirty="0" smtClean="0"/>
+          </a:p>
+          <a:p>
+            <a:r>
+              <a:rPr lang="nb-NO" sz="1800" dirty="0" smtClean="0"/>
+              <a:t>Bonus </a:t>
+            </a:r>
+            <a:r>
+              <a:rPr lang="nb-NO" sz="1800" dirty="0" err="1" smtClean="0"/>
+              <a:t>oppg</a:t>
+            </a:r>
+            <a:r>
+              <a:rPr lang="nb-NO" sz="1800" dirty="0" smtClean="0"/>
+              <a:t>:</a:t>
+            </a:r>
+          </a:p>
+          <a:p>
+            <a:pPr lvl="1"/>
+            <a:r>
+              <a:rPr lang="nb-NO" sz="1400" dirty="0" smtClean="0"/>
+              <a:t>Oppdater home.html til å ha forskjellig </a:t>
+            </a:r>
+            <a:r>
+              <a:rPr lang="nb-NO" sz="1400" dirty="0" err="1" smtClean="0"/>
+              <a:t>text</a:t>
+            </a:r>
+            <a:r>
+              <a:rPr lang="nb-NO" sz="1400" dirty="0" smtClean="0"/>
+              <a:t> i body</a:t>
+            </a:r>
+          </a:p>
+          <a:p>
+            <a:pPr lvl="1"/>
+            <a:r>
+              <a:rPr lang="nb-NO" sz="1400" dirty="0" smtClean="0"/>
+              <a:t>Prøv </a:t>
+            </a:r>
+            <a:r>
+              <a:rPr lang="nb-NO" sz="1400" dirty="0"/>
+              <a:t>også </a:t>
+            </a:r>
+            <a:r>
+              <a:rPr lang="nb-NO" sz="1400" dirty="0" smtClean="0"/>
+              <a:t>overskriften «Dette </a:t>
+            </a:r>
+            <a:r>
+              <a:rPr lang="nb-NO" sz="1400" dirty="0"/>
+              <a:t>er en overskrift som er </a:t>
+            </a:r>
+            <a:r>
+              <a:rPr lang="nb-NO" sz="1400" dirty="0" smtClean="0"/>
+              <a:t>lang» med --labs</a:t>
+            </a:r>
+          </a:p>
+          <a:p>
+            <a:pPr lvl="2"/>
+            <a:r>
+              <a:rPr lang="nb-NO" sz="1000" dirty="0" smtClean="0"/>
+              <a:t>Merk forskjellen mellom mobil </a:t>
+            </a:r>
+            <a:r>
+              <a:rPr lang="nb-NO" sz="1000" dirty="0" err="1" smtClean="0"/>
+              <a:t>platformene</a:t>
+            </a:r>
+            <a:r>
+              <a:rPr lang="nb-NO" sz="1000" dirty="0" smtClean="0"/>
+              <a:t>.</a:t>
+            </a:r>
+          </a:p>
+          <a:p>
+            <a:pPr lvl="1"/>
+            <a:endParaRPr lang="nb-NO" dirty="0"/>
+          </a:p>
+        </p:txBody>
+      </p:sp>
+    </p:spTree>
+    <p:extLst>
+      <p:ext uri="{BB962C8B-B14F-4D97-AF65-F5344CB8AC3E}">
+        <p14:creationId xmlns:p14="http://schemas.microsoft.com/office/powerpoint/2010/main" val="3963294372"/>
+      </p:ext>
+    </p:extLst>
+  </p:cSld>
+  <p:clrMapOvr>
+    <a:masterClrMapping/>
+  </p:clrMapOvr>
+  <p:timing>
+    <p:tnLst>
+      <p:par>
+        <p:cTn id="1" dur="indefinite" restart="never" nodeType="tmRoot"/>
+      </p:par>
+    </p:tnLst>
+  </p:timing>
+</p:sld>
+</file>
+
+<file path=ppt/slides/slide14.xml><?xml version="1.0" encoding="utf-8"?>
+<p:sld xmlns:a="http://schemas.openxmlformats.org/drawingml/2006/main" xmlns:r="http://schemas.openxmlformats.org/officeDocument/2006/relationships" xmlns:p="http://schemas.openxmlformats.org/presentationml/2006/main">
+  <p:cSld>
+    <p:spTree>
+      <p:nvGrpSpPr>
+        <p:cNvPr id="1" name=""/>
+        <p:cNvGrpSpPr/>
+        <p:nvPr/>
+      </p:nvGrpSpPr>
+      <p:grpSpPr>
+        <a:xfrm>
+          <a:off x="0" y="0"/>
+          <a:ext cx="0" cy="0"/>
+          <a:chOff x="0" y="0"/>
+          <a:chExt cx="0" cy="0"/>
+        </a:xfrm>
+      </p:grpSpPr>
+      <p:sp>
+        <p:nvSpPr>
+          <p:cNvPr id="2" name="Tittel 1"/>
+          <p:cNvSpPr>
+            <a:spLocks noGrp="1"/>
+          </p:cNvSpPr>
+          <p:nvPr>
+            <p:ph type="title"/>
+          </p:nvPr>
+        </p:nvSpPr>
+        <p:spPr/>
+        <p:txBody>
+          <a:bodyPr/>
+          <a:lstStyle/>
+          <a:p>
+            <a:r>
+              <a:rPr lang="nb-NO" dirty="0" smtClean="0"/>
+              <a:t>Lage (web)</a:t>
             </a:r>
             <a:r>
               <a:rPr lang="nb-NO" dirty="0" err="1" smtClean="0"/>
@@ -3990,43 +4836,36 @@
             <p:ph idx="1"/>
           </p:nvPr>
         </p:nvSpPr>
-        <p:spPr/>
+        <p:spPr>
+          <a:xfrm>
+            <a:off x="838200" y="1831803"/>
+            <a:ext cx="10515600" cy="4351338"/>
+          </a:xfrm>
+        </p:spPr>
         <p:txBody>
           <a:bodyPr/>
           <a:lstStyle/>
           <a:p>
             <a:r>
               <a:rPr lang="nb-NO" dirty="0" smtClean="0"/>
-              <a:t>Gjøres på akkurat samme måte som i </a:t>
+              <a:t>Bruker html </a:t>
             </a:r>
             <a:r>
               <a:rPr lang="nb-NO" dirty="0" err="1" smtClean="0"/>
-              <a:t>Angular</a:t>
-            </a:r>
-            <a:r>
-              <a:rPr lang="nb-NO" dirty="0" smtClean="0"/>
-              <a:t> 2</a:t>
-            </a:r>
-          </a:p>
-          <a:p>
-            <a:r>
-              <a:rPr lang="nb-NO" dirty="0" smtClean="0"/>
-              <a:t>Bruker forskjellig HTML </a:t>
-            </a:r>
-            <a:r>
-              <a:rPr lang="nb-NO" dirty="0" err="1" smtClean="0"/>
-              <a:t>markup</a:t>
-            </a:r>
-            <a:endParaRPr lang="nb-NO" dirty="0" smtClean="0"/>
-          </a:p>
-          <a:p>
-            <a:pPr lvl="1"/>
-            <a:r>
-              <a:rPr lang="nb-NO" smtClean="0"/>
+              <a:t>selectors</a:t>
+            </a:r>
+            <a:r>
+              <a:rPr lang="nb-NO" dirty="0" smtClean="0"/>
+              <a:t> med typescript komponenter</a:t>
+            </a:r>
+          </a:p>
+          <a:p>
+            <a:r>
+              <a:rPr lang="nb-NO" dirty="0" smtClean="0"/>
               <a:t>Se </a:t>
             </a:r>
             <a:r>
-              <a:rPr lang="nb-NO" smtClean="0">
+              <a:rPr lang="nb-NO" dirty="0" smtClean="0">
                 <a:hlinkClick r:id="rId2"/>
               </a:rPr>
               <a:t>http</a:t>
@@ -4047,6 +4886,81 @@
               <a:rPr lang="nb-NO" dirty="0" smtClean="0"/>
               <a:t> </a:t>
             </a:r>
+          </a:p>
+          <a:p>
+            <a:endParaRPr lang="nb-NO" dirty="0" smtClean="0"/>
+          </a:p>
+          <a:p>
+            <a:r>
+              <a:rPr lang="nb-NO" dirty="0" smtClean="0"/>
+              <a:t>For å lage komponenter så kan cli kommandoen</a:t>
+            </a:r>
+          </a:p>
+          <a:p>
+            <a:pPr lvl="1"/>
+            <a:r>
+              <a:rPr lang="nb-NO" dirty="0" err="1"/>
+              <a:t>i</a:t>
+            </a:r>
+            <a:r>
+              <a:rPr lang="nb-NO" dirty="0" err="1" smtClean="0"/>
+              <a:t>onic</a:t>
+            </a:r>
+            <a:r>
+              <a:rPr lang="nb-NO" dirty="0" smtClean="0"/>
+              <a:t> </a:t>
+            </a:r>
+            <a:r>
+              <a:rPr lang="nb-NO" dirty="0" err="1" smtClean="0"/>
+              <a:t>generate</a:t>
+            </a:r>
+            <a:r>
+              <a:rPr lang="nb-NO" dirty="0" smtClean="0"/>
+              <a:t> </a:t>
+            </a:r>
+            <a:r>
+              <a:rPr lang="nb-NO" dirty="0" err="1" smtClean="0"/>
+              <a:t>component</a:t>
+            </a:r>
+            <a:endParaRPr lang="nb-NO" dirty="0" smtClean="0"/>
+          </a:p>
+          <a:p>
+            <a:pPr lvl="1"/>
+            <a:r>
+              <a:rPr lang="nb-NO" dirty="0" smtClean="0"/>
+              <a:t>(kjør </a:t>
+            </a:r>
+            <a:r>
+              <a:rPr lang="nb-NO" dirty="0" err="1" smtClean="0"/>
+              <a:t>ionic</a:t>
+            </a:r>
+            <a:r>
+              <a:rPr lang="nb-NO" dirty="0" smtClean="0"/>
+              <a:t> </a:t>
+            </a:r>
+            <a:r>
+              <a:rPr lang="nb-NO" dirty="0" err="1" smtClean="0"/>
+              <a:t>help</a:t>
+            </a:r>
+            <a:r>
+              <a:rPr lang="nb-NO" dirty="0" smtClean="0"/>
+              <a:t> </a:t>
+            </a:r>
+            <a:r>
+              <a:rPr lang="nb-NO" dirty="0" err="1" smtClean="0"/>
+              <a:t>generate</a:t>
+            </a:r>
+            <a:r>
+              <a:rPr lang="nb-NO" dirty="0" smtClean="0"/>
+              <a:t> for mer informasjon)</a:t>
+            </a:r>
+          </a:p>
+          <a:p>
+            <a:pPr lvl="1"/>
+            <a:endParaRPr lang="nb-NO" dirty="0"/>
+          </a:p>
+          <a:p>
+            <a:pPr lvl="1"/>
             <a:endParaRPr lang="nb-NO" dirty="0"/>
           </a:p>
         </p:txBody>
@@ -4068,6 +4982,304 @@
       </p:par>
     </p:tnLst>
   </p:timing>
+</p:sld>
+</file>
+
+<file path=ppt/slides/slide15.xml><?xml version="1.0" encoding="utf-8"?>
+<p:sld xmlns:a="http://schemas.openxmlformats.org/drawingml/2006/main" xmlns:r="http://schemas.openxmlformats.org/officeDocument/2006/relationships" xmlns:p="http://schemas.openxmlformats.org/presentationml/2006/main">
+  <p:cSld>
+    <p:spTree>
+      <p:nvGrpSpPr>
+        <p:cNvPr id="1" name=""/>
+        <p:cNvGrpSpPr/>
+        <p:nvPr/>
+      </p:nvGrpSpPr>
+      <p:grpSpPr>
+        <a:xfrm>
+          <a:off x="0" y="0"/>
+          <a:ext cx="0" cy="0"/>
+          <a:chOff x="0" y="0"/>
+          <a:chExt cx="0" cy="0"/>
+        </a:xfrm>
+      </p:grpSpPr>
+      <p:sp>
+        <p:nvSpPr>
+          <p:cNvPr id="2" name="Tittel 1"/>
+          <p:cNvSpPr>
+            <a:spLocks noGrp="1"/>
+          </p:cNvSpPr>
+          <p:nvPr>
+            <p:ph type="title"/>
+          </p:nvPr>
+        </p:nvSpPr>
+        <p:spPr/>
+        <p:txBody>
+          <a:bodyPr/>
+          <a:lstStyle/>
+          <a:p>
+            <a:r>
+              <a:rPr lang="nb-NO" dirty="0" smtClean="0"/>
+              <a:t>Oppgave 3</a:t>
+            </a:r>
+            <a:endParaRPr lang="nb-NO" dirty="0"/>
+          </a:p>
+        </p:txBody>
+      </p:sp>
+      <p:sp>
+        <p:nvSpPr>
+          <p:cNvPr id="3" name="Plassholder for innhold 2"/>
+          <p:cNvSpPr>
+            <a:spLocks noGrp="1"/>
+          </p:cNvSpPr>
+          <p:nvPr>
+            <p:ph idx="1"/>
+          </p:nvPr>
+        </p:nvSpPr>
+        <p:spPr/>
+        <p:txBody>
+          <a:bodyPr/>
+          <a:lstStyle/>
+          <a:p>
+            <a:r>
+              <a:rPr lang="nb-NO" dirty="0" smtClean="0"/>
+              <a:t>Generer komponentene</a:t>
+            </a:r>
+          </a:p>
+          <a:p>
+            <a:pPr lvl="1"/>
+            <a:r>
+              <a:rPr lang="nb-NO" dirty="0" err="1" smtClean="0"/>
+              <a:t>ChatInput</a:t>
+            </a:r>
+            <a:endParaRPr lang="nb-NO" dirty="0" smtClean="0"/>
+          </a:p>
+          <a:p>
+            <a:pPr lvl="1"/>
+            <a:r>
+              <a:rPr lang="nb-NO" dirty="0" err="1" smtClean="0"/>
+              <a:t>ChatContent</a:t>
+            </a:r>
+            <a:endParaRPr lang="nb-NO" dirty="0" smtClean="0"/>
+          </a:p>
+          <a:p>
+            <a:pPr lvl="2"/>
+            <a:r>
+              <a:rPr lang="nb-NO" dirty="0" smtClean="0"/>
+              <a:t>Bruker Cards for å presentere </a:t>
+            </a:r>
+            <a:r>
+              <a:rPr lang="nb-NO" dirty="0" err="1" smtClean="0"/>
+              <a:t>chat</a:t>
+            </a:r>
+            <a:r>
+              <a:rPr lang="nb-NO" dirty="0" smtClean="0"/>
+              <a:t>-teksten </a:t>
+            </a:r>
+          </a:p>
+          <a:p>
+            <a:pPr lvl="2"/>
+            <a:r>
+              <a:rPr lang="nb-NO" dirty="0" smtClean="0"/>
+              <a:t>&lt;ion-</a:t>
+            </a:r>
+            <a:r>
+              <a:rPr lang="nb-NO" dirty="0" err="1" smtClean="0"/>
+              <a:t>card</a:t>
+            </a:r>
+            <a:r>
+              <a:rPr lang="nb-NO" dirty="0" smtClean="0"/>
+              <a:t>&gt;</a:t>
+            </a:r>
+          </a:p>
+          <a:p>
+            <a:pPr lvl="1"/>
+            <a:endParaRPr lang="nb-NO" dirty="0"/>
+          </a:p>
+          <a:p>
+            <a:endParaRPr lang="nb-NO" dirty="0"/>
+          </a:p>
+        </p:txBody>
+      </p:sp>
+      <p:pic>
+        <p:nvPicPr>
+          <p:cNvPr id="4" name="Bilde 3"/>
+          <p:cNvPicPr>
+            <a:picLocks noChangeAspect="1"/>
+          </p:cNvPicPr>
+          <p:nvPr/>
+        </p:nvPicPr>
+        <p:blipFill>
+          <a:blip r:embed="rId3"/>
+          <a:stretch>
+            <a:fillRect/>
+          </a:stretch>
+        </p:blipFill>
+        <p:spPr>
+          <a:xfrm>
+            <a:off x="8791307" y="1027906"/>
+            <a:ext cx="2562493" cy="4513629"/>
+          </a:xfrm>
+          <a:prstGeom prst="rect">
+            <a:avLst/>
+          </a:prstGeom>
+        </p:spPr>
+      </p:pic>
+    </p:spTree>
+    <p:extLst>
+      <p:ext uri="{BB962C8B-B14F-4D97-AF65-F5344CB8AC3E}">
+        <p14:creationId xmlns:p14="http://schemas.microsoft.com/office/powerpoint/2010/main" val="1919383914"/>
+      </p:ext>
+    </p:extLst>
+  </p:cSld>
+  <p:clrMapOvr>
+    <a:masterClrMapping/>
+  </p:clrMapOvr>
+  <p:timing>
+    <p:tnLst>
+      <p:par>
+        <p:cTn id="1" dur="indefinite" restart="never" nodeType="tmRoot"/>
+      </p:par>
+    </p:tnLst>
+  </p:timing>
+</p:sld>
+</file>
+
+<file path=ppt/slides/slide16.xml><?xml version="1.0" encoding="utf-8"?>
+<p:sld xmlns:a="http://schemas.openxmlformats.org/drawingml/2006/main" xmlns:r="http://schemas.openxmlformats.org/officeDocument/2006/relationships" xmlns:p="http://schemas.openxmlformats.org/presentationml/2006/main">
+  <p:cSld>
+    <p:spTree>
+      <p:nvGrpSpPr>
+        <p:cNvPr id="1" name=""/>
+        <p:cNvGrpSpPr/>
+        <p:nvPr/>
+      </p:nvGrpSpPr>
+      <p:grpSpPr>
+        <a:xfrm>
+          <a:off x="0" y="0"/>
+          <a:ext cx="0" cy="0"/>
+          <a:chOff x="0" y="0"/>
+          <a:chExt cx="0" cy="0"/>
+        </a:xfrm>
+      </p:grpSpPr>
+      <p:sp>
+        <p:nvSpPr>
+          <p:cNvPr id="2" name="Tittel 1"/>
+          <p:cNvSpPr>
+            <a:spLocks noGrp="1"/>
+          </p:cNvSpPr>
+          <p:nvPr>
+            <p:ph type="title"/>
+          </p:nvPr>
+        </p:nvSpPr>
+        <p:spPr/>
+        <p:txBody>
+          <a:bodyPr/>
+          <a:lstStyle/>
+          <a:p>
+            <a:r>
+              <a:rPr lang="nb-NO" dirty="0" smtClean="0"/>
+              <a:t>Oppgave 4</a:t>
+            </a:r>
+            <a:endParaRPr lang="nb-NO" dirty="0"/>
+          </a:p>
+        </p:txBody>
+      </p:sp>
+      <p:sp>
+        <p:nvSpPr>
+          <p:cNvPr id="3" name="Plassholder for innhold 2"/>
+          <p:cNvSpPr>
+            <a:spLocks noGrp="1"/>
+          </p:cNvSpPr>
+          <p:nvPr>
+            <p:ph idx="1"/>
+          </p:nvPr>
+        </p:nvSpPr>
+        <p:spPr/>
+        <p:txBody>
+          <a:bodyPr/>
+          <a:lstStyle/>
+          <a:p>
+            <a:r>
+              <a:rPr lang="nb-NO" dirty="0" smtClean="0"/>
+              <a:t>Lag service</a:t>
+            </a:r>
+          </a:p>
+          <a:p>
+            <a:pPr lvl="1"/>
+            <a:r>
+              <a:rPr lang="nb-NO" dirty="0" smtClean="0"/>
+              <a:t>Kjører en http </a:t>
+            </a:r>
+            <a:r>
+              <a:rPr lang="nb-NO" dirty="0" err="1" smtClean="0"/>
+              <a:t>get</a:t>
+            </a:r>
+            <a:r>
+              <a:rPr lang="nb-NO" dirty="0"/>
+              <a:t> </a:t>
+            </a:r>
+            <a:r>
+              <a:rPr lang="nb-NO" dirty="0" smtClean="0"/>
+              <a:t>mot [URL]</a:t>
+            </a:r>
+          </a:p>
+          <a:p>
+            <a:r>
+              <a:rPr lang="nb-NO" dirty="0" smtClean="0"/>
+              <a:t>Bruk servicen i </a:t>
+            </a:r>
+            <a:r>
+              <a:rPr lang="nb-NO" dirty="0" err="1" smtClean="0"/>
+              <a:t>chat</a:t>
+            </a:r>
+            <a:r>
+              <a:rPr lang="nb-NO" dirty="0" smtClean="0"/>
+              <a:t>-input</a:t>
+            </a:r>
+          </a:p>
+          <a:p>
+            <a:r>
+              <a:rPr lang="nb-NO" dirty="0" smtClean="0"/>
+              <a:t>Send </a:t>
+            </a:r>
+            <a:r>
+              <a:rPr lang="nb-NO" dirty="0" err="1" smtClean="0"/>
+              <a:t>response</a:t>
+            </a:r>
+            <a:r>
+              <a:rPr lang="nb-NO" dirty="0" smtClean="0"/>
+              <a:t> til </a:t>
+            </a:r>
+            <a:r>
+              <a:rPr lang="nb-NO" dirty="0" err="1" smtClean="0"/>
+              <a:t>chat-content</a:t>
+            </a:r>
+            <a:r>
+              <a:rPr lang="nb-NO" dirty="0"/>
+              <a:t> </a:t>
+            </a:r>
+            <a:r>
+              <a:rPr lang="nb-NO" dirty="0" smtClean="0"/>
+              <a:t>som nytt ion-</a:t>
+            </a:r>
+            <a:r>
+              <a:rPr lang="nb-NO" smtClean="0"/>
+              <a:t>card</a:t>
+            </a:r>
+            <a:endParaRPr lang="nb-NO" dirty="0" smtClean="0"/>
+          </a:p>
+        </p:txBody>
+      </p:sp>
+    </p:spTree>
+    <p:extLst>
+      <p:ext uri="{BB962C8B-B14F-4D97-AF65-F5344CB8AC3E}">
+        <p14:creationId xmlns:p14="http://schemas.microsoft.com/office/powerpoint/2010/main" val="3664456486"/>
+      </p:ext>
+    </p:extLst>
+  </p:cSld>
+  <p:clrMapOvr>
+    <a:masterClrMapping/>
+  </p:clrMapOvr>
 </p:sld>
 </file>
 
@@ -4297,9 +5509,10 @@
           <a:lstStyle/>
           <a:p>
             <a:r>
-              <a:rPr lang="nb-NO" dirty="0"/>
-              <a:t>Mål	</a:t>
-            </a:r>
+              <a:rPr lang="nb-NO" dirty="0" smtClean="0"/>
+              <a:t>Forhåndskunnskap</a:t>
+            </a:r>
+            <a:endParaRPr lang="nb-NO" dirty="0"/>
           </a:p>
         </p:txBody>
       </p:sp>
@@ -4319,49 +5532,36 @@
           <a:lstStyle/>
           <a:p>
             <a:r>
-              <a:rPr lang="nb-NO" dirty="0"/>
-              <a:t>Hva er </a:t>
-            </a:r>
-            <a:r>
-              <a:rPr lang="nb-NO" dirty="0" err="1"/>
-              <a:t>Ionic</a:t>
-            </a:r>
-            <a:r>
-              <a:rPr lang="nb-NO" dirty="0"/>
-              <a:t>? </a:t>
-            </a:r>
-          </a:p>
-          <a:p>
-            <a:r>
-              <a:rPr lang="nb-NO" dirty="0"/>
-              <a:t>Et </a:t>
-            </a:r>
-            <a:r>
-              <a:rPr lang="nb-NO" dirty="0" err="1"/>
-              <a:t>ionic</a:t>
-            </a:r>
-            <a:r>
-              <a:rPr lang="nb-NO" dirty="0"/>
-              <a:t> prosjekt fra nyoppretting til </a:t>
-            </a:r>
-            <a:r>
-              <a:rPr lang="nb-NO" dirty="0" err="1"/>
-              <a:t>release</a:t>
-            </a:r>
-            <a:r>
-              <a:rPr lang="nb-NO" dirty="0"/>
-              <a:t>.</a:t>
-            </a:r>
-          </a:p>
-          <a:p>
-            <a:endParaRPr lang="nb-NO" dirty="0"/>
+              <a:rPr lang="nb-NO" dirty="0" smtClean="0"/>
+              <a:t>Vant med CLI</a:t>
+            </a:r>
+          </a:p>
+          <a:p>
+            <a:r>
+              <a:rPr lang="nb-NO" dirty="0" smtClean="0"/>
+              <a:t>Litt </a:t>
+            </a:r>
+            <a:r>
+              <a:rPr lang="nb-NO" dirty="0" err="1" smtClean="0"/>
+              <a:t>Angular</a:t>
+            </a:r>
+            <a:r>
+              <a:rPr lang="nb-NO" dirty="0" smtClean="0"/>
+              <a:t> 2</a:t>
+            </a:r>
+          </a:p>
+          <a:p>
+            <a:r>
+              <a:rPr lang="nb-NO" dirty="0" smtClean="0"/>
+              <a:t>HTML, CSS, Typescript</a:t>
+            </a:r>
           </a:p>
         </p:txBody>
       </p:sp>
     </p:spTree>
     <p:extLst>
       <p:ext uri="{BB962C8B-B14F-4D97-AF65-F5344CB8AC3E}">
-        <p14:creationId xmlns:p14="http://schemas.microsoft.com/office/powerpoint/2010/main" val="868934036"/>
+        <p14:creationId xmlns:p14="http://schemas.microsoft.com/office/powerpoint/2010/main" val="1014503702"/>
       </p:ext>
     </p:extLst>
   </p:cSld>
@@ -4404,10 +5604,9 @@
           <a:lstStyle/>
           <a:p>
             <a:r>
-              <a:rPr lang="nb-NO" dirty="0" smtClean="0"/>
-              <a:t>Agenda	</a:t>
-            </a:r>
-            <a:endParaRPr lang="nb-NO" dirty="0"/>
+              <a:rPr lang="nb-NO" dirty="0"/>
+              <a:t>Mål	</a:t>
+            </a:r>
           </a:p>
         </p:txBody>
       </p:sp>
@@ -4421,98 +5620,47 @@
             <p:ph idx="1"/>
           </p:nvPr>
         </p:nvSpPr>
-        <p:spPr>
-          <a:xfrm>
-            <a:off x="838200" y="1817604"/>
-            <a:ext cx="10515600" cy="4351338"/>
-          </a:xfrm>
-        </p:spPr>
-        <p:txBody>
-          <a:bodyPr>
-            <a:normAutofit/>
-          </a:bodyPr>
+        <p:spPr/>
+        <p:txBody>
+          <a:bodyPr/>
           <a:lstStyle/>
           <a:p>
-            <a:r>
-              <a:rPr lang="nb-NO" dirty="0"/>
-              <a:t>Intro (slide)</a:t>
-            </a:r>
-          </a:p>
-          <a:p>
-            <a:pPr lvl="1"/>
-            <a:r>
-              <a:rPr lang="nb-NO" dirty="0"/>
-              <a:t>Forskjell mellom hybrid, native og progressive</a:t>
-            </a:r>
-          </a:p>
-          <a:p>
-            <a:pPr lvl="1"/>
             <a:r>
               <a:rPr lang="nb-NO" dirty="0"/>
               <a:t>Hva er </a:t>
             </a:r>
             <a:r>
               <a:rPr lang="nb-NO" dirty="0" err="1"/>
+              <a:t>Ionic</a:t>
+            </a:r>
+            <a:r>
+              <a:rPr lang="nb-NO" dirty="0"/>
+              <a:t>? </a:t>
+            </a:r>
+          </a:p>
+          <a:p>
+            <a:r>
+              <a:rPr lang="nb-NO" dirty="0"/>
+              <a:t>Et </a:t>
+            </a:r>
+            <a:r>
+              <a:rPr lang="nb-NO" dirty="0" err="1"/>
               <a:t>ionic</a:t>
             </a:r>
             <a:r>
               <a:rPr lang="nb-NO" dirty="0"/>
-              <a:t> 2</a:t>
-            </a:r>
-          </a:p>
-          <a:p>
+              <a:t> prosjekt fra nyoppretting til </a:t>
+            </a:r>
+            <a:r>
+              <a:rPr lang="nb-NO" dirty="0" err="1"/>
+              <a:t>release</a:t>
+            </a:r>
             <a:r>
               <a:rPr lang="nb-NO" dirty="0"/>
-              <a:t>Installasjon av avhengigheter</a:t>
-            </a:r>
-          </a:p>
-          <a:p>
-            <a:r>
-              <a:rPr lang="nb-NO" dirty="0"/>
-              <a:t>Testing/kjøring av </a:t>
-            </a:r>
-            <a:r>
-              <a:rPr lang="nb-NO" dirty="0" err="1"/>
-              <a:t>app</a:t>
-            </a:r>
-            <a:endParaRPr lang="nb-NO" dirty="0"/>
-          </a:p>
-          <a:p>
-            <a:r>
-              <a:rPr lang="nb-NO" dirty="0"/>
-              <a:t>Lage komponenter</a:t>
-            </a:r>
-          </a:p>
-          <a:p>
-            <a:r>
-              <a:rPr lang="nb-NO" dirty="0"/>
-              <a:t>Bruker </a:t>
-            </a:r>
-            <a:r>
-              <a:rPr lang="nb-NO" dirty="0" err="1"/>
-              <a:t>cordova</a:t>
-            </a:r>
-            <a:r>
-              <a:rPr lang="nb-NO" dirty="0"/>
-              <a:t> biblioteker</a:t>
-            </a:r>
-          </a:p>
-          <a:p>
-            <a:pPr marL="0" indent="0">
-              <a:buNone/>
-            </a:pPr>
-            <a:endParaRPr lang="nb-NO" dirty="0"/>
-          </a:p>
-          <a:p>
-            <a:pPr lvl="3"/>
-            <a:endParaRPr lang="nb-NO" dirty="0"/>
-          </a:p>
-          <a:p>
-            <a:pPr lvl="2"/>
-            <a:endParaRPr lang="nb-NO" dirty="0"/>
-          </a:p>
-          <a:p>
-            <a:pPr lvl="2"/>
+              <a:t>.</a:t>
+            </a:r>
+          </a:p>
+          <a:p>
             <a:endParaRPr lang="nb-NO" dirty="0"/>
           </a:p>
         </p:txBody>
@@ -4520,7 +5668,7 @@
     </p:spTree>
     <p:extLst>
       <p:ext uri="{BB962C8B-B14F-4D97-AF65-F5344CB8AC3E}">
-        <p14:creationId xmlns:p14="http://schemas.microsoft.com/office/powerpoint/2010/main" val="1911776863"/>
+        <p14:creationId xmlns:p14="http://schemas.microsoft.com/office/powerpoint/2010/main" val="868934036"/>
       </p:ext>
     </p:extLst>
   </p:cSld>
@@ -4563,8 +5711,8 @@
           <a:lstStyle/>
           <a:p>
             <a:r>
-              <a:rPr lang="nb-NO" dirty="0" err="1"/>
-              <a:t>Apputviklingsmetoder</a:t>
+              <a:rPr lang="nb-NO" dirty="0" smtClean="0"/>
+              <a:t>Agenda	</a:t>
             </a:r>
             <a:endParaRPr lang="nb-NO" dirty="0"/>
           </a:p>
@@ -4580,195 +5728,106 @@
             <p:ph idx="1"/>
           </p:nvPr>
         </p:nvSpPr>
-        <p:spPr/>
+        <p:spPr>
+          <a:xfrm>
+            <a:off x="838200" y="1817604"/>
+            <a:ext cx="10515600" cy="4351338"/>
+          </a:xfrm>
+        </p:spPr>
         <p:txBody>
           <a:bodyPr>
-            <a:normAutofit fontScale="55000" lnSpcReduction="20000"/>
+            <a:normAutofit/>
           </a:bodyPr>
           <a:lstStyle/>
           <a:p>
             <a:r>
               <a:rPr lang="nb-NO" dirty="0"/>
-              <a:t>Native</a:t>
+              <a:t>Intro (slide)</a:t>
             </a:r>
           </a:p>
           <a:p>
             <a:pPr lvl="1"/>
             <a:r>
               <a:rPr lang="nb-NO" dirty="0"/>
-              <a:t>IOS</a:t>
+              <a:t>Forskjell mellom hybrid, native og progressive</a:t>
             </a:r>
           </a:p>
           <a:p>
             <a:pPr lvl="1"/>
             <a:r>
+              <a:rPr lang="nb-NO" dirty="0"/>
+              <a:t>Hva er </a:t>
+            </a:r>
+            <a:r>
               <a:rPr lang="nb-NO" dirty="0" err="1"/>
-              <a:t>Android</a:t>
-            </a:r>
-            <a:endParaRPr lang="nb-NO" dirty="0"/>
-          </a:p>
-          <a:p>
-            <a:pPr lvl="1"/>
+              <a:t>ionic</a:t>
+            </a:r>
             <a:r>
               <a:rPr lang="nb-NO" dirty="0"/>
-              <a:t>Windows </a:t>
-            </a:r>
-            <a:r>
-              <a:rPr lang="nb-NO" dirty="0" err="1"/>
-              <a:t>phone</a:t>
-            </a:r>
-            <a:endParaRPr lang="nb-NO" dirty="0"/>
+              <a:t> 2</a:t>
+            </a:r>
           </a:p>
           <a:p>
             <a:r>
               <a:rPr lang="nb-NO" dirty="0"/>
-              <a:t>Hybrid</a:t>
-            </a:r>
-          </a:p>
-          <a:p>
-            <a:pPr lvl="1"/>
+              <a:t>Installasjon av avhengigheter</a:t>
+            </a:r>
+          </a:p>
+          <a:p>
             <a:r>
               <a:rPr lang="nb-NO" dirty="0"/>
-              <a:t>Kompilerer til flere enheter og vanligvis også web side.</a:t>
-            </a:r>
-          </a:p>
-          <a:p>
-            <a:pPr lvl="1"/>
-            <a:r>
-              <a:rPr lang="nb-NO" dirty="0"/>
-              <a:t>HTML og </a:t>
-            </a:r>
-            <a:r>
-              <a:rPr lang="nb-NO" dirty="0" err="1"/>
-              <a:t>javascript</a:t>
-            </a:r>
-            <a:endParaRPr lang="nb-NO" dirty="0"/>
-          </a:p>
-          <a:p>
-            <a:pPr lvl="2"/>
-            <a:r>
-              <a:rPr lang="nb-NO" dirty="0"/>
-              <a:t>Cordova</a:t>
-            </a:r>
-          </a:p>
-          <a:p>
-            <a:pPr lvl="2"/>
-            <a:r>
-              <a:rPr lang="nb-NO" dirty="0" err="1"/>
-              <a:t>Devextreme</a:t>
-            </a:r>
-            <a:endParaRPr lang="nb-NO" dirty="0"/>
-          </a:p>
-          <a:p>
-            <a:pPr lvl="2"/>
-            <a:r>
-              <a:rPr lang="nb-NO" dirty="0" err="1"/>
-              <a:t>Ionic</a:t>
-            </a:r>
-            <a:endParaRPr lang="nb-NO" dirty="0"/>
-          </a:p>
-          <a:p>
-            <a:pPr lvl="1"/>
-            <a:r>
-              <a:rPr lang="nb-NO" dirty="0"/>
-              <a:t>XAML og </a:t>
-            </a:r>
-            <a:r>
-              <a:rPr lang="nb-NO" dirty="0" err="1"/>
-              <a:t>javascript</a:t>
-            </a:r>
-            <a:endParaRPr lang="nb-NO" dirty="0"/>
-          </a:p>
-          <a:p>
-            <a:pPr lvl="2"/>
-            <a:r>
-              <a:rPr lang="nb-NO" dirty="0"/>
-              <a:t>Native script </a:t>
-            </a:r>
-          </a:p>
-          <a:p>
-            <a:pPr lvl="1"/>
-            <a:r>
-              <a:rPr lang="nb-NO" dirty="0"/>
-              <a:t>C#</a:t>
-            </a:r>
-          </a:p>
-          <a:p>
-            <a:pPr lvl="2"/>
-            <a:r>
-              <a:rPr lang="nb-NO" dirty="0" err="1"/>
-              <a:t>Xamarin</a:t>
-            </a:r>
-            <a:endParaRPr lang="nb-NO" dirty="0"/>
-          </a:p>
-          <a:p>
-            <a:pPr lvl="2"/>
-            <a:r>
-              <a:rPr lang="nb-NO" dirty="0" err="1"/>
-              <a:t>Unity</a:t>
-            </a:r>
-            <a:endParaRPr lang="nb-NO" dirty="0"/>
-          </a:p>
-          <a:p>
-            <a:r>
-              <a:rPr lang="nb-NO" dirty="0"/>
-              <a:t>Progressive Web </a:t>
-            </a:r>
-            <a:r>
-              <a:rPr lang="nb-NO" dirty="0" err="1"/>
-              <a:t>App</a:t>
-            </a:r>
-            <a:endParaRPr lang="nb-NO" dirty="0"/>
-          </a:p>
-          <a:p>
-            <a:pPr lvl="1"/>
-            <a:r>
-              <a:rPr lang="nb-NO" dirty="0"/>
-              <a:t>Web side</a:t>
-            </a:r>
-          </a:p>
-          <a:p>
-            <a:pPr lvl="1"/>
-            <a:r>
-              <a:rPr lang="nb-NO" dirty="0"/>
-              <a:t>Mobile-first</a:t>
-            </a:r>
-          </a:p>
-          <a:p>
-            <a:pPr lvl="1"/>
-            <a:r>
-              <a:rPr lang="nb-NO"/>
-              <a:t>Offline-first</a:t>
-            </a:r>
-            <a:endParaRPr lang="nb-NO" dirty="0"/>
-          </a:p>
-          <a:p>
-            <a:pPr lvl="1"/>
-            <a:r>
-              <a:rPr lang="nb-NO" dirty="0"/>
-              <a:t>Slipper å gå igjennom </a:t>
+              <a:t>Testing/kjøring av </a:t>
             </a:r>
             <a:r>
               <a:rPr lang="nb-NO" dirty="0" err="1"/>
               <a:t>app</a:t>
             </a:r>
+            <a:endParaRPr lang="nb-NO" dirty="0"/>
+          </a:p>
+          <a:p>
             <a:r>
               <a:rPr lang="nb-NO" dirty="0"/>
-              <a:t> store eller google play.</a:t>
-            </a:r>
-          </a:p>
-          <a:p>
-            <a:pPr marL="457200" lvl="1" indent="0">
+              <a:t>Lage komponenter</a:t>
+            </a:r>
+          </a:p>
+          <a:p>
+            <a:r>
+              <a:rPr lang="nb-NO" dirty="0"/>
+              <a:t>Bruker </a:t>
+            </a:r>
+            <a:r>
+              <a:rPr lang="nb-NO" dirty="0" err="1"/>
+              <a:t>cordova</a:t>
+            </a:r>
+            <a:r>
+              <a:rPr lang="nb-NO" dirty="0"/>
+              <a:t> biblioteker</a:t>
+            </a:r>
+          </a:p>
+          <a:p>
+            <a:pPr marL="0" indent="0">
               <a:buNone/>
             </a:pPr>
             <a:endParaRPr lang="nb-NO" dirty="0"/>
           </a:p>
+          <a:p>
+            <a:pPr lvl="3"/>
+            <a:endParaRPr lang="nb-NO" dirty="0"/>
+          </a:p>
+          <a:p>
+            <a:pPr lvl="2"/>
+            <a:endParaRPr lang="nb-NO" dirty="0"/>
+          </a:p>
+          <a:p>
+            <a:pPr lvl="2"/>
+            <a:endParaRPr lang="nb-NO" dirty="0"/>
+          </a:p>
         </p:txBody>
       </p:sp>
     </p:spTree>
     <p:extLst>
       <p:ext uri="{BB962C8B-B14F-4D97-AF65-F5344CB8AC3E}">
-        <p14:creationId xmlns:p14="http://schemas.microsoft.com/office/powerpoint/2010/main" val="1192827983"/>
+        <p14:creationId xmlns:p14="http://schemas.microsoft.com/office/powerpoint/2010/main" val="1911776863"/>
       </p:ext>
     </p:extLst>
   </p:cSld>
@@ -4830,52 +5889,185 @@
         </p:nvSpPr>
         <p:spPr/>
         <p:txBody>
-          <a:bodyPr/>
+          <a:bodyPr>
+            <a:normAutofit fontScale="55000" lnSpcReduction="20000"/>
+          </a:bodyPr>
           <a:lstStyle/>
           <a:p>
             <a:r>
               <a:rPr lang="nb-NO" dirty="0"/>
-              <a:t>Hva velger man?</a:t>
+              <a:t>Native</a:t>
             </a:r>
           </a:p>
           <a:p>
             <a:pPr lvl="1"/>
             <a:r>
               <a:rPr lang="nb-NO" dirty="0"/>
-              <a:t>Kommer helt </a:t>
-            </a:r>
-            <a:r>
-              <a:rPr lang="nb-NO" dirty="0" smtClean="0"/>
-              <a:t>an </a:t>
-            </a:r>
+              <a:t>IOS</a:t>
+            </a:r>
+          </a:p>
+          <a:p>
+            <a:pPr lvl="1"/>
+            <a:r>
+              <a:rPr lang="nb-NO" dirty="0" err="1"/>
+              <a:t>Android</a:t>
+            </a:r>
+            <a:endParaRPr lang="nb-NO" dirty="0"/>
+          </a:p>
+          <a:p>
+            <a:pPr lvl="1"/>
             <a:r>
               <a:rPr lang="nb-NO" dirty="0"/>
-              <a:t>på</a:t>
+              <a:t>Windows </a:t>
+            </a:r>
+            <a:r>
+              <a:rPr lang="nb-NO" dirty="0" err="1"/>
+              <a:t>phone</a:t>
+            </a:r>
+            <a:endParaRPr lang="nb-NO" dirty="0"/>
+          </a:p>
+          <a:p>
+            <a:r>
+              <a:rPr lang="nb-NO" dirty="0"/>
+              <a:t>Hybrid</a:t>
             </a:r>
           </a:p>
           <a:p>
             <a:pPr lvl="1"/>
             <a:r>
               <a:rPr lang="nb-NO" dirty="0"/>
-              <a:t>Hvis man vil være effektiv fra starten av</a:t>
-            </a:r>
+              <a:t>Kompilerer til flere enheter og vanligvis også web side.</a:t>
+            </a:r>
+          </a:p>
+          <a:p>
+            <a:pPr lvl="1"/>
+            <a:r>
+              <a:rPr lang="nb-NO" dirty="0"/>
+              <a:t>HTML og </a:t>
+            </a:r>
+            <a:r>
+              <a:rPr lang="nb-NO" dirty="0" err="1"/>
+              <a:t>javascript</a:t>
+            </a:r>
+            <a:endParaRPr lang="nb-NO" dirty="0"/>
           </a:p>
           <a:p>
             <a:pPr lvl="2"/>
             <a:r>
               <a:rPr lang="nb-NO" dirty="0"/>
-              <a:t>Velg det man er mest komfortabel med</a:t>
+              <a:t>Cordova</a:t>
             </a:r>
           </a:p>
           <a:p>
             <a:pPr lvl="2"/>
             <a:r>
+              <a:rPr lang="nb-NO" dirty="0" err="1"/>
+              <a:t>Devextreme</a:t>
+            </a:r>
+            <a:endParaRPr lang="nb-NO" dirty="0"/>
+          </a:p>
+          <a:p>
+            <a:pPr lvl="2"/>
+            <a:r>
+              <a:rPr lang="nb-NO" dirty="0" err="1"/>
+              <a:t>Ionic</a:t>
+            </a:r>
+            <a:endParaRPr lang="nb-NO" dirty="0"/>
+          </a:p>
+          <a:p>
+            <a:pPr lvl="1"/>
+            <a:r>
               <a:rPr lang="nb-NO" dirty="0"/>
-              <a:t>Hybrid rammeverk begynner å bli ganske så bra å emulere «native-følelsen»</a:t>
-            </a:r>
+              <a:t>XAML og </a:t>
+            </a:r>
+            <a:r>
+              <a:rPr lang="nb-NO" dirty="0" err="1"/>
+              <a:t>javascript</a:t>
+            </a:r>
+            <a:endParaRPr lang="nb-NO" dirty="0"/>
           </a:p>
           <a:p>
             <a:pPr lvl="2"/>
+            <a:r>
+              <a:rPr lang="nb-NO" dirty="0"/>
+              <a:t>Native script </a:t>
+            </a:r>
+          </a:p>
+          <a:p>
+            <a:pPr lvl="1"/>
+            <a:r>
+              <a:rPr lang="nb-NO" dirty="0"/>
+              <a:t>C#</a:t>
+            </a:r>
+          </a:p>
+          <a:p>
+            <a:pPr lvl="2"/>
+            <a:r>
+              <a:rPr lang="nb-NO" dirty="0" err="1"/>
+              <a:t>Xamarin</a:t>
+            </a:r>
+            <a:endParaRPr lang="nb-NO" dirty="0"/>
+          </a:p>
+          <a:p>
+            <a:pPr lvl="2"/>
+            <a:r>
+              <a:rPr lang="nb-NO" dirty="0" err="1"/>
+              <a:t>Unity</a:t>
+            </a:r>
+            <a:endParaRPr lang="nb-NO" dirty="0"/>
+          </a:p>
+          <a:p>
+            <a:r>
+              <a:rPr lang="nb-NO" dirty="0"/>
+              <a:t>Progressive Web </a:t>
+            </a:r>
+            <a:r>
+              <a:rPr lang="nb-NO" dirty="0" err="1"/>
+              <a:t>App</a:t>
+            </a:r>
+            <a:endParaRPr lang="nb-NO" dirty="0"/>
+          </a:p>
+          <a:p>
+            <a:pPr lvl="1"/>
+            <a:r>
+              <a:rPr lang="nb-NO" dirty="0"/>
+              <a:t>Web side</a:t>
+            </a:r>
+          </a:p>
+          <a:p>
+            <a:pPr lvl="1"/>
+            <a:r>
+              <a:rPr lang="nb-NO" dirty="0"/>
+              <a:t>Mobile-first</a:t>
+            </a:r>
+          </a:p>
+          <a:p>
+            <a:pPr lvl="1"/>
+            <a:r>
+              <a:rPr lang="nb-NO"/>
+              <a:t>Offline-first</a:t>
+            </a:r>
+            <a:endParaRPr lang="nb-NO" dirty="0"/>
+          </a:p>
+          <a:p>
+            <a:pPr lvl="1"/>
+            <a:r>
+              <a:rPr lang="nb-NO" dirty="0"/>
+              <a:t>Slipper å gå igjennom </a:t>
+            </a:r>
+            <a:r>
+              <a:rPr lang="nb-NO" dirty="0" err="1"/>
+              <a:t>app</a:t>
+            </a:r>
+            <a:r>
+              <a:rPr lang="nb-NO" dirty="0"/>
+              <a:t> store eller google play.</a:t>
+            </a:r>
+          </a:p>
+          <a:p>
+            <a:pPr marL="457200" lvl="1" indent="0">
+              <a:buNone/>
+            </a:pPr>
             <a:endParaRPr lang="nb-NO" dirty="0"/>
           </a:p>
         </p:txBody>
@@ -4883,7 +6075,7 @@
     </p:spTree>
     <p:extLst>
       <p:ext uri="{BB962C8B-B14F-4D97-AF65-F5344CB8AC3E}">
-        <p14:creationId xmlns:p14="http://schemas.microsoft.com/office/powerpoint/2010/main" val="516394409"/>
+        <p14:creationId xmlns:p14="http://schemas.microsoft.com/office/powerpoint/2010/main" val="1192827983"/>
       </p:ext>
     </p:extLst>
   </p:cSld>
@@ -4927,7 +6119,7 @@
           <a:p>
             <a:r>
               <a:rPr lang="nb-NO" dirty="0" err="1"/>
-              <a:t>Ionic</a:t>
+              <a:t>Apputviklingsmetoder</a:t>
             </a:r>
             <a:endParaRPr lang="nb-NO" dirty="0"/>
           </a:p>
@@ -4945,131 +6137,60 @@
         </p:nvSpPr>
         <p:spPr/>
         <p:txBody>
-          <a:bodyPr>
-            <a:normAutofit fontScale="92500" lnSpcReduction="20000"/>
-          </a:bodyPr>
+          <a:bodyPr/>
           <a:lstStyle/>
           <a:p>
             <a:r>
-              <a:rPr lang="nb-NO" dirty="0" err="1"/>
-              <a:t>Angular</a:t>
-            </a:r>
+              <a:rPr lang="nb-NO" dirty="0"/>
+              <a:t>Hva velger man?</a:t>
+            </a:r>
+          </a:p>
+          <a:p>
+            <a:pPr lvl="1"/>
+            <a:r>
+              <a:rPr lang="nb-NO" dirty="0"/>
+              <a:t>Kommer helt </a:t>
+            </a:r>
+            <a:r>
+              <a:rPr lang="nb-NO" dirty="0" smtClean="0"/>
+              <a:t>an </a:t>
+            </a:r>
+            <a:r>
+              <a:rPr lang="nb-NO" dirty="0"/>
+              <a:t>på</a:t>
+            </a:r>
+          </a:p>
+          <a:p>
+            <a:pPr lvl="1"/>
+            <a:r>
+              <a:rPr lang="nb-NO" dirty="0"/>
+              <a:t>Hvis man vil være effektiv fra starten av</a:t>
+            </a:r>
+          </a:p>
+          <a:p>
+            <a:pPr lvl="2"/>
+            <a:r>
+              <a:rPr lang="nb-NO" dirty="0"/>
+              <a:t>Velg det man er mest komfortabel med</a:t>
+            </a:r>
+          </a:p>
+          <a:p>
+            <a:pPr lvl="2"/>
+            <a:r>
+              <a:rPr lang="nb-NO" dirty="0"/>
+              <a:t>Hybrid rammeverk begynner å bli ganske så bra å emulere «native-følelsen»</a:t>
+            </a:r>
+          </a:p>
+          <a:p>
+            <a:pPr lvl="2"/>
             <a:endParaRPr lang="nb-NO" dirty="0"/>
-          </a:p>
-          <a:p>
-            <a:pPr lvl="1"/>
-            <a:r>
-              <a:rPr lang="nb-NO" dirty="0"/>
-              <a:t>HTML og typescript (</a:t>
-            </a:r>
-            <a:r>
-              <a:rPr lang="nb-NO" dirty="0" err="1"/>
-              <a:t>javascript</a:t>
-            </a:r>
-            <a:r>
-              <a:rPr lang="nb-NO" dirty="0"/>
-              <a:t>)</a:t>
-            </a:r>
-          </a:p>
-          <a:p>
-            <a:r>
-              <a:rPr lang="nb-NO" dirty="0"/>
-              <a:t>Cordova</a:t>
-            </a:r>
-          </a:p>
-          <a:p>
-            <a:pPr lvl="1"/>
-            <a:r>
-              <a:rPr lang="nb-NO" dirty="0"/>
-              <a:t>Integrering med native funksjonalitet</a:t>
-            </a:r>
-          </a:p>
-          <a:p>
-            <a:r>
-              <a:rPr lang="nb-NO" dirty="0"/>
-              <a:t>Open </a:t>
-            </a:r>
-            <a:r>
-              <a:rPr lang="nb-NO" dirty="0" err="1"/>
-              <a:t>source</a:t>
-            </a:r>
-            <a:endParaRPr lang="nb-NO" dirty="0"/>
-          </a:p>
-          <a:p>
-            <a:r>
-              <a:rPr lang="nb-NO" dirty="0"/>
-              <a:t>Tjenester</a:t>
-            </a:r>
-          </a:p>
-          <a:p>
-            <a:pPr lvl="1"/>
-            <a:r>
-              <a:rPr lang="nb-NO" dirty="0" err="1"/>
-              <a:t>Cloud</a:t>
-            </a:r>
-            <a:endParaRPr lang="nb-NO" dirty="0"/>
-          </a:p>
-          <a:p>
-            <a:pPr lvl="2"/>
-            <a:r>
-              <a:rPr lang="nb-NO" dirty="0" err="1"/>
-              <a:t>Package</a:t>
-            </a:r>
-            <a:endParaRPr lang="nb-NO" dirty="0"/>
-          </a:p>
-          <a:p>
-            <a:pPr lvl="2"/>
-            <a:r>
-              <a:rPr lang="nb-NO" dirty="0"/>
-              <a:t>Hot </a:t>
-            </a:r>
-            <a:r>
-              <a:rPr lang="nb-NO" dirty="0" err="1"/>
-              <a:t>deploy</a:t>
-            </a:r>
-            <a:endParaRPr lang="nb-NO" dirty="0"/>
-          </a:p>
-          <a:p>
-            <a:pPr lvl="2"/>
-            <a:r>
-              <a:rPr lang="nb-NO" dirty="0"/>
-              <a:t>Push </a:t>
-            </a:r>
-            <a:r>
-              <a:rPr lang="nb-NO" dirty="0" err="1"/>
-              <a:t>notifications</a:t>
-            </a:r>
-            <a:endParaRPr lang="nb-NO" dirty="0"/>
-          </a:p>
-          <a:p>
-            <a:pPr lvl="1"/>
-            <a:r>
-              <a:rPr lang="nb-NO" dirty="0" err="1"/>
-              <a:t>View</a:t>
-            </a:r>
-            <a:endParaRPr lang="nb-NO" dirty="0"/>
-          </a:p>
-          <a:p>
-            <a:pPr lvl="1"/>
-            <a:r>
-              <a:rPr lang="nb-NO" dirty="0" err="1"/>
-              <a:t>Creator</a:t>
-            </a:r>
-            <a:endParaRPr lang="nb-NO" dirty="0"/>
-          </a:p>
-          <a:p>
-            <a:pPr lvl="1"/>
-            <a:r>
-              <a:rPr lang="nb-NO" dirty="0"/>
-              <a:t>CLI</a:t>
-            </a:r>
           </a:p>
         </p:txBody>
       </p:sp>
     </p:spTree>
     <p:extLst>
       <p:ext uri="{BB962C8B-B14F-4D97-AF65-F5344CB8AC3E}">
-        <p14:creationId xmlns:p14="http://schemas.microsoft.com/office/powerpoint/2010/main" val="127093691"/>
+        <p14:creationId xmlns:p14="http://schemas.microsoft.com/office/powerpoint/2010/main" val="516394409"/>
       </p:ext>
     </p:extLst>
   </p:cSld>
@@ -5112,8 +6233,8 @@
           <a:lstStyle/>
           <a:p>
             <a:r>
-              <a:rPr lang="nb-NO" dirty="0" smtClean="0"/>
-              <a:t>Installering av avhengigheter</a:t>
+              <a:rPr lang="nb-NO" dirty="0" err="1"/>
+              <a:t>Ionic</a:t>
             </a:r>
             <a:endParaRPr lang="nb-NO" dirty="0"/>
           </a:p>
@@ -5132,151 +6253,130 @@
         <p:spPr/>
         <p:txBody>
           <a:bodyPr>
-            <a:normAutofit fontScale="85000" lnSpcReduction="20000"/>
+            <a:normAutofit fontScale="92500" lnSpcReduction="20000"/>
           </a:bodyPr>
           <a:lstStyle/>
           <a:p>
             <a:r>
-              <a:rPr lang="nb-NO" dirty="0" smtClean="0"/>
-              <a:t>CLI og </a:t>
-            </a:r>
-            <a:r>
-              <a:rPr lang="nb-NO" dirty="0" err="1" smtClean="0"/>
-              <a:t>cordova</a:t>
-            </a:r>
-            <a:r>
-              <a:rPr lang="nb-NO" dirty="0" smtClean="0"/>
-              <a:t> </a:t>
-            </a:r>
+              <a:rPr lang="nb-NO" dirty="0" err="1"/>
+              <a:t>Angular</a:t>
+            </a:r>
+            <a:endParaRPr lang="nb-NO" dirty="0"/>
           </a:p>
           <a:p>
             <a:pPr lvl="1"/>
             <a:r>
-              <a:rPr lang="nb-NO" dirty="0" err="1" smtClean="0"/>
-              <a:t>npm</a:t>
-            </a:r>
-            <a:r>
-              <a:rPr lang="nb-NO" dirty="0" smtClean="0"/>
-              <a:t> </a:t>
-            </a:r>
-            <a:r>
-              <a:rPr lang="nb-NO" dirty="0" err="1" smtClean="0"/>
-              <a:t>install</a:t>
-            </a:r>
-            <a:r>
-              <a:rPr lang="nb-NO" dirty="0" smtClean="0"/>
-              <a:t> –g </a:t>
-            </a:r>
-            <a:r>
-              <a:rPr lang="nb-NO" dirty="0" err="1" smtClean="0"/>
-              <a:t>ionic</a:t>
-            </a:r>
-            <a:r>
-              <a:rPr lang="nb-NO" dirty="0" smtClean="0"/>
-              <a:t> </a:t>
-            </a:r>
-            <a:r>
-              <a:rPr lang="nb-NO" dirty="0" err="1" smtClean="0"/>
-              <a:t>cordova</a:t>
-            </a:r>
-            <a:endParaRPr lang="nb-NO" dirty="0" smtClean="0"/>
-          </a:p>
-          <a:p>
-            <a:endParaRPr lang="nb-NO" dirty="0" smtClean="0"/>
-          </a:p>
-          <a:p>
-            <a:r>
-              <a:rPr lang="nb-NO" dirty="0" smtClean="0"/>
-              <a:t>Lag prosjektmappe</a:t>
+              <a:rPr lang="nb-NO" dirty="0"/>
+              <a:t>HTML og typescript (</a:t>
+            </a:r>
+            <a:r>
+              <a:rPr lang="nb-NO" dirty="0" err="1"/>
+              <a:t>javascript</a:t>
+            </a:r>
+            <a:r>
+              <a:rPr lang="nb-NO" dirty="0"/>
+              <a:t>)</a:t>
+            </a:r>
+          </a:p>
+          <a:p>
+            <a:r>
+              <a:rPr lang="nb-NO" dirty="0"/>
+              <a:t>Cordova</a:t>
             </a:r>
           </a:p>
           <a:p>
             <a:pPr lvl="1"/>
             <a:r>
-              <a:rPr lang="nb-NO" dirty="0" smtClean="0"/>
-              <a:t>Gå til </a:t>
-            </a:r>
-            <a:r>
-              <a:rPr lang="nb-NO" dirty="0" err="1" smtClean="0"/>
-              <a:t>path</a:t>
-            </a:r>
-            <a:r>
-              <a:rPr lang="nb-NO" dirty="0" smtClean="0"/>
-              <a:t> der mappen skal ligge</a:t>
+              <a:rPr lang="nb-NO" dirty="0"/>
+              <a:t>Integrering med native funksjonalitet</a:t>
+            </a:r>
+          </a:p>
+          <a:p>
+            <a:r>
+              <a:rPr lang="nb-NO" dirty="0"/>
+              <a:t>Open </a:t>
+            </a:r>
+            <a:r>
+              <a:rPr lang="nb-NO" dirty="0" err="1"/>
+              <a:t>source</a:t>
+            </a:r>
+            <a:endParaRPr lang="nb-NO" dirty="0"/>
+          </a:p>
+          <a:p>
+            <a:r>
+              <a:rPr lang="nb-NO" dirty="0"/>
+              <a:t>Tjenester</a:t>
             </a:r>
           </a:p>
           <a:p>
             <a:pPr lvl="1"/>
             <a:r>
-              <a:rPr lang="nb-NO" dirty="0" err="1" smtClean="0"/>
-              <a:t>ionic</a:t>
-            </a:r>
-            <a:r>
-              <a:rPr lang="nb-NO" dirty="0" smtClean="0"/>
-              <a:t> start [NAVNPÅPROSJEKT] --v2</a:t>
-            </a:r>
-          </a:p>
-          <a:p>
-            <a:endParaRPr lang="nb-NO" dirty="0" smtClean="0"/>
-          </a:p>
-          <a:p>
-            <a:r>
-              <a:rPr lang="nb-NO" dirty="0" smtClean="0"/>
-              <a:t>Kjør prosjektet</a:t>
-            </a:r>
+              <a:rPr lang="nb-NO" dirty="0" err="1"/>
+              <a:t>Cloud</a:t>
+            </a:r>
+            <a:endParaRPr lang="nb-NO" dirty="0"/>
+          </a:p>
+          <a:p>
+            <a:pPr lvl="2"/>
+            <a:r>
+              <a:rPr lang="nb-NO" dirty="0" err="1"/>
+              <a:t>Package</a:t>
+            </a:r>
+            <a:endParaRPr lang="nb-NO" dirty="0"/>
+          </a:p>
+          <a:p>
+            <a:pPr lvl="2"/>
+            <a:r>
+              <a:rPr lang="nb-NO" dirty="0"/>
+              <a:t>Hot </a:t>
+            </a:r>
+            <a:r>
+              <a:rPr lang="nb-NO" dirty="0" err="1"/>
+              <a:t>deploy</a:t>
+            </a:r>
+            <a:endParaRPr lang="nb-NO" dirty="0"/>
+          </a:p>
+          <a:p>
+            <a:pPr lvl="2"/>
+            <a:r>
+              <a:rPr lang="nb-NO" dirty="0"/>
+              <a:t>Push </a:t>
+            </a:r>
+            <a:r>
+              <a:rPr lang="nb-NO" dirty="0" err="1"/>
+              <a:t>notifications</a:t>
+            </a:r>
+            <a:endParaRPr lang="nb-NO" dirty="0"/>
           </a:p>
           <a:p>
             <a:pPr lvl="1"/>
             <a:r>
-              <a:rPr lang="nb-NO" dirty="0" smtClean="0"/>
-              <a:t>cd [NAVNPÅPROSJEKT]</a:t>
-            </a:r>
+              <a:rPr lang="nb-NO" dirty="0" err="1"/>
+              <a:t>View</a:t>
+            </a:r>
+            <a:endParaRPr lang="nb-NO" dirty="0"/>
           </a:p>
           <a:p>
             <a:pPr lvl="1"/>
             <a:r>
-              <a:rPr lang="nb-NO" dirty="0" err="1" smtClean="0"/>
-              <a:t>ionic</a:t>
-            </a:r>
-            <a:r>
-              <a:rPr lang="nb-NO" dirty="0" smtClean="0"/>
-              <a:t> serve</a:t>
-            </a:r>
+              <a:rPr lang="nb-NO" dirty="0" err="1"/>
+              <a:t>Creator</a:t>
+            </a:r>
+            <a:endParaRPr lang="nb-NO" dirty="0"/>
           </a:p>
           <a:p>
             <a:pPr lvl="1"/>
-            <a:endParaRPr lang="nb-NO" dirty="0"/>
-          </a:p>
-          <a:p>
-            <a:pPr marL="0" indent="0">
-              <a:buNone/>
-            </a:pPr>
-            <a:endParaRPr lang="nb-NO" dirty="0">
-              <a:hlinkClick r:id="rId2"/>
-            </a:endParaRPr>
-          </a:p>
-          <a:p>
-            <a:pPr marL="0" indent="0">
-              <a:buNone/>
-            </a:pPr>
-            <a:r>
-              <a:rPr lang="nb-NO" dirty="0" smtClean="0">
-                <a:hlinkClick r:id="rId2"/>
-              </a:rPr>
-              <a:t>http://ionicframework.com/docs/v2/intro/installation/</a:t>
-            </a:r>
-            <a:r>
-              <a:rPr lang="nb-NO" dirty="0" smtClean="0"/>
-              <a:t> </a:t>
-            </a:r>
-            <a:endParaRPr lang="nb-NO" dirty="0"/>
+            <a:r>
+              <a:rPr lang="nb-NO" dirty="0"/>
+              <a:t>CLI</a:t>
+            </a:r>
           </a:p>
         </p:txBody>
       </p:sp>
     </p:spTree>
     <p:extLst>
       <p:ext uri="{BB962C8B-B14F-4D97-AF65-F5344CB8AC3E}">
-        <p14:creationId xmlns:p14="http://schemas.microsoft.com/office/powerpoint/2010/main" val="3646939"/>
+        <p14:creationId xmlns:p14="http://schemas.microsoft.com/office/powerpoint/2010/main" val="127093691"/>
       </p:ext>
     </p:extLst>
   </p:cSld>
@@ -5320,7 +6420,7 @@
           <a:p>
             <a:r>
               <a:rPr lang="nb-NO" dirty="0" smtClean="0"/>
-              <a:t>Oppgave 1		</a:t>
+              <a:t>Installering av avhengigheter</a:t>
             </a:r>
             <a:endParaRPr lang="nb-NO" dirty="0"/>
           </a:p>
@@ -5338,12 +6438,41 @@
         </p:nvSpPr>
         <p:spPr/>
         <p:txBody>
-          <a:bodyPr/>
+          <a:bodyPr>
+            <a:normAutofit fontScale="85000" lnSpcReduction="20000"/>
+          </a:bodyPr>
           <a:lstStyle/>
           <a:p>
             <a:r>
               <a:rPr lang="nb-NO" dirty="0" smtClean="0"/>
-              <a:t>Installer </a:t>
+              <a:t>CLI og </a:t>
+            </a:r>
+            <a:r>
+              <a:rPr lang="nb-NO" dirty="0" err="1" smtClean="0"/>
+              <a:t>cordova</a:t>
+            </a:r>
+            <a:r>
+              <a:rPr lang="nb-NO" dirty="0" smtClean="0"/>
+              <a:t> </a:t>
+            </a:r>
+          </a:p>
+          <a:p>
+            <a:pPr lvl="1"/>
+            <a:r>
+              <a:rPr lang="nb-NO" dirty="0" err="1" smtClean="0"/>
+              <a:t>npm</a:t>
+            </a:r>
+            <a:r>
+              <a:rPr lang="nb-NO" dirty="0" smtClean="0"/>
+              <a:t> </a:t>
+            </a:r>
+            <a:r>
+              <a:rPr lang="nb-NO" dirty="0" err="1" smtClean="0"/>
+              <a:t>install</a:t>
+            </a:r>
+            <a:r>
+              <a:rPr lang="nb-NO" dirty="0" smtClean="0"/>
+              <a:t> –g </a:t>
             </a:r>
             <a:r>
               <a:rPr lang="nb-NO" dirty="0" err="1" smtClean="0"/>
@@ -5351,41 +6480,125 @@
             </a:r>
             <a:r>
               <a:rPr lang="nb-NO" dirty="0" smtClean="0"/>
-              <a:t> 2</a:t>
-            </a:r>
-          </a:p>
-          <a:p>
-            <a:r>
-              <a:rPr lang="nb-NO" dirty="0" smtClean="0"/>
-              <a:t>Opprett et nytt prosjekt</a:t>
+              <a:t> </a:t>
+            </a:r>
+            <a:r>
+              <a:rPr lang="nb-NO" dirty="0" err="1" smtClean="0"/>
+              <a:t>cordova</a:t>
+            </a:r>
+            <a:endParaRPr lang="nb-NO" dirty="0" smtClean="0"/>
+          </a:p>
+          <a:p>
+            <a:endParaRPr lang="nb-NO" dirty="0" smtClean="0"/>
+          </a:p>
+          <a:p>
+            <a:r>
+              <a:rPr lang="nb-NO" dirty="0" smtClean="0"/>
+              <a:t>Lag prosjektmappe</a:t>
             </a:r>
           </a:p>
           <a:p>
             <a:pPr lvl="1"/>
             <a:r>
               <a:rPr lang="nb-NO" dirty="0" smtClean="0"/>
-              <a:t>Bruk navn [NAVN ?]</a:t>
-            </a:r>
-          </a:p>
-          <a:p>
-            <a:r>
-              <a:rPr lang="nb-NO" dirty="0" smtClean="0"/>
-              <a:t>Kjør prosjektet</a:t>
+              <a:t>Gå til </a:t>
+            </a:r>
+            <a:r>
+              <a:rPr lang="nb-NO" dirty="0" err="1" smtClean="0"/>
+              <a:t>path</a:t>
+            </a:r>
+            <a:r>
+              <a:rPr lang="nb-NO" dirty="0" smtClean="0"/>
+              <a:t> der mappen skal ligge</a:t>
             </a:r>
           </a:p>
           <a:p>
             <a:pPr lvl="1"/>
-            <a:r>
-              <a:rPr lang="nb-NO" dirty="0" smtClean="0"/>
-              <a:t>Prøv </a:t>
-            </a:r>
             <a:r>
               <a:rPr lang="nb-NO" dirty="0" err="1" smtClean="0"/>
               <a:t>ionic</a:t>
             </a:r>
             <a:r>
               <a:rPr lang="nb-NO" dirty="0" smtClean="0"/>
-              <a:t> serve --lab</a:t>
+              <a:t> start [NAVNPÅPROSJEKT] --v2  </a:t>
+            </a:r>
+            <a:r>
+              <a:rPr lang="nb-NO" dirty="0" smtClean="0">
+                <a:solidFill>
+                  <a:schemeClr val="tx1"/>
+                </a:solidFill>
+              </a:rPr>
+              <a:t>--</a:t>
+            </a:r>
+            <a:r>
+              <a:rPr lang="nb-NO" dirty="0" err="1" smtClean="0">
+                <a:solidFill>
+                  <a:schemeClr val="tx1"/>
+                </a:solidFill>
+              </a:rPr>
+              <a:t>template</a:t>
+            </a:r>
+            <a:r>
+              <a:rPr lang="nb-NO" dirty="0" smtClean="0">
+                <a:solidFill>
+                  <a:schemeClr val="tx1"/>
+                </a:solidFill>
+              </a:rPr>
+              <a:t> blank</a:t>
+            </a:r>
+          </a:p>
+          <a:p>
+            <a:endParaRPr lang="nb-NO" dirty="0" smtClean="0"/>
+          </a:p>
+          <a:p>
+            <a:r>
+              <a:rPr lang="nb-NO" dirty="0" smtClean="0"/>
+              <a:t>Kjør prosjektet</a:t>
+            </a:r>
+          </a:p>
+          <a:p>
+            <a:pPr lvl="1"/>
+            <a:r>
+              <a:rPr lang="nb-NO" dirty="0" smtClean="0"/>
+              <a:t>cd [NAVNPÅPROSJEKT]</a:t>
+            </a:r>
+          </a:p>
+          <a:p>
+            <a:pPr lvl="1"/>
+            <a:r>
+              <a:rPr lang="nb-NO" dirty="0" err="1" smtClean="0"/>
+              <a:t>ionic</a:t>
+            </a:r>
+            <a:r>
+              <a:rPr lang="nb-NO" dirty="0" smtClean="0"/>
+              <a:t> serve</a:t>
+            </a:r>
+          </a:p>
+          <a:p>
+            <a:pPr lvl="1"/>
+            <a:endParaRPr lang="nb-NO" dirty="0"/>
+          </a:p>
+          <a:p>
+            <a:pPr marL="0" indent="0">
+              <a:buNone/>
+            </a:pPr>
+            <a:endParaRPr lang="nb-NO" dirty="0">
+              <a:hlinkClick r:id="rId2"/>
+            </a:endParaRPr>
+          </a:p>
+          <a:p>
+            <a:pPr marL="0" indent="0">
+              <a:buNone/>
+            </a:pPr>
+            <a:r>
+              <a:rPr lang="nb-NO" dirty="0" smtClean="0">
+                <a:hlinkClick r:id="rId2"/>
+              </a:rPr>
+              <a:t>http://ionicframework.com/docs/v2/intro/installation/</a:t>
+            </a:r>
+            <a:r>
+              <a:rPr lang="nb-NO" dirty="0" smtClean="0"/>
+              <a:t> </a:t>
             </a:r>
             <a:endParaRPr lang="nb-NO" dirty="0"/>
           </a:p>
@@ -5394,20 +6607,13 @@
     </p:spTree>
     <p:extLst>
       <p:ext uri="{BB962C8B-B14F-4D97-AF65-F5344CB8AC3E}">
-        <p14:creationId xmlns:p14="http://schemas.microsoft.com/office/powerpoint/2010/main" val="808542648"/>
+        <p14:creationId xmlns:p14="http://schemas.microsoft.com/office/powerpoint/2010/main" val="3646939"/>
       </p:ext>
     </p:extLst>
   </p:cSld>
   <p:clrMapOvr>
     <a:masterClrMapping/>
   </p:clrMapOvr>
-  <p:timing>
-    <p:tnLst>
-      <p:par>
-        <p:cTn id="1" dur="indefinite" restart="never" nodeType="tmRoot"/>
-      </p:par>
-    </p:tnLst>
-  </p:timing>
 </p:sld>
 </file>
 

</xml_diff>

<commit_message>
lagt til oppgave 4
</commit_message>
<xml_diff>
--- a/Ionic 2 workshop/Ionic 2 workshop.pptx
+++ b/Ionic 2 workshop/Ionic 2 workshop.pptx
@@ -212,7 +212,7 @@
           <a:p>
             <a:fld id="{A5543B18-9950-4402-830C-70DFF55A9D6A}" type="datetimeFigureOut">
               <a:rPr lang="nb-NO" smtClean="0"/>
-              <a:t>02.03.2017</a:t>
+              <a:t>06.03.2017</a:t>
             </a:fld>
             <a:endParaRPr lang="nb-NO"/>
           </a:p>
@@ -690,6 +690,104 @@
           <a:p>
             <a:r>
               <a:rPr lang="nb-NO" dirty="0" smtClean="0"/>
+              <a:t>Hva er en </a:t>
+            </a:r>
+            <a:r>
+              <a:rPr lang="nb-NO" dirty="0" err="1" smtClean="0"/>
+              <a:t>webkomponent</a:t>
+            </a:r>
+            <a:r>
+              <a:rPr lang="nb-NO" dirty="0" smtClean="0"/>
+              <a:t>?</a:t>
+            </a:r>
+          </a:p>
+          <a:p>
+            <a:endParaRPr lang="nb-NO" dirty="0"/>
+          </a:p>
+        </p:txBody>
+      </p:sp>
+      <p:sp>
+        <p:nvSpPr>
+          <p:cNvPr id="4" name="Plassholder for lysbildenummer 3"/>
+          <p:cNvSpPr>
+            <a:spLocks noGrp="1"/>
+          </p:cNvSpPr>
+          <p:nvPr>
+            <p:ph type="sldNum" sz="quarter" idx="10"/>
+          </p:nvPr>
+        </p:nvSpPr>
+        <p:spPr/>
+        <p:txBody>
+          <a:bodyPr/>
+          <a:lstStyle/>
+          <a:p>
+            <a:fld id="{6BEA58FB-0425-4043-8123-60513F4596AE}" type="slidenum">
+              <a:rPr lang="nb-NO" smtClean="0"/>
+              <a:t>14</a:t>
+            </a:fld>
+            <a:endParaRPr lang="nb-NO"/>
+          </a:p>
+        </p:txBody>
+      </p:sp>
+    </p:spTree>
+    <p:extLst>
+      <p:ext uri="{BB962C8B-B14F-4D97-AF65-F5344CB8AC3E}">
+        <p14:creationId xmlns:p14="http://schemas.microsoft.com/office/powerpoint/2010/main" val="2270801068"/>
+      </p:ext>
+    </p:extLst>
+  </p:cSld>
+  <p:clrMapOvr>
+    <a:masterClrMapping/>
+  </p:clrMapOvr>
+</p:notes>
+</file>
+
+<file path=ppt/notesSlides/notesSlide3.xml><?xml version="1.0" encoding="utf-8"?>
+<p:notes xmlns:a="http://schemas.openxmlformats.org/drawingml/2006/main" xmlns:r="http://schemas.openxmlformats.org/officeDocument/2006/relationships" xmlns:p="http://schemas.openxmlformats.org/presentationml/2006/main">
+  <p:cSld>
+    <p:spTree>
+      <p:nvGrpSpPr>
+        <p:cNvPr id="1" name=""/>
+        <p:cNvGrpSpPr/>
+        <p:nvPr/>
+      </p:nvGrpSpPr>
+      <p:grpSpPr>
+        <a:xfrm>
+          <a:off x="0" y="0"/>
+          <a:ext cx="0" cy="0"/>
+          <a:chOff x="0" y="0"/>
+          <a:chExt cx="0" cy="0"/>
+        </a:xfrm>
+      </p:grpSpPr>
+      <p:sp>
+        <p:nvSpPr>
+          <p:cNvPr id="2" name="Plassholder for lysbilde 1"/>
+          <p:cNvSpPr>
+            <a:spLocks noGrp="1" noRot="1" noChangeAspect="1"/>
+          </p:cNvSpPr>
+          <p:nvPr>
+            <p:ph type="sldImg"/>
+          </p:nvPr>
+        </p:nvSpPr>
+        <p:spPr/>
+      </p:sp>
+      <p:sp>
+        <p:nvSpPr>
+          <p:cNvPr id="3" name="Plassholder for notater 2"/>
+          <p:cNvSpPr>
+            <a:spLocks noGrp="1"/>
+          </p:cNvSpPr>
+          <p:nvPr>
+            <p:ph type="body" idx="1"/>
+          </p:nvPr>
+        </p:nvSpPr>
+        <p:spPr/>
+        <p:txBody>
+          <a:bodyPr/>
+          <a:lstStyle/>
+          <a:p>
+            <a:r>
+              <a:rPr lang="nb-NO" dirty="0" smtClean="0"/>
               <a:t>Fasit</a:t>
             </a:r>
           </a:p>
@@ -747,7 +845,6 @@
               <a:rPr lang="nb-NO" baseline="0" dirty="0" smtClean="0"/>
               <a:t>Content:</a:t>
             </a:r>
-            <a:endParaRPr lang="nb-NO" baseline="0" dirty="0" smtClean="0"/>
           </a:p>
           <a:p>
             <a:r>
@@ -1164,7 +1261,7 @@
           <a:p>
             <a:fld id="{952976F7-1A1B-47BF-994D-21B9772F57A5}" type="datetimeFigureOut">
               <a:rPr lang="nb-NO" smtClean="0"/>
-              <a:t>02.03.2017</a:t>
+              <a:t>06.03.2017</a:t>
             </a:fld>
             <a:endParaRPr lang="nb-NO"/>
           </a:p>
@@ -1547,7 +1644,7 @@
           <a:p>
             <a:fld id="{952976F7-1A1B-47BF-994D-21B9772F57A5}" type="datetimeFigureOut">
               <a:rPr lang="nb-NO" smtClean="0"/>
-              <a:t>02.03.2017</a:t>
+              <a:t>06.03.2017</a:t>
             </a:fld>
             <a:endParaRPr lang="nb-NO"/>
           </a:p>
@@ -1819,7 +1916,7 @@
           <a:p>
             <a:fld id="{952976F7-1A1B-47BF-994D-21B9772F57A5}" type="datetimeFigureOut">
               <a:rPr lang="nb-NO" smtClean="0"/>
-              <a:t>02.03.2017</a:t>
+              <a:t>06.03.2017</a:t>
             </a:fld>
             <a:endParaRPr lang="nb-NO"/>
           </a:p>
@@ -2077,7 +2174,7 @@
           <a:p>
             <a:fld id="{952976F7-1A1B-47BF-994D-21B9772F57A5}" type="datetimeFigureOut">
               <a:rPr lang="nb-NO" smtClean="0"/>
-              <a:t>02.03.2017</a:t>
+              <a:t>06.03.2017</a:t>
             </a:fld>
             <a:endParaRPr lang="nb-NO"/>
           </a:p>
@@ -2482,7 +2579,7 @@
           <a:p>
             <a:fld id="{952976F7-1A1B-47BF-994D-21B9772F57A5}" type="datetimeFigureOut">
               <a:rPr lang="nb-NO" smtClean="0"/>
-              <a:t>02.03.2017</a:t>
+              <a:t>06.03.2017</a:t>
             </a:fld>
             <a:endParaRPr lang="nb-NO"/>
           </a:p>
@@ -2626,7 +2723,7 @@
           <a:p>
             <a:fld id="{952976F7-1A1B-47BF-994D-21B9772F57A5}" type="datetimeFigureOut">
               <a:rPr lang="nb-NO" smtClean="0"/>
-              <a:t>02.03.2017</a:t>
+              <a:t>06.03.2017</a:t>
             </a:fld>
             <a:endParaRPr lang="nb-NO"/>
           </a:p>
@@ -2747,7 +2844,7 @@
           <a:p>
             <a:fld id="{952976F7-1A1B-47BF-994D-21B9772F57A5}" type="datetimeFigureOut">
               <a:rPr lang="nb-NO" smtClean="0"/>
-              <a:t>02.03.2017</a:t>
+              <a:t>06.03.2017</a:t>
             </a:fld>
             <a:endParaRPr lang="nb-NO"/>
           </a:p>
@@ -3050,7 +3147,7 @@
           <a:p>
             <a:fld id="{952976F7-1A1B-47BF-994D-21B9772F57A5}" type="datetimeFigureOut">
               <a:rPr lang="nb-NO" smtClean="0"/>
-              <a:t>02.03.2017</a:t>
+              <a:t>06.03.2017</a:t>
             </a:fld>
             <a:endParaRPr lang="nb-NO"/>
           </a:p>
@@ -3333,7 +3430,7 @@
           <a:p>
             <a:fld id="{952976F7-1A1B-47BF-994D-21B9772F57A5}" type="datetimeFigureOut">
               <a:rPr lang="nb-NO" smtClean="0"/>
-              <a:t>02.03.2017</a:t>
+              <a:t>06.03.2017</a:t>
             </a:fld>
             <a:endParaRPr lang="nb-NO"/>
           </a:p>
@@ -3675,7 +3772,7 @@
           <a:p>
             <a:fld id="{952976F7-1A1B-47BF-994D-21B9772F57A5}" type="datetimeFigureOut">
               <a:rPr lang="nb-NO" smtClean="0"/>
-              <a:t>02.03.2017</a:t>
+              <a:t>06.03.2017</a:t>
             </a:fld>
             <a:endParaRPr lang="nb-NO"/>
           </a:p>
@@ -4222,7 +4319,87 @@
               <a:rPr lang="nb-NO" dirty="0" smtClean="0"/>
               <a:t>.</a:t>
             </a:r>
+          </a:p>
+          <a:p>
             <a:endParaRPr lang="nb-NO" dirty="0"/>
+          </a:p>
+          <a:p>
+            <a:endParaRPr lang="nb-NO" dirty="0" smtClean="0"/>
+          </a:p>
+          <a:p>
+            <a:r>
+              <a:rPr lang="nb-NO" dirty="0" smtClean="0"/>
+              <a:t>Oppgaver er lagt </a:t>
+            </a:r>
+            <a:r>
+              <a:rPr lang="nb-NO" dirty="0"/>
+              <a:t>ut på </a:t>
+            </a:r>
+            <a:endParaRPr lang="nb-NO" dirty="0" smtClean="0"/>
+          </a:p>
+          <a:p>
+            <a:pPr lvl="1"/>
+            <a:r>
+              <a:rPr lang="nb-NO" dirty="0" smtClean="0">
+                <a:hlinkClick r:id="rId2"/>
+              </a:rPr>
+              <a:t>https</a:t>
+            </a:r>
+            <a:r>
+              <a:rPr lang="nb-NO" dirty="0">
+                <a:hlinkClick r:id="rId2"/>
+              </a:rPr>
+              <a:t>://</a:t>
+            </a:r>
+            <a:r>
+              <a:rPr lang="nb-NO" dirty="0" smtClean="0">
+                <a:hlinkClick r:id="rId2"/>
+              </a:rPr>
+              <a:t>github.com/stiasta/foredrag</a:t>
+            </a:r>
+            <a:r>
+              <a:rPr lang="nb-NO" dirty="0" smtClean="0"/>
+              <a:t> </a:t>
+            </a:r>
+          </a:p>
+          <a:p>
+            <a:pPr lvl="1"/>
+            <a:r>
+              <a:rPr lang="nb-NO" dirty="0" smtClean="0"/>
+              <a:t>Under </a:t>
+            </a:r>
+            <a:r>
+              <a:rPr lang="nb-NO" dirty="0" err="1" smtClean="0"/>
+              <a:t>Ionic</a:t>
+            </a:r>
+            <a:r>
+              <a:rPr lang="nb-NO" dirty="0" smtClean="0"/>
+              <a:t> 2 workshop &gt; Code</a:t>
+            </a:r>
+          </a:p>
+          <a:p>
+            <a:pPr lvl="1"/>
+            <a:r>
+              <a:rPr lang="nb-NO" dirty="0" smtClean="0"/>
+              <a:t>Før man kjører koden så burde man kjøre en </a:t>
+            </a:r>
+            <a:r>
+              <a:rPr lang="nb-NO" dirty="0" err="1" smtClean="0"/>
+              <a:t>npm</a:t>
+            </a:r>
+            <a:r>
+              <a:rPr lang="nb-NO" dirty="0" smtClean="0"/>
+              <a:t> </a:t>
+            </a:r>
+            <a:r>
+              <a:rPr lang="nb-NO" dirty="0" err="1" smtClean="0"/>
+              <a:t>install</a:t>
+            </a:r>
+            <a:r>
+              <a:rPr lang="nb-NO" dirty="0" smtClean="0"/>
+              <a:t> </a:t>
+            </a:r>
+            <a:endParaRPr lang="nb-NO" dirty="0" smtClean="0"/>
           </a:p>
         </p:txBody>
       </p:sp>
@@ -4236,6 +4413,13 @@
   <p:clrMapOvr>
     <a:masterClrMapping/>
   </p:clrMapOvr>
+  <p:timing>
+    <p:tnLst>
+      <p:par>
+        <p:cTn id="1" dur="indefinite" restart="never" nodeType="tmRoot"/>
+      </p:par>
+    </p:tnLst>
+  </p:timing>
 </p:sld>
 </file>
 
@@ -4866,19 +5050,19 @@
             </a:r>
             <a:r>
               <a:rPr lang="nb-NO" dirty="0" smtClean="0">
-                <a:hlinkClick r:id="rId2"/>
+                <a:hlinkClick r:id="rId3"/>
               </a:rPr>
               <a:t>http</a:t>
             </a:r>
             <a:r>
               <a:rPr lang="nb-NO" dirty="0">
-                <a:hlinkClick r:id="rId2"/>
+                <a:hlinkClick r:id="rId3"/>
               </a:rPr>
               <a:t>://ionicframework.com/docs/v2/components</a:t>
             </a:r>
             <a:r>
               <a:rPr lang="nb-NO" dirty="0" smtClean="0">
-                <a:hlinkClick r:id="rId2"/>
+                <a:hlinkClick r:id="rId3"/>
               </a:rPr>
               <a:t>/</a:t>
             </a:r>
@@ -5090,6 +5274,25 @@
               <a:rPr lang="nb-NO" dirty="0" smtClean="0"/>
               <a:t>&gt;</a:t>
             </a:r>
+          </a:p>
+          <a:p>
+            <a:pPr lvl="2"/>
+            <a:endParaRPr lang="nb-NO" dirty="0"/>
+          </a:p>
+          <a:p>
+            <a:r>
+              <a:rPr lang="nb-NO" dirty="0" smtClean="0"/>
+              <a:t>Test gjerne mot </a:t>
+            </a:r>
+            <a:r>
+              <a:rPr lang="nb-NO" dirty="0" err="1" smtClean="0"/>
+              <a:t>View</a:t>
+            </a:r>
+            <a:r>
+              <a:rPr lang="nb-NO" dirty="0"/>
+              <a:t>.</a:t>
+            </a:r>
+            <a:endParaRPr lang="nb-NO" dirty="0" smtClean="0"/>
           </a:p>
           <a:p>
             <a:pPr lvl="1"/>
@@ -5196,23 +5399,64 @@
         </p:nvSpPr>
         <p:spPr/>
         <p:txBody>
-          <a:bodyPr/>
+          <a:bodyPr>
+            <a:normAutofit fontScale="85000" lnSpcReduction="20000"/>
+          </a:bodyPr>
           <a:lstStyle/>
           <a:p>
             <a:r>
               <a:rPr lang="nb-NO" dirty="0" smtClean="0"/>
-              <a:t>Lag service</a:t>
-            </a:r>
-          </a:p>
-          <a:p>
-            <a:pPr lvl="1"/>
-            <a:r>
-              <a:rPr lang="nb-NO" dirty="0" smtClean="0"/>
-              <a:t>Kjører en http </a:t>
+              <a:t>Lag </a:t>
+            </a:r>
+            <a:r>
+              <a:rPr lang="nb-NO" dirty="0" smtClean="0"/>
+              <a:t>en service som kalles </a:t>
             </a:r>
             <a:r>
               <a:rPr lang="nb-NO" dirty="0" err="1" smtClean="0"/>
-              <a:t>get</a:t>
+              <a:t>chatbot</a:t>
+            </a:r>
+            <a:r>
+              <a:rPr lang="nb-NO" dirty="0" err="1"/>
+              <a:t>-</a:t>
+            </a:r>
+            <a:r>
+              <a:rPr lang="nb-NO" dirty="0" err="1" smtClean="0"/>
+              <a:t>service.ts</a:t>
+            </a:r>
+            <a:endParaRPr lang="nb-NO" dirty="0" smtClean="0"/>
+          </a:p>
+          <a:p>
+            <a:r>
+              <a:rPr lang="nb-NO" dirty="0" smtClean="0"/>
+              <a:t>Send </a:t>
+            </a:r>
+            <a:r>
+              <a:rPr lang="nb-NO" dirty="0" err="1" smtClean="0"/>
+              <a:t>chat</a:t>
+            </a:r>
+            <a:r>
+              <a:rPr lang="nb-NO" dirty="0" smtClean="0"/>
+              <a:t> input til servicen</a:t>
+            </a:r>
+            <a:endParaRPr lang="nb-NO" dirty="0" smtClean="0"/>
+          </a:p>
+          <a:p>
+            <a:r>
+              <a:rPr lang="nb-NO" dirty="0" smtClean="0"/>
+              <a:t>Send </a:t>
+            </a:r>
+            <a:r>
+              <a:rPr lang="nb-NO" dirty="0" err="1" smtClean="0"/>
+              <a:t>response</a:t>
+            </a:r>
+            <a:r>
+              <a:rPr lang="nb-NO" dirty="0" smtClean="0"/>
+              <a:t> til </a:t>
+            </a:r>
+            <a:r>
+              <a:rPr lang="nb-NO" dirty="0" err="1" smtClean="0"/>
+              <a:t>chat-content</a:t>
             </a:r>
             <a:r>
               <a:rPr lang="nb-NO" dirty="0"/>
@@ -5220,51 +5464,121 @@
             </a:r>
             <a:r>
               <a:rPr lang="nb-NO" dirty="0" smtClean="0"/>
-              <a:t>mot [URL]</a:t>
-            </a:r>
-          </a:p>
-          <a:p>
-            <a:r>
-              <a:rPr lang="nb-NO" dirty="0" smtClean="0"/>
-              <a:t>Bruk servicen i </a:t>
+              <a:t>som nytt </a:t>
+            </a:r>
+            <a:r>
+              <a:rPr lang="nb-NO" dirty="0" smtClean="0"/>
+              <a:t>ion-</a:t>
             </a:r>
             <a:r>
               <a:rPr lang="nb-NO" dirty="0" err="1" smtClean="0"/>
-              <a:t>chat</a:t>
-            </a:r>
-            <a:r>
-              <a:rPr lang="nb-NO" dirty="0" smtClean="0"/>
-              <a:t>-input</a:t>
-            </a:r>
-          </a:p>
-          <a:p>
-            <a:r>
-              <a:rPr lang="nb-NO" dirty="0" smtClean="0"/>
-              <a:t>Send </a:t>
-            </a:r>
+              <a:t>card</a:t>
+            </a:r>
+            <a:endParaRPr lang="nb-NO" dirty="0" smtClean="0"/>
+          </a:p>
+          <a:p>
+            <a:endParaRPr lang="nb-NO" dirty="0"/>
+          </a:p>
+          <a:p>
+            <a:r>
+              <a:rPr lang="nb-NO" dirty="0" smtClean="0"/>
+              <a:t>API-detaljer</a:t>
+            </a:r>
+          </a:p>
+          <a:p>
+            <a:pPr lvl="1"/>
+            <a:r>
+              <a:rPr lang="nb-NO" dirty="0"/>
+              <a:t>URL: </a:t>
+            </a:r>
+            <a:r>
+              <a:rPr lang="nb-NO" dirty="0">
+                <a:hlinkClick r:id="rId2"/>
+              </a:rPr>
+              <a:t>https://</a:t>
+            </a:r>
+            <a:r>
+              <a:rPr lang="nb-NO" dirty="0" smtClean="0">
+                <a:hlinkClick r:id="rId2"/>
+              </a:rPr>
+              <a:t>else.sticos.no/wp-content/plugins/elseBot/elseAPI.php</a:t>
+            </a:r>
+            <a:r>
+              <a:rPr lang="nb-NO" dirty="0" smtClean="0"/>
+              <a:t> </a:t>
+            </a:r>
+            <a:endParaRPr lang="nb-NO" dirty="0"/>
+          </a:p>
+          <a:p>
+            <a:pPr lvl="1"/>
+            <a:r>
+              <a:rPr lang="nb-NO" dirty="0" smtClean="0"/>
+              <a:t>Method: POST</a:t>
+            </a:r>
+          </a:p>
+          <a:p>
+            <a:pPr lvl="1"/>
             <a:r>
               <a:rPr lang="nb-NO" dirty="0" err="1" smtClean="0"/>
-              <a:t>response</a:t>
-            </a:r>
-            <a:r>
-              <a:rPr lang="nb-NO" dirty="0" smtClean="0"/>
-              <a:t> til </a:t>
-            </a:r>
+              <a:t>Params</a:t>
+            </a:r>
+            <a:r>
+              <a:rPr lang="nb-NO" dirty="0" smtClean="0"/>
+              <a:t>: </a:t>
+            </a:r>
+          </a:p>
+          <a:p>
+            <a:pPr lvl="2"/>
             <a:r>
               <a:rPr lang="nb-NO" dirty="0" err="1" smtClean="0"/>
-              <a:t>chat-content</a:t>
-            </a:r>
-            <a:r>
-              <a:rPr lang="nb-NO" dirty="0"/>
-              <a:t> </a:t>
-            </a:r>
-            <a:r>
-              <a:rPr lang="nb-NO" dirty="0" smtClean="0"/>
-              <a:t>som nytt ion-</a:t>
-            </a:r>
-            <a:r>
-              <a:rPr lang="nb-NO" smtClean="0"/>
-              <a:t>card</a:t>
+              <a:t>unikId</a:t>
+            </a:r>
+            <a:r>
+              <a:rPr lang="nb-NO" dirty="0" smtClean="0"/>
+              <a:t>=testId1</a:t>
+            </a:r>
+          </a:p>
+          <a:p>
+            <a:pPr lvl="2"/>
+            <a:r>
+              <a:rPr lang="nb-NO" dirty="0" err="1" smtClean="0"/>
+              <a:t>text</a:t>
+            </a:r>
+            <a:r>
+              <a:rPr lang="nb-NO" dirty="0" smtClean="0"/>
+              <a:t> = [spørsmål]</a:t>
+            </a:r>
+          </a:p>
+          <a:p>
+            <a:endParaRPr lang="nb-NO" dirty="0"/>
+          </a:p>
+          <a:p>
+            <a:r>
+              <a:rPr lang="nb-NO" dirty="0" smtClean="0"/>
+              <a:t>Bonus:</a:t>
+            </a:r>
+          </a:p>
+          <a:p>
+            <a:pPr lvl="1"/>
+            <a:r>
+              <a:rPr lang="nb-NO" dirty="0" smtClean="0"/>
+              <a:t>Gjør slik </a:t>
+            </a:r>
+            <a:r>
+              <a:rPr lang="nb-NO" smtClean="0"/>
+              <a:t>at </a:t>
+            </a:r>
+            <a:r>
+              <a:rPr lang="nb-NO" smtClean="0"/>
+              <a:t>GUI </a:t>
+            </a:r>
+            <a:r>
+              <a:rPr lang="nb-NO" smtClean="0"/>
+              <a:t>skiller </a:t>
+            </a:r>
+            <a:r>
+              <a:rPr lang="nb-NO" dirty="0" smtClean="0"/>
+              <a:t>på spørsmål og svar</a:t>
             </a:r>
             <a:endParaRPr lang="nb-NO" dirty="0" smtClean="0"/>
           </a:p>

</xml_diff>

<commit_message>
lagt til bonus oppgave i oppgave 4 og startet oppgave 5
</commit_message>
<xml_diff>
--- a/Ionic 2 workshop/Ionic 2 workshop.pptx
+++ b/Ionic 2 workshop/Ionic 2 workshop.pptx
@@ -5,7 +5,7 @@
     <p:sldMasterId id="2147483660" r:id="rId1"/>
   </p:sldMasterIdLst>
   <p:notesMasterIdLst>
-    <p:notesMasterId r:id="rId18"/>
+    <p:notesMasterId r:id="rId22"/>
   </p:notesMasterIdLst>
   <p:sldIdLst>
     <p:sldId id="256" r:id="rId2"/>
@@ -21,9 +21,13 @@
     <p:sldId id="266" r:id="rId12"/>
     <p:sldId id="260" r:id="rId13"/>
     <p:sldId id="267" r:id="rId14"/>
-    <p:sldId id="259" r:id="rId15"/>
-    <p:sldId id="268" r:id="rId16"/>
-    <p:sldId id="271" r:id="rId17"/>
+    <p:sldId id="272" r:id="rId15"/>
+    <p:sldId id="273" r:id="rId16"/>
+    <p:sldId id="259" r:id="rId17"/>
+    <p:sldId id="268" r:id="rId18"/>
+    <p:sldId id="274" r:id="rId19"/>
+    <p:sldId id="271" r:id="rId20"/>
+    <p:sldId id="275" r:id="rId21"/>
   </p:sldIdLst>
   <p:sldSz cx="12192000" cy="6858000"/>
   <p:notesSz cx="6858000" cy="9144000"/>
@@ -688,20 +692,6 @@
           <a:bodyPr/>
           <a:lstStyle/>
           <a:p>
-            <a:r>
-              <a:rPr lang="nb-NO" dirty="0" smtClean="0"/>
-              <a:t>Hva er en </a:t>
-            </a:r>
-            <a:r>
-              <a:rPr lang="nb-NO" dirty="0" err="1" smtClean="0"/>
-              <a:t>webkomponent</a:t>
-            </a:r>
-            <a:r>
-              <a:rPr lang="nb-NO" dirty="0" smtClean="0"/>
-              <a:t>?</a:t>
-            </a:r>
-          </a:p>
-          <a:p>
             <a:endParaRPr lang="nb-NO" dirty="0"/>
           </a:p>
         </p:txBody>
@@ -723,7 +713,7 @@
           <a:p>
             <a:fld id="{6BEA58FB-0425-4043-8123-60513F4596AE}" type="slidenum">
               <a:rPr lang="nb-NO" smtClean="0"/>
-              <a:t>14</a:t>
+              <a:t>15</a:t>
             </a:fld>
             <a:endParaRPr lang="nb-NO"/>
           </a:p>
@@ -732,7 +722,7 @@
     </p:spTree>
     <p:extLst>
       <p:ext uri="{BB962C8B-B14F-4D97-AF65-F5344CB8AC3E}">
-        <p14:creationId xmlns:p14="http://schemas.microsoft.com/office/powerpoint/2010/main" val="2270801068"/>
+        <p14:creationId xmlns:p14="http://schemas.microsoft.com/office/powerpoint/2010/main" val="3382720617"/>
       </p:ext>
     </p:extLst>
   </p:cSld>
@@ -788,6 +778,104 @@
           <a:p>
             <a:r>
               <a:rPr lang="nb-NO" dirty="0" smtClean="0"/>
+              <a:t>Hva er en </a:t>
+            </a:r>
+            <a:r>
+              <a:rPr lang="nb-NO" dirty="0" err="1" smtClean="0"/>
+              <a:t>webkomponent</a:t>
+            </a:r>
+            <a:r>
+              <a:rPr lang="nb-NO" dirty="0" smtClean="0"/>
+              <a:t>?</a:t>
+            </a:r>
+          </a:p>
+          <a:p>
+            <a:endParaRPr lang="nb-NO" dirty="0"/>
+          </a:p>
+        </p:txBody>
+      </p:sp>
+      <p:sp>
+        <p:nvSpPr>
+          <p:cNvPr id="4" name="Plassholder for lysbildenummer 3"/>
+          <p:cNvSpPr>
+            <a:spLocks noGrp="1"/>
+          </p:cNvSpPr>
+          <p:nvPr>
+            <p:ph type="sldNum" sz="quarter" idx="10"/>
+          </p:nvPr>
+        </p:nvSpPr>
+        <p:spPr/>
+        <p:txBody>
+          <a:bodyPr/>
+          <a:lstStyle/>
+          <a:p>
+            <a:fld id="{6BEA58FB-0425-4043-8123-60513F4596AE}" type="slidenum">
+              <a:rPr lang="nb-NO" smtClean="0"/>
+              <a:t>16</a:t>
+            </a:fld>
+            <a:endParaRPr lang="nb-NO"/>
+          </a:p>
+        </p:txBody>
+      </p:sp>
+    </p:spTree>
+    <p:extLst>
+      <p:ext uri="{BB962C8B-B14F-4D97-AF65-F5344CB8AC3E}">
+        <p14:creationId xmlns:p14="http://schemas.microsoft.com/office/powerpoint/2010/main" val="2270801068"/>
+      </p:ext>
+    </p:extLst>
+  </p:cSld>
+  <p:clrMapOvr>
+    <a:masterClrMapping/>
+  </p:clrMapOvr>
+</p:notes>
+</file>
+
+<file path=ppt/notesSlides/notesSlide4.xml><?xml version="1.0" encoding="utf-8"?>
+<p:notes xmlns:a="http://schemas.openxmlformats.org/drawingml/2006/main" xmlns:r="http://schemas.openxmlformats.org/officeDocument/2006/relationships" xmlns:p="http://schemas.openxmlformats.org/presentationml/2006/main">
+  <p:cSld>
+    <p:spTree>
+      <p:nvGrpSpPr>
+        <p:cNvPr id="1" name=""/>
+        <p:cNvGrpSpPr/>
+        <p:nvPr/>
+      </p:nvGrpSpPr>
+      <p:grpSpPr>
+        <a:xfrm>
+          <a:off x="0" y="0"/>
+          <a:ext cx="0" cy="0"/>
+          <a:chOff x="0" y="0"/>
+          <a:chExt cx="0" cy="0"/>
+        </a:xfrm>
+      </p:grpSpPr>
+      <p:sp>
+        <p:nvSpPr>
+          <p:cNvPr id="2" name="Plassholder for lysbilde 1"/>
+          <p:cNvSpPr>
+            <a:spLocks noGrp="1" noRot="1" noChangeAspect="1"/>
+          </p:cNvSpPr>
+          <p:nvPr>
+            <p:ph type="sldImg"/>
+          </p:nvPr>
+        </p:nvSpPr>
+        <p:spPr/>
+      </p:sp>
+      <p:sp>
+        <p:nvSpPr>
+          <p:cNvPr id="3" name="Plassholder for notater 2"/>
+          <p:cNvSpPr>
+            <a:spLocks noGrp="1"/>
+          </p:cNvSpPr>
+          <p:nvPr>
+            <p:ph type="body" idx="1"/>
+          </p:nvPr>
+        </p:nvSpPr>
+        <p:spPr/>
+        <p:txBody>
+          <a:bodyPr/>
+          <a:lstStyle/>
+          <a:p>
+            <a:r>
+              <a:rPr lang="nb-NO" dirty="0" smtClean="0"/>
               <a:t>Fasit</a:t>
             </a:r>
           </a:p>
@@ -1178,7 +1266,7 @@
           <a:p>
             <a:fld id="{6BEA58FB-0425-4043-8123-60513F4596AE}" type="slidenum">
               <a:rPr lang="nb-NO" smtClean="0"/>
-              <a:t>15</a:t>
+              <a:t>17</a:t>
             </a:fld>
             <a:endParaRPr lang="nb-NO"/>
           </a:p>
@@ -4999,6 +5087,154 @@
           <a:lstStyle/>
           <a:p>
             <a:r>
+              <a:rPr lang="nb-NO" dirty="0" err="1" smtClean="0"/>
+              <a:t>Angular</a:t>
+            </a:r>
+            <a:r>
+              <a:rPr lang="nb-NO" dirty="0" smtClean="0"/>
+              <a:t>-struktur</a:t>
+            </a:r>
+            <a:endParaRPr lang="nb-NO" dirty="0"/>
+          </a:p>
+        </p:txBody>
+      </p:sp>
+      <p:sp>
+        <p:nvSpPr>
+          <p:cNvPr id="3" name="Plassholder for innhold 2"/>
+          <p:cNvSpPr>
+            <a:spLocks noGrp="1"/>
+          </p:cNvSpPr>
+          <p:nvPr>
+            <p:ph idx="1"/>
+          </p:nvPr>
+        </p:nvSpPr>
+        <p:spPr/>
+        <p:txBody>
+          <a:bodyPr/>
+          <a:lstStyle/>
+          <a:p>
+            <a:endParaRPr lang="nb-NO"/>
+          </a:p>
+        </p:txBody>
+      </p:sp>
+    </p:spTree>
+    <p:extLst>
+      <p:ext uri="{BB962C8B-B14F-4D97-AF65-F5344CB8AC3E}">
+        <p14:creationId xmlns:p14="http://schemas.microsoft.com/office/powerpoint/2010/main" val="968896447"/>
+      </p:ext>
+    </p:extLst>
+  </p:cSld>
+  <p:clrMapOvr>
+    <a:masterClrMapping/>
+  </p:clrMapOvr>
+</p:sld>
+</file>
+
+<file path=ppt/slides/slide15.xml><?xml version="1.0" encoding="utf-8"?>
+<p:sld xmlns:a="http://schemas.openxmlformats.org/drawingml/2006/main" xmlns:r="http://schemas.openxmlformats.org/officeDocument/2006/relationships" xmlns:p="http://schemas.openxmlformats.org/presentationml/2006/main">
+  <p:cSld>
+    <p:spTree>
+      <p:nvGrpSpPr>
+        <p:cNvPr id="1" name=""/>
+        <p:cNvGrpSpPr/>
+        <p:nvPr/>
+      </p:nvGrpSpPr>
+      <p:grpSpPr>
+        <a:xfrm>
+          <a:off x="0" y="0"/>
+          <a:ext cx="0" cy="0"/>
+          <a:chOff x="0" y="0"/>
+          <a:chExt cx="0" cy="0"/>
+        </a:xfrm>
+      </p:grpSpPr>
+      <p:sp>
+        <p:nvSpPr>
+          <p:cNvPr id="2" name="Tittel 1"/>
+          <p:cNvSpPr>
+            <a:spLocks noGrp="1"/>
+          </p:cNvSpPr>
+          <p:nvPr>
+            <p:ph type="title"/>
+          </p:nvPr>
+        </p:nvSpPr>
+        <p:spPr/>
+        <p:txBody>
+          <a:bodyPr/>
+          <a:lstStyle/>
+          <a:p>
+            <a:r>
+              <a:rPr lang="nb-NO" dirty="0" smtClean="0"/>
+              <a:t>Components</a:t>
+            </a:r>
+            <a:endParaRPr lang="nb-NO" dirty="0"/>
+          </a:p>
+        </p:txBody>
+      </p:sp>
+      <p:sp>
+        <p:nvSpPr>
+          <p:cNvPr id="3" name="Plassholder for innhold 2"/>
+          <p:cNvSpPr>
+            <a:spLocks noGrp="1"/>
+          </p:cNvSpPr>
+          <p:nvPr>
+            <p:ph idx="1"/>
+          </p:nvPr>
+        </p:nvSpPr>
+        <p:spPr/>
+        <p:txBody>
+          <a:bodyPr/>
+          <a:lstStyle/>
+          <a:p>
+            <a:endParaRPr lang="nb-NO"/>
+          </a:p>
+        </p:txBody>
+      </p:sp>
+    </p:spTree>
+    <p:extLst>
+      <p:ext uri="{BB962C8B-B14F-4D97-AF65-F5344CB8AC3E}">
+        <p14:creationId xmlns:p14="http://schemas.microsoft.com/office/powerpoint/2010/main" val="2137687318"/>
+      </p:ext>
+    </p:extLst>
+  </p:cSld>
+  <p:clrMapOvr>
+    <a:masterClrMapping/>
+  </p:clrMapOvr>
+</p:sld>
+</file>
+
+<file path=ppt/slides/slide16.xml><?xml version="1.0" encoding="utf-8"?>
+<p:sld xmlns:a="http://schemas.openxmlformats.org/drawingml/2006/main" xmlns:r="http://schemas.openxmlformats.org/officeDocument/2006/relationships" xmlns:p="http://schemas.openxmlformats.org/presentationml/2006/main">
+  <p:cSld>
+    <p:spTree>
+      <p:nvGrpSpPr>
+        <p:cNvPr id="1" name=""/>
+        <p:cNvGrpSpPr/>
+        <p:nvPr/>
+      </p:nvGrpSpPr>
+      <p:grpSpPr>
+        <a:xfrm>
+          <a:off x="0" y="0"/>
+          <a:ext cx="0" cy="0"/>
+          <a:chOff x="0" y="0"/>
+          <a:chExt cx="0" cy="0"/>
+        </a:xfrm>
+      </p:grpSpPr>
+      <p:sp>
+        <p:nvSpPr>
+          <p:cNvPr id="2" name="Tittel 1"/>
+          <p:cNvSpPr>
+            <a:spLocks noGrp="1"/>
+          </p:cNvSpPr>
+          <p:nvPr>
+            <p:ph type="title"/>
+          </p:nvPr>
+        </p:nvSpPr>
+        <p:spPr/>
+        <p:txBody>
+          <a:bodyPr/>
+          <a:lstStyle/>
+          <a:p>
+            <a:r>
               <a:rPr lang="nb-NO" dirty="0" smtClean="0"/>
               <a:t>Lage (web)</a:t>
             </a:r>
@@ -5169,7 +5405,7 @@
 </p:sld>
 </file>
 
-<file path=ppt/slides/slide15.xml><?xml version="1.0" encoding="utf-8"?>
+<file path=ppt/slides/slide17.xml><?xml version="1.0" encoding="utf-8"?>
 <p:sld xmlns:a="http://schemas.openxmlformats.org/drawingml/2006/main" xmlns:r="http://schemas.openxmlformats.org/officeDocument/2006/relationships" xmlns:p="http://schemas.openxmlformats.org/presentationml/2006/main">
   <p:cSld>
     <p:spTree>
@@ -5347,7 +5583,7 @@
 </p:sld>
 </file>
 
-<file path=ppt/slides/slide16.xml><?xml version="1.0" encoding="utf-8"?>
+<file path=ppt/slides/slide18.xml><?xml version="1.0" encoding="utf-8"?>
 <p:sld xmlns:a="http://schemas.openxmlformats.org/drawingml/2006/main" xmlns:r="http://schemas.openxmlformats.org/officeDocument/2006/relationships" xmlns:p="http://schemas.openxmlformats.org/presentationml/2006/main">
   <p:cSld>
     <p:spTree>
@@ -5381,6 +5617,78 @@
           <a:p>
             <a:r>
               <a:rPr lang="nb-NO" dirty="0" smtClean="0"/>
+              <a:t>Service/Provider</a:t>
+            </a:r>
+            <a:endParaRPr lang="nb-NO" dirty="0"/>
+          </a:p>
+        </p:txBody>
+      </p:sp>
+      <p:sp>
+        <p:nvSpPr>
+          <p:cNvPr id="3" name="Plassholder for innhold 2"/>
+          <p:cNvSpPr>
+            <a:spLocks noGrp="1"/>
+          </p:cNvSpPr>
+          <p:nvPr>
+            <p:ph idx="1"/>
+          </p:nvPr>
+        </p:nvSpPr>
+        <p:spPr/>
+        <p:txBody>
+          <a:bodyPr/>
+          <a:lstStyle/>
+          <a:p>
+            <a:endParaRPr lang="nb-NO"/>
+          </a:p>
+        </p:txBody>
+      </p:sp>
+    </p:spTree>
+    <p:extLst>
+      <p:ext uri="{BB962C8B-B14F-4D97-AF65-F5344CB8AC3E}">
+        <p14:creationId xmlns:p14="http://schemas.microsoft.com/office/powerpoint/2010/main" val="955638867"/>
+      </p:ext>
+    </p:extLst>
+  </p:cSld>
+  <p:clrMapOvr>
+    <a:masterClrMapping/>
+  </p:clrMapOvr>
+</p:sld>
+</file>
+
+<file path=ppt/slides/slide19.xml><?xml version="1.0" encoding="utf-8"?>
+<p:sld xmlns:a="http://schemas.openxmlformats.org/drawingml/2006/main" xmlns:r="http://schemas.openxmlformats.org/officeDocument/2006/relationships" xmlns:p="http://schemas.openxmlformats.org/presentationml/2006/main">
+  <p:cSld>
+    <p:spTree>
+      <p:nvGrpSpPr>
+        <p:cNvPr id="1" name=""/>
+        <p:cNvGrpSpPr/>
+        <p:nvPr/>
+      </p:nvGrpSpPr>
+      <p:grpSpPr>
+        <a:xfrm>
+          <a:off x="0" y="0"/>
+          <a:ext cx="0" cy="0"/>
+          <a:chOff x="0" y="0"/>
+          <a:chExt cx="0" cy="0"/>
+        </a:xfrm>
+      </p:grpSpPr>
+      <p:sp>
+        <p:nvSpPr>
+          <p:cNvPr id="2" name="Tittel 1"/>
+          <p:cNvSpPr>
+            <a:spLocks noGrp="1"/>
+          </p:cNvSpPr>
+          <p:nvPr>
+            <p:ph type="title"/>
+          </p:nvPr>
+        </p:nvSpPr>
+        <p:spPr/>
+        <p:txBody>
+          <a:bodyPr/>
+          <a:lstStyle/>
+          <a:p>
+            <a:r>
+              <a:rPr lang="nb-NO" dirty="0" smtClean="0"/>
               <a:t>Oppgave 4</a:t>
             </a:r>
             <a:endParaRPr lang="nb-NO" dirty="0"/>
@@ -5397,10 +5705,15 @@
             <p:ph idx="1"/>
           </p:nvPr>
         </p:nvSpPr>
-        <p:spPr/>
+        <p:spPr>
+          <a:xfrm>
+            <a:off x="838200" y="1825625"/>
+            <a:ext cx="7982527" cy="4351338"/>
+          </a:xfrm>
+        </p:spPr>
         <p:txBody>
           <a:bodyPr>
-            <a:normAutofit fontScale="85000" lnSpcReduction="20000"/>
+            <a:normAutofit fontScale="77500" lnSpcReduction="20000"/>
           </a:bodyPr>
           <a:lstStyle/>
           <a:p>
@@ -5562,28 +5875,68 @@
             <a:pPr lvl="1"/>
             <a:r>
               <a:rPr lang="nb-NO" dirty="0" smtClean="0"/>
-              <a:t>Gjør slik </a:t>
-            </a:r>
-            <a:r>
-              <a:rPr lang="nb-NO" smtClean="0"/>
-              <a:t>at </a:t>
-            </a:r>
-            <a:r>
-              <a:rPr lang="nb-NO" smtClean="0"/>
+              <a:t>Gjør slik at </a:t>
+            </a:r>
+            <a:r>
+              <a:rPr lang="nb-NO" dirty="0" smtClean="0"/>
               <a:t>GUI </a:t>
             </a:r>
             <a:r>
-              <a:rPr lang="nb-NO" smtClean="0"/>
-              <a:t>skiller </a:t>
-            </a:r>
-            <a:r>
-              <a:rPr lang="nb-NO" dirty="0" smtClean="0"/>
-              <a:t>på spørsmål og svar</a:t>
+              <a:rPr lang="nb-NO" dirty="0" smtClean="0"/>
+              <a:t>skiller på spørsmål og svar ved å </a:t>
+            </a:r>
+            <a:r>
+              <a:rPr lang="nb-NO" dirty="0" err="1" smtClean="0"/>
+              <a:t>venstrejustere</a:t>
+            </a:r>
+            <a:r>
+              <a:rPr lang="nb-NO" dirty="0" smtClean="0"/>
+              <a:t> spørsmål</a:t>
+            </a:r>
+            <a:r>
+              <a:rPr lang="nb-NO" dirty="0"/>
+              <a:t> </a:t>
+            </a:r>
+            <a:r>
+              <a:rPr lang="nb-NO" dirty="0" smtClean="0"/>
+              <a:t>og </a:t>
+            </a:r>
+            <a:r>
+              <a:rPr lang="nb-NO" dirty="0" err="1" smtClean="0"/>
+              <a:t>høyrejustere</a:t>
+            </a:r>
+            <a:r>
+              <a:rPr lang="nb-NO" dirty="0" smtClean="0"/>
+              <a:t> svar.</a:t>
             </a:r>
             <a:endParaRPr lang="nb-NO" dirty="0" smtClean="0"/>
           </a:p>
         </p:txBody>
       </p:sp>
+      <p:pic>
+        <p:nvPicPr>
+          <p:cNvPr id="4" name="Bilde 3"/>
+          <p:cNvPicPr>
+            <a:picLocks noChangeAspect="1"/>
+          </p:cNvPicPr>
+          <p:nvPr/>
+        </p:nvPicPr>
+        <p:blipFill>
+          <a:blip r:embed="rId3"/>
+          <a:stretch>
+            <a:fillRect/>
+          </a:stretch>
+        </p:blipFill>
+        <p:spPr>
+          <a:xfrm>
+            <a:off x="9190759" y="618836"/>
+            <a:ext cx="2792177" cy="4977678"/>
+          </a:xfrm>
+          <a:prstGeom prst="rect">
+            <a:avLst/>
+          </a:prstGeom>
+        </p:spPr>
+      </p:pic>
     </p:spTree>
     <p:extLst>
       <p:ext uri="{BB962C8B-B14F-4D97-AF65-F5344CB8AC3E}">
@@ -5781,6 +6134,100 @@
     <p:extLst>
       <p:ext uri="{BB962C8B-B14F-4D97-AF65-F5344CB8AC3E}">
         <p14:creationId xmlns:p14="http://schemas.microsoft.com/office/powerpoint/2010/main" val="127141065"/>
+      </p:ext>
+    </p:extLst>
+  </p:cSld>
+  <p:clrMapOvr>
+    <a:masterClrMapping/>
+  </p:clrMapOvr>
+</p:sld>
+</file>
+
+<file path=ppt/slides/slide20.xml><?xml version="1.0" encoding="utf-8"?>
+<p:sld xmlns:a="http://schemas.openxmlformats.org/drawingml/2006/main" xmlns:r="http://schemas.openxmlformats.org/officeDocument/2006/relationships" xmlns:p="http://schemas.openxmlformats.org/presentationml/2006/main">
+  <p:cSld>
+    <p:spTree>
+      <p:nvGrpSpPr>
+        <p:cNvPr id="1" name=""/>
+        <p:cNvGrpSpPr/>
+        <p:nvPr/>
+      </p:nvGrpSpPr>
+      <p:grpSpPr>
+        <a:xfrm>
+          <a:off x="0" y="0"/>
+          <a:ext cx="0" cy="0"/>
+          <a:chOff x="0" y="0"/>
+          <a:chExt cx="0" cy="0"/>
+        </a:xfrm>
+      </p:grpSpPr>
+      <p:sp>
+        <p:nvSpPr>
+          <p:cNvPr id="2" name="Tittel 1"/>
+          <p:cNvSpPr>
+            <a:spLocks noGrp="1"/>
+          </p:cNvSpPr>
+          <p:nvPr>
+            <p:ph type="title"/>
+          </p:nvPr>
+        </p:nvSpPr>
+        <p:spPr/>
+        <p:txBody>
+          <a:bodyPr/>
+          <a:lstStyle/>
+          <a:p>
+            <a:r>
+              <a:rPr lang="nb-NO" dirty="0" smtClean="0"/>
+              <a:t>Oppgave  5</a:t>
+            </a:r>
+            <a:endParaRPr lang="nb-NO" dirty="0"/>
+          </a:p>
+        </p:txBody>
+      </p:sp>
+      <p:sp>
+        <p:nvSpPr>
+          <p:cNvPr id="3" name="Plassholder for innhold 2"/>
+          <p:cNvSpPr>
+            <a:spLocks noGrp="1"/>
+          </p:cNvSpPr>
+          <p:nvPr>
+            <p:ph idx="1"/>
+          </p:nvPr>
+        </p:nvSpPr>
+        <p:spPr/>
+        <p:txBody>
+          <a:bodyPr/>
+          <a:lstStyle/>
+          <a:p>
+            <a:r>
+              <a:rPr lang="nb-NO" dirty="0" smtClean="0"/>
+              <a:t>Legg inn </a:t>
+            </a:r>
+            <a:r>
+              <a:rPr lang="nb-NO" dirty="0" err="1" smtClean="0"/>
+              <a:t>speech</a:t>
+            </a:r>
+            <a:r>
+              <a:rPr lang="nb-NO" dirty="0" smtClean="0"/>
+              <a:t> to </a:t>
+            </a:r>
+            <a:r>
+              <a:rPr lang="nb-NO" dirty="0" err="1" smtClean="0"/>
+              <a:t>text</a:t>
+            </a:r>
+            <a:r>
+              <a:rPr lang="nb-NO" dirty="0" smtClean="0"/>
+              <a:t> integrasjon</a:t>
+            </a:r>
+          </a:p>
+          <a:p>
+            <a:endParaRPr lang="nb-NO" dirty="0"/>
+          </a:p>
+        </p:txBody>
+      </p:sp>
+    </p:spTree>
+    <p:extLst>
+      <p:ext uri="{BB962C8B-B14F-4D97-AF65-F5344CB8AC3E}">
+        <p14:creationId xmlns:p14="http://schemas.microsoft.com/office/powerpoint/2010/main" val="1426241631"/>
       </p:ext>
     </p:extLst>
   </p:cSld>

</xml_diff>

<commit_message>
lagt til oppgave 5 med speech recognition
</commit_message>
<xml_diff>
--- a/Ionic 2 workshop/Ionic 2 workshop.pptx
+++ b/Ionic 2 workshop/Ionic 2 workshop.pptx
@@ -5,7 +5,7 @@
     <p:sldMasterId id="2147483660" r:id="rId1"/>
   </p:sldMasterIdLst>
   <p:notesMasterIdLst>
-    <p:notesMasterId r:id="rId22"/>
+    <p:notesMasterId r:id="rId23"/>
   </p:notesMasterIdLst>
   <p:sldIdLst>
     <p:sldId id="256" r:id="rId2"/>
@@ -27,7 +27,8 @@
     <p:sldId id="268" r:id="rId18"/>
     <p:sldId id="274" r:id="rId19"/>
     <p:sldId id="271" r:id="rId20"/>
-    <p:sldId id="275" r:id="rId21"/>
+    <p:sldId id="276" r:id="rId21"/>
+    <p:sldId id="275" r:id="rId22"/>
   </p:sldIdLst>
   <p:sldSz cx="12192000" cy="6858000"/>
   <p:notesSz cx="6858000" cy="9144000"/>
@@ -528,87 +529,7 @@
           <a:bodyPr/>
           <a:lstStyle/>
           <a:p>
-            <a:r>
-              <a:rPr lang="nb-NO" dirty="0" smtClean="0"/>
-              <a:t>Bruk F12</a:t>
-            </a:r>
-            <a:r>
-              <a:rPr lang="nb-NO" baseline="0" dirty="0" smtClean="0"/>
-              <a:t> og </a:t>
-            </a:r>
-            <a:r>
-              <a:rPr lang="nb-NO" baseline="0" dirty="0" err="1" smtClean="0"/>
-              <a:t>device</a:t>
-            </a:r>
-            <a:r>
-              <a:rPr lang="nb-NO" baseline="0" dirty="0" smtClean="0"/>
-              <a:t> hvis man ikke vil kjøre det på mobilen.</a:t>
-            </a:r>
-          </a:p>
-          <a:p>
-            <a:endParaRPr lang="nb-NO" baseline="0" dirty="0" smtClean="0"/>
-          </a:p>
-          <a:p>
-            <a:r>
-              <a:rPr lang="nb-NO" baseline="0" dirty="0" smtClean="0"/>
-              <a:t>Vis fram prosjektstruktur</a:t>
-            </a:r>
-          </a:p>
-          <a:p>
-            <a:pPr marL="171450" indent="-171450">
-              <a:buFontTx/>
-              <a:buChar char="-"/>
-            </a:pPr>
-            <a:r>
-              <a:rPr lang="nb-NO" baseline="0" dirty="0" smtClean="0"/>
-              <a:t>Pages</a:t>
-            </a:r>
-          </a:p>
-          <a:p>
-            <a:pPr marL="171450" indent="-171450">
-              <a:buFontTx/>
-              <a:buChar char="-"/>
-            </a:pPr>
-            <a:r>
-              <a:rPr lang="nb-NO" baseline="0" dirty="0" err="1" smtClean="0"/>
-              <a:t>Root</a:t>
-            </a:r>
-            <a:r>
-              <a:rPr lang="nb-NO" baseline="0" dirty="0" smtClean="0"/>
-              <a:t> </a:t>
-            </a:r>
-            <a:r>
-              <a:rPr lang="nb-NO" baseline="0" dirty="0" err="1" smtClean="0"/>
-              <a:t>component</a:t>
-            </a:r>
-            <a:r>
-              <a:rPr lang="nb-NO" baseline="0" dirty="0" smtClean="0"/>
-              <a:t> under app.html</a:t>
-            </a:r>
-            <a:r>
-              <a:rPr lang="nb-NO" baseline="0" dirty="0"/>
-              <a:t> </a:t>
-            </a:r>
-            <a:r>
-              <a:rPr lang="nb-NO" baseline="0" dirty="0" smtClean="0"/>
-              <a:t>og </a:t>
-            </a:r>
-            <a:r>
-              <a:rPr lang="nb-NO" baseline="0" dirty="0" err="1" smtClean="0"/>
-              <a:t>app.module</a:t>
-            </a:r>
-            <a:r>
-              <a:rPr lang="nb-NO" baseline="0" dirty="0" smtClean="0"/>
-              <a:t> </a:t>
-            </a:r>
-            <a:r>
-              <a:rPr lang="nb-NO" baseline="0" dirty="0" err="1" smtClean="0"/>
-              <a:t>route</a:t>
-            </a:r>
-            <a:r>
-              <a:rPr lang="nb-NO" baseline="0" dirty="0" smtClean="0"/>
-              <a:t>.</a:t>
-            </a:r>
+            <a:endParaRPr lang="nb-NO" dirty="0"/>
           </a:p>
         </p:txBody>
       </p:sp>
@@ -629,7 +550,7 @@
           <a:p>
             <a:fld id="{6BEA58FB-0425-4043-8123-60513F4596AE}" type="slidenum">
               <a:rPr lang="nb-NO" smtClean="0"/>
-              <a:t>13</a:t>
+              <a:t>10</a:t>
             </a:fld>
             <a:endParaRPr lang="nb-NO"/>
           </a:p>
@@ -638,7 +559,7 @@
     </p:spTree>
     <p:extLst>
       <p:ext uri="{BB962C8B-B14F-4D97-AF65-F5344CB8AC3E}">
-        <p14:creationId xmlns:p14="http://schemas.microsoft.com/office/powerpoint/2010/main" val="3617479764"/>
+        <p14:creationId xmlns:p14="http://schemas.microsoft.com/office/powerpoint/2010/main" val="3966976013"/>
       </p:ext>
     </p:extLst>
   </p:cSld>
@@ -692,7 +613,87 @@
           <a:bodyPr/>
           <a:lstStyle/>
           <a:p>
-            <a:endParaRPr lang="nb-NO" dirty="0"/>
+            <a:r>
+              <a:rPr lang="nb-NO" dirty="0" smtClean="0"/>
+              <a:t>Bruk F12</a:t>
+            </a:r>
+            <a:r>
+              <a:rPr lang="nb-NO" baseline="0" dirty="0" smtClean="0"/>
+              <a:t> og </a:t>
+            </a:r>
+            <a:r>
+              <a:rPr lang="nb-NO" baseline="0" dirty="0" err="1" smtClean="0"/>
+              <a:t>device</a:t>
+            </a:r>
+            <a:r>
+              <a:rPr lang="nb-NO" baseline="0" dirty="0" smtClean="0"/>
+              <a:t> hvis man ikke vil kjøre det på mobilen.</a:t>
+            </a:r>
+          </a:p>
+          <a:p>
+            <a:endParaRPr lang="nb-NO" baseline="0" dirty="0" smtClean="0"/>
+          </a:p>
+          <a:p>
+            <a:r>
+              <a:rPr lang="nb-NO" baseline="0" dirty="0" smtClean="0"/>
+              <a:t>Vis fram prosjektstruktur</a:t>
+            </a:r>
+          </a:p>
+          <a:p>
+            <a:pPr marL="171450" indent="-171450">
+              <a:buFontTx/>
+              <a:buChar char="-"/>
+            </a:pPr>
+            <a:r>
+              <a:rPr lang="nb-NO" baseline="0" dirty="0" smtClean="0"/>
+              <a:t>Pages</a:t>
+            </a:r>
+          </a:p>
+          <a:p>
+            <a:pPr marL="171450" indent="-171450">
+              <a:buFontTx/>
+              <a:buChar char="-"/>
+            </a:pPr>
+            <a:r>
+              <a:rPr lang="nb-NO" baseline="0" dirty="0" err="1" smtClean="0"/>
+              <a:t>Root</a:t>
+            </a:r>
+            <a:r>
+              <a:rPr lang="nb-NO" baseline="0" dirty="0" smtClean="0"/>
+              <a:t> </a:t>
+            </a:r>
+            <a:r>
+              <a:rPr lang="nb-NO" baseline="0" dirty="0" err="1" smtClean="0"/>
+              <a:t>component</a:t>
+            </a:r>
+            <a:r>
+              <a:rPr lang="nb-NO" baseline="0" dirty="0" smtClean="0"/>
+              <a:t> under app.html</a:t>
+            </a:r>
+            <a:r>
+              <a:rPr lang="nb-NO" baseline="0" dirty="0"/>
+              <a:t> </a:t>
+            </a:r>
+            <a:r>
+              <a:rPr lang="nb-NO" baseline="0" dirty="0" smtClean="0"/>
+              <a:t>og </a:t>
+            </a:r>
+            <a:r>
+              <a:rPr lang="nb-NO" baseline="0" dirty="0" err="1" smtClean="0"/>
+              <a:t>app.module</a:t>
+            </a:r>
+            <a:r>
+              <a:rPr lang="nb-NO" baseline="0" dirty="0" smtClean="0"/>
+              <a:t> </a:t>
+            </a:r>
+            <a:r>
+              <a:rPr lang="nb-NO" baseline="0" dirty="0" err="1" smtClean="0"/>
+              <a:t>route</a:t>
+            </a:r>
+            <a:r>
+              <a:rPr lang="nb-NO" baseline="0" dirty="0" smtClean="0"/>
+              <a:t>.</a:t>
+            </a:r>
           </a:p>
         </p:txBody>
       </p:sp>
@@ -713,7 +714,7 @@
           <a:p>
             <a:fld id="{6BEA58FB-0425-4043-8123-60513F4596AE}" type="slidenum">
               <a:rPr lang="nb-NO" smtClean="0"/>
-              <a:t>15</a:t>
+              <a:t>13</a:t>
             </a:fld>
             <a:endParaRPr lang="nb-NO"/>
           </a:p>
@@ -722,7 +723,7 @@
     </p:spTree>
     <p:extLst>
       <p:ext uri="{BB962C8B-B14F-4D97-AF65-F5344CB8AC3E}">
-        <p14:creationId xmlns:p14="http://schemas.microsoft.com/office/powerpoint/2010/main" val="3382720617"/>
+        <p14:creationId xmlns:p14="http://schemas.microsoft.com/office/powerpoint/2010/main" val="3617479764"/>
       </p:ext>
     </p:extLst>
   </p:cSld>
@@ -776,6 +777,90 @@
           <a:bodyPr/>
           <a:lstStyle/>
           <a:p>
+            <a:endParaRPr lang="nb-NO" dirty="0"/>
+          </a:p>
+        </p:txBody>
+      </p:sp>
+      <p:sp>
+        <p:nvSpPr>
+          <p:cNvPr id="4" name="Plassholder for lysbildenummer 3"/>
+          <p:cNvSpPr>
+            <a:spLocks noGrp="1"/>
+          </p:cNvSpPr>
+          <p:nvPr>
+            <p:ph type="sldNum" sz="quarter" idx="10"/>
+          </p:nvPr>
+        </p:nvSpPr>
+        <p:spPr/>
+        <p:txBody>
+          <a:bodyPr/>
+          <a:lstStyle/>
+          <a:p>
+            <a:fld id="{6BEA58FB-0425-4043-8123-60513F4596AE}" type="slidenum">
+              <a:rPr lang="nb-NO" smtClean="0"/>
+              <a:t>15</a:t>
+            </a:fld>
+            <a:endParaRPr lang="nb-NO"/>
+          </a:p>
+        </p:txBody>
+      </p:sp>
+    </p:spTree>
+    <p:extLst>
+      <p:ext uri="{BB962C8B-B14F-4D97-AF65-F5344CB8AC3E}">
+        <p14:creationId xmlns:p14="http://schemas.microsoft.com/office/powerpoint/2010/main" val="3382720617"/>
+      </p:ext>
+    </p:extLst>
+  </p:cSld>
+  <p:clrMapOvr>
+    <a:masterClrMapping/>
+  </p:clrMapOvr>
+</p:notes>
+</file>
+
+<file path=ppt/notesSlides/notesSlide4.xml><?xml version="1.0" encoding="utf-8"?>
+<p:notes xmlns:a="http://schemas.openxmlformats.org/drawingml/2006/main" xmlns:r="http://schemas.openxmlformats.org/officeDocument/2006/relationships" xmlns:p="http://schemas.openxmlformats.org/presentationml/2006/main">
+  <p:cSld>
+    <p:spTree>
+      <p:nvGrpSpPr>
+        <p:cNvPr id="1" name=""/>
+        <p:cNvGrpSpPr/>
+        <p:nvPr/>
+      </p:nvGrpSpPr>
+      <p:grpSpPr>
+        <a:xfrm>
+          <a:off x="0" y="0"/>
+          <a:ext cx="0" cy="0"/>
+          <a:chOff x="0" y="0"/>
+          <a:chExt cx="0" cy="0"/>
+        </a:xfrm>
+      </p:grpSpPr>
+      <p:sp>
+        <p:nvSpPr>
+          <p:cNvPr id="2" name="Plassholder for lysbilde 1"/>
+          <p:cNvSpPr>
+            <a:spLocks noGrp="1" noRot="1" noChangeAspect="1"/>
+          </p:cNvSpPr>
+          <p:nvPr>
+            <p:ph type="sldImg"/>
+          </p:nvPr>
+        </p:nvSpPr>
+        <p:spPr/>
+      </p:sp>
+      <p:sp>
+        <p:nvSpPr>
+          <p:cNvPr id="3" name="Plassholder for notater 2"/>
+          <p:cNvSpPr>
+            <a:spLocks noGrp="1"/>
+          </p:cNvSpPr>
+          <p:nvPr>
+            <p:ph type="body" idx="1"/>
+          </p:nvPr>
+        </p:nvSpPr>
+        <p:spPr/>
+        <p:txBody>
+          <a:bodyPr/>
+          <a:lstStyle/>
+          <a:p>
             <a:r>
               <a:rPr lang="nb-NO" dirty="0" smtClean="0"/>
               <a:t>Hva er en </a:t>
@@ -830,7 +915,7 @@
 </p:notes>
 </file>
 
-<file path=ppt/notesSlides/notesSlide4.xml><?xml version="1.0" encoding="utf-8"?>
+<file path=ppt/notesSlides/notesSlide5.xml><?xml version="1.0" encoding="utf-8"?>
 <p:notes xmlns:a="http://schemas.openxmlformats.org/drawingml/2006/main" xmlns:r="http://schemas.openxmlformats.org/officeDocument/2006/relationships" xmlns:p="http://schemas.openxmlformats.org/presentationml/2006/main">
   <p:cSld>
     <p:spTree>
@@ -4368,7 +4453,9 @@
         </p:nvSpPr>
         <p:spPr/>
         <p:txBody>
-          <a:bodyPr/>
+          <a:bodyPr>
+            <a:normAutofit lnSpcReduction="10000"/>
+          </a:bodyPr>
           <a:lstStyle/>
           <a:p>
             <a:r>
@@ -4429,19 +4516,19 @@
             <a:pPr lvl="1"/>
             <a:r>
               <a:rPr lang="nb-NO" dirty="0" smtClean="0">
-                <a:hlinkClick r:id="rId2"/>
+                <a:hlinkClick r:id="rId3"/>
               </a:rPr>
               <a:t>https</a:t>
             </a:r>
             <a:r>
               <a:rPr lang="nb-NO" dirty="0">
-                <a:hlinkClick r:id="rId2"/>
+                <a:hlinkClick r:id="rId3"/>
               </a:rPr>
               <a:t>://</a:t>
             </a:r>
             <a:r>
               <a:rPr lang="nb-NO" dirty="0" smtClean="0">
-                <a:hlinkClick r:id="rId2"/>
+                <a:hlinkClick r:id="rId3"/>
               </a:rPr>
               <a:t>github.com/stiasta/foredrag</a:t>
             </a:r>
@@ -4482,6 +4569,48 @@
             <a:r>
               <a:rPr lang="nb-NO" dirty="0" err="1" smtClean="0"/>
               <a:t>install</a:t>
+            </a:r>
+            <a:r>
+              <a:rPr lang="nb-NO" dirty="0" smtClean="0"/>
+              <a:t> </a:t>
+            </a:r>
+          </a:p>
+          <a:p>
+            <a:pPr lvl="1"/>
+            <a:endParaRPr lang="nb-NO" dirty="0"/>
+          </a:p>
+          <a:p>
+            <a:pPr lvl="1"/>
+            <a:r>
+              <a:rPr lang="nb-NO" dirty="0">
+                <a:hlinkClick r:id="rId4"/>
+              </a:rPr>
+              <a:t>https://</a:t>
+            </a:r>
+            <a:r>
+              <a:rPr lang="nb-NO" dirty="0" smtClean="0">
+                <a:hlinkClick r:id="rId4"/>
+              </a:rPr>
+              <a:t>angular.io/docs/ts/latest/guide/cheatsheet.html</a:t>
+            </a:r>
+            <a:r>
+              <a:rPr lang="nb-NO" dirty="0" smtClean="0"/>
+              <a:t> </a:t>
+            </a:r>
+          </a:p>
+          <a:p>
+            <a:pPr lvl="1"/>
+            <a:r>
+              <a:rPr lang="nb-NO" dirty="0">
+                <a:hlinkClick r:id="rId5"/>
+              </a:rPr>
+              <a:t>https://</a:t>
+            </a:r>
+            <a:r>
+              <a:rPr lang="nb-NO" dirty="0" smtClean="0">
+                <a:hlinkClick r:id="rId5"/>
+              </a:rPr>
+              <a:t>ionicframework.com/docs/v2/components</a:t>
             </a:r>
             <a:r>
               <a:rPr lang="nb-NO" dirty="0" smtClean="0"/>
@@ -6144,6 +6273,143 @@
 </file>
 
 <file path=ppt/slides/slide20.xml><?xml version="1.0" encoding="utf-8"?>
+<p:sld xmlns:a="http://schemas.openxmlformats.org/drawingml/2006/main" xmlns:r="http://schemas.openxmlformats.org/officeDocument/2006/relationships" xmlns:p="http://schemas.openxmlformats.org/presentationml/2006/main">
+  <p:cSld>
+    <p:spTree>
+      <p:nvGrpSpPr>
+        <p:cNvPr id="1" name=""/>
+        <p:cNvGrpSpPr/>
+        <p:nvPr/>
+      </p:nvGrpSpPr>
+      <p:grpSpPr>
+        <a:xfrm>
+          <a:off x="0" y="0"/>
+          <a:ext cx="0" cy="0"/>
+          <a:chOff x="0" y="0"/>
+          <a:chExt cx="0" cy="0"/>
+        </a:xfrm>
+      </p:grpSpPr>
+      <p:sp>
+        <p:nvSpPr>
+          <p:cNvPr id="2" name="Tittel 1"/>
+          <p:cNvSpPr>
+            <a:spLocks noGrp="1"/>
+          </p:cNvSpPr>
+          <p:nvPr>
+            <p:ph type="title"/>
+          </p:nvPr>
+        </p:nvSpPr>
+        <p:spPr/>
+        <p:txBody>
+          <a:bodyPr/>
+          <a:lstStyle/>
+          <a:p>
+            <a:r>
+              <a:rPr lang="nb-NO" dirty="0" smtClean="0"/>
+              <a:t>Native integrasjon</a:t>
+            </a:r>
+            <a:endParaRPr lang="nb-NO" dirty="0"/>
+          </a:p>
+        </p:txBody>
+      </p:sp>
+      <p:sp>
+        <p:nvSpPr>
+          <p:cNvPr id="3" name="Plassholder for innhold 2"/>
+          <p:cNvSpPr>
+            <a:spLocks noGrp="1"/>
+          </p:cNvSpPr>
+          <p:nvPr>
+            <p:ph idx="1"/>
+          </p:nvPr>
+        </p:nvSpPr>
+        <p:spPr/>
+        <p:txBody>
+          <a:bodyPr/>
+          <a:lstStyle/>
+          <a:p>
+            <a:r>
+              <a:rPr lang="nb-NO" dirty="0" smtClean="0"/>
+              <a:t>Bruker </a:t>
+            </a:r>
+            <a:r>
+              <a:rPr lang="nb-NO" dirty="0" err="1" smtClean="0"/>
+              <a:t>cordova</a:t>
+            </a:r>
+            <a:r>
+              <a:rPr lang="nb-NO" dirty="0" smtClean="0"/>
+              <a:t> </a:t>
+            </a:r>
+            <a:r>
+              <a:rPr lang="nb-NO" dirty="0" err="1" smtClean="0"/>
+              <a:t>plugin</a:t>
+            </a:r>
+            <a:r>
+              <a:rPr lang="nb-NO" dirty="0" smtClean="0"/>
+              <a:t> i bunnen</a:t>
+            </a:r>
+          </a:p>
+          <a:p>
+            <a:r>
+              <a:rPr lang="nb-NO" dirty="0" smtClean="0"/>
+              <a:t>Kommando for å installere</a:t>
+            </a:r>
+          </a:p>
+          <a:p>
+            <a:pPr lvl="1"/>
+            <a:r>
+              <a:rPr lang="nb-NO" dirty="0" err="1"/>
+              <a:t>ionic</a:t>
+            </a:r>
+            <a:r>
+              <a:rPr lang="nb-NO" dirty="0"/>
+              <a:t> </a:t>
+            </a:r>
+            <a:r>
+              <a:rPr lang="nb-NO" dirty="0" err="1"/>
+              <a:t>plugin</a:t>
+            </a:r>
+            <a:r>
+              <a:rPr lang="nb-NO" dirty="0"/>
+              <a:t> </a:t>
+            </a:r>
+            <a:r>
+              <a:rPr lang="nb-NO" dirty="0" err="1"/>
+              <a:t>add</a:t>
+            </a:r>
+            <a:r>
+              <a:rPr lang="nb-NO" dirty="0"/>
+              <a:t> </a:t>
+            </a:r>
+            <a:r>
+              <a:rPr lang="nb-NO" dirty="0" smtClean="0"/>
+              <a:t>[</a:t>
+            </a:r>
+            <a:r>
+              <a:rPr lang="nb-NO" dirty="0" err="1" smtClean="0"/>
+              <a:t>plugin</a:t>
+            </a:r>
+            <a:r>
+              <a:rPr lang="nb-NO"/>
+              <a:t>]</a:t>
+            </a:r>
+            <a:endParaRPr lang="nb-NO" dirty="0"/>
+          </a:p>
+        </p:txBody>
+      </p:sp>
+    </p:spTree>
+    <p:extLst>
+      <p:ext uri="{BB962C8B-B14F-4D97-AF65-F5344CB8AC3E}">
+        <p14:creationId xmlns:p14="http://schemas.microsoft.com/office/powerpoint/2010/main" val="3647246771"/>
+      </p:ext>
+    </p:extLst>
+  </p:cSld>
+  <p:clrMapOvr>
+    <a:masterClrMapping/>
+  </p:clrMapOvr>
+</p:sld>
+</file>
+
+<file path=ppt/slides/slide21.xml><?xml version="1.0" encoding="utf-8"?>
 <p:sld xmlns:a="http://schemas.openxmlformats.org/drawingml/2006/main" xmlns:r="http://schemas.openxmlformats.org/officeDocument/2006/relationships" xmlns:p="http://schemas.openxmlformats.org/presentationml/2006/main">
   <p:cSld>
     <p:spTree>

</xml_diff>

<commit_message>
lagt til subscribe på stilling av spm
</commit_message>
<xml_diff>
--- a/Ionic 2 workshop/Ionic 2 workshop.pptx
+++ b/Ionic 2 workshop/Ionic 2 workshop.pptx
@@ -217,7 +217,7 @@
           <a:p>
             <a:fld id="{A5543B18-9950-4402-830C-70DFF55A9D6A}" type="datetimeFigureOut">
               <a:rPr lang="nb-NO" smtClean="0"/>
-              <a:t>06.03.2017</a:t>
+              <a:t>11.03.2017</a:t>
             </a:fld>
             <a:endParaRPr lang="nb-NO"/>
           </a:p>
@@ -870,12 +870,12 @@
               <a:t>webkomponent</a:t>
             </a:r>
             <a:r>
-              <a:rPr lang="nb-NO" dirty="0" smtClean="0"/>
+              <a:rPr lang="nb-NO" smtClean="0"/>
               <a:t>?</a:t>
             </a:r>
           </a:p>
           <a:p>
-            <a:endParaRPr lang="nb-NO" dirty="0"/>
+            <a:endParaRPr lang="nb-NO"/>
           </a:p>
         </p:txBody>
       </p:sp>
@@ -1434,7 +1434,7 @@
           <a:p>
             <a:fld id="{952976F7-1A1B-47BF-994D-21B9772F57A5}" type="datetimeFigureOut">
               <a:rPr lang="nb-NO" smtClean="0"/>
-              <a:t>06.03.2017</a:t>
+              <a:t>11.03.2017</a:t>
             </a:fld>
             <a:endParaRPr lang="nb-NO"/>
           </a:p>
@@ -1817,7 +1817,7 @@
           <a:p>
             <a:fld id="{952976F7-1A1B-47BF-994D-21B9772F57A5}" type="datetimeFigureOut">
               <a:rPr lang="nb-NO" smtClean="0"/>
-              <a:t>06.03.2017</a:t>
+              <a:t>11.03.2017</a:t>
             </a:fld>
             <a:endParaRPr lang="nb-NO"/>
           </a:p>
@@ -2089,7 +2089,7 @@
           <a:p>
             <a:fld id="{952976F7-1A1B-47BF-994D-21B9772F57A5}" type="datetimeFigureOut">
               <a:rPr lang="nb-NO" smtClean="0"/>
-              <a:t>06.03.2017</a:t>
+              <a:t>11.03.2017</a:t>
             </a:fld>
             <a:endParaRPr lang="nb-NO"/>
           </a:p>
@@ -2347,7 +2347,7 @@
           <a:p>
             <a:fld id="{952976F7-1A1B-47BF-994D-21B9772F57A5}" type="datetimeFigureOut">
               <a:rPr lang="nb-NO" smtClean="0"/>
-              <a:t>06.03.2017</a:t>
+              <a:t>11.03.2017</a:t>
             </a:fld>
             <a:endParaRPr lang="nb-NO"/>
           </a:p>
@@ -2752,7 +2752,7 @@
           <a:p>
             <a:fld id="{952976F7-1A1B-47BF-994D-21B9772F57A5}" type="datetimeFigureOut">
               <a:rPr lang="nb-NO" smtClean="0"/>
-              <a:t>06.03.2017</a:t>
+              <a:t>11.03.2017</a:t>
             </a:fld>
             <a:endParaRPr lang="nb-NO"/>
           </a:p>
@@ -2896,7 +2896,7 @@
           <a:p>
             <a:fld id="{952976F7-1A1B-47BF-994D-21B9772F57A5}" type="datetimeFigureOut">
               <a:rPr lang="nb-NO" smtClean="0"/>
-              <a:t>06.03.2017</a:t>
+              <a:t>11.03.2017</a:t>
             </a:fld>
             <a:endParaRPr lang="nb-NO"/>
           </a:p>
@@ -3017,7 +3017,7 @@
           <a:p>
             <a:fld id="{952976F7-1A1B-47BF-994D-21B9772F57A5}" type="datetimeFigureOut">
               <a:rPr lang="nb-NO" smtClean="0"/>
-              <a:t>06.03.2017</a:t>
+              <a:t>11.03.2017</a:t>
             </a:fld>
             <a:endParaRPr lang="nb-NO"/>
           </a:p>
@@ -3320,7 +3320,7 @@
           <a:p>
             <a:fld id="{952976F7-1A1B-47BF-994D-21B9772F57A5}" type="datetimeFigureOut">
               <a:rPr lang="nb-NO" smtClean="0"/>
-              <a:t>06.03.2017</a:t>
+              <a:t>11.03.2017</a:t>
             </a:fld>
             <a:endParaRPr lang="nb-NO"/>
           </a:p>
@@ -3603,7 +3603,7 @@
           <a:p>
             <a:fld id="{952976F7-1A1B-47BF-994D-21B9772F57A5}" type="datetimeFigureOut">
               <a:rPr lang="nb-NO" smtClean="0"/>
-              <a:t>06.03.2017</a:t>
+              <a:t>11.03.2017</a:t>
             </a:fld>
             <a:endParaRPr lang="nb-NO"/>
           </a:p>
@@ -3945,7 +3945,7 @@
           <a:p>
             <a:fld id="{952976F7-1A1B-47BF-994D-21B9772F57A5}" type="datetimeFigureOut">
               <a:rPr lang="nb-NO" smtClean="0"/>
-              <a:t>06.03.2017</a:t>
+              <a:t>11.03.2017</a:t>
             </a:fld>
             <a:endParaRPr lang="nb-NO"/>
           </a:p>
@@ -4616,7 +4616,6 @@
               <a:rPr lang="nb-NO" dirty="0" smtClean="0"/>
               <a:t> </a:t>
             </a:r>
-            <a:endParaRPr lang="nb-NO" dirty="0" smtClean="0"/>
           </a:p>
         </p:txBody>
       </p:sp>
@@ -5227,25 +5226,56 @@
           </a:p>
         </p:txBody>
       </p:sp>
-      <p:sp>
-        <p:nvSpPr>
-          <p:cNvPr id="3" name="Plassholder for innhold 2"/>
-          <p:cNvSpPr>
-            <a:spLocks noGrp="1"/>
-          </p:cNvSpPr>
+      <p:pic>
+        <p:nvPicPr>
+          <p:cNvPr id="4" name="Plassholder for innhold 3"/>
+          <p:cNvPicPr>
+            <a:picLocks noGrp="1" noChangeAspect="1"/>
+          </p:cNvPicPr>
           <p:nvPr>
             <p:ph idx="1"/>
           </p:nvPr>
-        </p:nvSpPr>
-        <p:spPr/>
-        <p:txBody>
-          <a:bodyPr/>
-          <a:lstStyle/>
-          <a:p>
-            <a:endParaRPr lang="nb-NO"/>
-          </a:p>
-        </p:txBody>
-      </p:sp>
+        </p:nvPicPr>
+        <p:blipFill>
+          <a:blip r:embed="rId2"/>
+          <a:stretch>
+            <a:fillRect/>
+          </a:stretch>
+        </p:blipFill>
+        <p:spPr>
+          <a:xfrm>
+            <a:off x="1446360" y="2148408"/>
+            <a:ext cx="5136196" cy="2553791"/>
+          </a:xfrm>
+          <a:prstGeom prst="rect">
+            <a:avLst/>
+          </a:prstGeom>
+        </p:spPr>
+      </p:pic>
+      <p:pic>
+        <p:nvPicPr>
+          <p:cNvPr id="5" name="Bilde 4"/>
+          <p:cNvPicPr>
+            <a:picLocks noChangeAspect="1"/>
+          </p:cNvPicPr>
+          <p:nvPr/>
+        </p:nvPicPr>
+        <p:blipFill>
+          <a:blip r:embed="rId3"/>
+          <a:stretch>
+            <a:fillRect/>
+          </a:stretch>
+        </p:blipFill>
+        <p:spPr>
+          <a:xfrm>
+            <a:off x="7604445" y="2339999"/>
+            <a:ext cx="3209925" cy="2362200"/>
+          </a:xfrm>
+          <a:prstGeom prst="rect">
+            <a:avLst/>
+          </a:prstGeom>
+        </p:spPr>
+      </p:pic>
     </p:spTree>
     <p:extLst>
       <p:ext uri="{BB962C8B-B14F-4D97-AF65-F5344CB8AC3E}">
@@ -5314,7 +5344,40 @@
           <a:bodyPr/>
           <a:lstStyle/>
           <a:p>
-            <a:endParaRPr lang="nb-NO"/>
+            <a:r>
+              <a:rPr lang="nb-NO" dirty="0" smtClean="0"/>
+              <a:t>«Kommuniserer med </a:t>
+            </a:r>
+            <a:r>
+              <a:rPr lang="nb-NO" dirty="0" err="1" smtClean="0"/>
+              <a:t>HTML’en</a:t>
+            </a:r>
+            <a:endParaRPr lang="nb-NO" dirty="0" smtClean="0"/>
+          </a:p>
+          <a:p>
+            <a:r>
+              <a:rPr lang="nb-NO" dirty="0" smtClean="0"/>
+              <a:t>Binder HTML og </a:t>
+            </a:r>
+            <a:r>
+              <a:rPr lang="nb-NO" dirty="0" err="1" smtClean="0"/>
+              <a:t>javascript</a:t>
+            </a:r>
+            <a:r>
+              <a:rPr lang="nb-NO" dirty="0"/>
+              <a:t> </a:t>
+            </a:r>
+            <a:r>
+              <a:rPr lang="nb-NO" dirty="0" smtClean="0"/>
+              <a:t>sammen</a:t>
+            </a:r>
+          </a:p>
+          <a:p>
+            <a:r>
+              <a:rPr lang="nb-NO" dirty="0" smtClean="0"/>
+              <a:t>Kan ha underkomponenter</a:t>
+            </a:r>
+            <a:endParaRPr lang="nb-NO" dirty="0"/>
           </a:p>
         </p:txBody>
       </p:sp>
@@ -5848,11 +5911,7 @@
           <a:p>
             <a:r>
               <a:rPr lang="nb-NO" dirty="0" smtClean="0"/>
-              <a:t>Lag </a:t>
-            </a:r>
-            <a:r>
-              <a:rPr lang="nb-NO" dirty="0" smtClean="0"/>
-              <a:t>en service som kalles </a:t>
+              <a:t>Lag en service som kalles </a:t>
             </a:r>
             <a:r>
               <a:rPr lang="nb-NO" dirty="0" err="1" smtClean="0"/>
@@ -5881,7 +5940,6 @@
               <a:rPr lang="nb-NO" dirty="0" smtClean="0"/>
               <a:t> input til servicen</a:t>
             </a:r>
-            <a:endParaRPr lang="nb-NO" dirty="0" smtClean="0"/>
           </a:p>
           <a:p>
             <a:r>
@@ -5906,11 +5964,7 @@
             </a:r>
             <a:r>
               <a:rPr lang="nb-NO" dirty="0" smtClean="0"/>
-              <a:t>som nytt </a:t>
-            </a:r>
-            <a:r>
-              <a:rPr lang="nb-NO" dirty="0" smtClean="0"/>
-              <a:t>ion-</a:t>
+              <a:t>som nytt ion-</a:t>
             </a:r>
             <a:r>
               <a:rPr lang="nb-NO" dirty="0" err="1" smtClean="0"/>
@@ -6004,15 +6058,7 @@
             <a:pPr lvl="1"/>
             <a:r>
               <a:rPr lang="nb-NO" dirty="0" smtClean="0"/>
-              <a:t>Gjør slik at </a:t>
-            </a:r>
-            <a:r>
-              <a:rPr lang="nb-NO" dirty="0" smtClean="0"/>
-              <a:t>GUI </a:t>
-            </a:r>
-            <a:r>
-              <a:rPr lang="nb-NO" dirty="0" smtClean="0"/>
-              <a:t>skiller på spørsmål og svar ved å </a:t>
+              <a:t>Gjør slik at GUI skiller på spørsmål og svar ved å </a:t>
             </a:r>
             <a:r>
               <a:rPr lang="nb-NO" dirty="0" err="1" smtClean="0"/>
@@ -6038,7 +6084,6 @@
               <a:rPr lang="nb-NO" dirty="0" smtClean="0"/>
               <a:t> svar.</a:t>
             </a:r>
-            <a:endParaRPr lang="nb-NO" dirty="0" smtClean="0"/>
           </a:p>
         </p:txBody>
       </p:sp>
@@ -6350,12 +6395,29 @@
           </a:p>
           <a:p>
             <a:r>
-              <a:rPr lang="nb-NO" dirty="0" smtClean="0"/>
-              <a:t>Kommando for å installere</a:t>
-            </a:r>
+              <a:rPr lang="nb-NO" dirty="0"/>
+              <a:t>Legg til </a:t>
+            </a:r>
+            <a:r>
+              <a:rPr lang="nb-NO" dirty="0" err="1"/>
+              <a:t>platformer</a:t>
+            </a:r>
+            <a:endParaRPr lang="nb-NO" dirty="0"/>
           </a:p>
           <a:p>
             <a:pPr lvl="1"/>
+            <a:r>
+              <a:rPr lang="nb-NO" dirty="0"/>
+              <a:t>(</a:t>
+            </a:r>
+            <a:r>
+              <a:rPr lang="nb-NO" dirty="0" err="1"/>
+              <a:t>sudo</a:t>
+            </a:r>
+            <a:r>
+              <a:rPr lang="nb-NO" dirty="0"/>
+              <a:t>) </a:t>
+            </a:r>
             <a:r>
               <a:rPr lang="nb-NO" dirty="0" err="1"/>
               <a:t>ionic</a:t>
@@ -6366,7 +6428,7 @@
             </a:r>
             <a:r>
               <a:rPr lang="nb-NO" dirty="0" err="1"/>
-              <a:t>plugin</a:t>
+              <a:t>platform</a:t>
             </a:r>
             <a:r>
               <a:rPr lang="nb-NO" dirty="0"/>
@@ -6378,20 +6440,133 @@
             </a:r>
             <a:r>
               <a:rPr lang="nb-NO" dirty="0"/>
+              <a:t> [</a:t>
+            </a:r>
+            <a:r>
+              <a:rPr lang="nb-NO" dirty="0" err="1"/>
+              <a:t>platform</a:t>
+            </a:r>
+            <a:r>
+              <a:rPr lang="nb-NO" dirty="0"/>
+              <a:t>]</a:t>
+            </a:r>
+          </a:p>
+          <a:p>
+            <a:pPr lvl="2"/>
+            <a:r>
+              <a:rPr lang="nb-NO" dirty="0"/>
+              <a:t>Der </a:t>
+            </a:r>
+            <a:r>
+              <a:rPr lang="nb-NO" dirty="0" err="1"/>
+              <a:t>platform</a:t>
+            </a:r>
+            <a:r>
+              <a:rPr lang="nb-NO" dirty="0"/>
+              <a:t> kan være </a:t>
+            </a:r>
+            <a:r>
+              <a:rPr lang="nb-NO" dirty="0" err="1"/>
+              <a:t>ios</a:t>
+            </a:r>
+            <a:r>
+              <a:rPr lang="nb-NO" dirty="0"/>
+              <a:t>, </a:t>
+            </a:r>
+            <a:r>
+              <a:rPr lang="nb-NO" dirty="0" err="1"/>
+              <a:t>android</a:t>
+            </a:r>
+            <a:r>
+              <a:rPr lang="nb-NO" dirty="0"/>
+              <a:t>, wp8, </a:t>
+            </a:r>
+            <a:r>
+              <a:rPr lang="nb-NO" dirty="0" err="1"/>
+              <a:t>windows</a:t>
+            </a:r>
+            <a:r>
+              <a:rPr lang="nb-NO" dirty="0"/>
+              <a:t>, blackberry10…</a:t>
+            </a:r>
+          </a:p>
+          <a:p>
+            <a:pPr lvl="2"/>
+            <a:r>
+              <a:rPr lang="nb-NO" dirty="0"/>
+              <a:t>Sjekk tilgjengelige </a:t>
+            </a:r>
+            <a:r>
+              <a:rPr lang="nb-NO" dirty="0" err="1"/>
+              <a:t>platformer</a:t>
+            </a:r>
+            <a:r>
+              <a:rPr lang="nb-NO" dirty="0"/>
+              <a:t> med </a:t>
+            </a:r>
+            <a:r>
+              <a:rPr lang="nb-NO" dirty="0" err="1"/>
+              <a:t>ionic</a:t>
+            </a:r>
+            <a:r>
+              <a:rPr lang="nb-NO" dirty="0"/>
               <a:t> </a:t>
             </a:r>
             <a:r>
-              <a:rPr lang="nb-NO" dirty="0" smtClean="0"/>
-              <a:t>[</a:t>
+              <a:rPr lang="nb-NO" dirty="0" err="1"/>
+              <a:t>platform</a:t>
+            </a:r>
+            <a:endParaRPr lang="nb-NO" dirty="0"/>
+          </a:p>
+          <a:p>
+            <a:r>
+              <a:rPr lang="nb-NO" dirty="0" smtClean="0"/>
+              <a:t>Kommando for å installere</a:t>
+            </a:r>
+          </a:p>
+          <a:p>
+            <a:pPr lvl="1"/>
+            <a:r>
+              <a:rPr lang="nb-NO" dirty="0" err="1" smtClean="0"/>
+              <a:t>ionic</a:t>
+            </a:r>
+            <a:r>
+              <a:rPr lang="nb-NO" dirty="0" smtClean="0"/>
+              <a:t> </a:t>
             </a:r>
             <a:r>
               <a:rPr lang="nb-NO" dirty="0" err="1" smtClean="0"/>
               <a:t>plugin</a:t>
             </a:r>
             <a:r>
-              <a:rPr lang="nb-NO"/>
+              <a:rPr lang="nb-NO" dirty="0" smtClean="0"/>
+              <a:t> </a:t>
+            </a:r>
+            <a:r>
+              <a:rPr lang="nb-NO" dirty="0" err="1" smtClean="0"/>
+              <a:t>add</a:t>
+            </a:r>
+            <a:r>
+              <a:rPr lang="nb-NO" dirty="0" smtClean="0"/>
+              <a:t> [</a:t>
+            </a:r>
+            <a:r>
+              <a:rPr lang="nb-NO" dirty="0" err="1" smtClean="0"/>
+              <a:t>plugin</a:t>
+            </a:r>
+            <a:r>
+              <a:rPr lang="nb-NO" dirty="0" smtClean="0"/>
               <a:t>]</a:t>
             </a:r>
+          </a:p>
+          <a:p>
+            <a:pPr lvl="1"/>
+            <a:endParaRPr lang="nb-NO" dirty="0" smtClean="0"/>
+          </a:p>
+          <a:p>
+            <a:pPr marL="457200" lvl="1" indent="0">
+              <a:buNone/>
+            </a:pPr>
             <a:endParaRPr lang="nb-NO" dirty="0"/>
           </a:p>
         </p:txBody>

</xml_diff>